<commit_message>
modified the overview slide
</commit_message>
<xml_diff>
--- a/Proposal Stuff/Milestone 1 Presentation (2).pptx
+++ b/Proposal Stuff/Milestone 1 Presentation (2).pptx
@@ -1,33 +1,33 @@
 
 <file path=ppt/presentation.xml><?xml version="1.0" encoding="utf-8"?>
-<p:presentation xmlns:a="http://schemas.openxmlformats.org/drawingml/2006/main" xmlns:r="http://schemas.openxmlformats.org/officeDocument/2006/relationships" xmlns:mc="http://schemas.openxmlformats.org/markup-compatibility/2006" xmlns:mv="urn:schemas-microsoft-com:mac:vml" xmlns:p="http://schemas.openxmlformats.org/presentationml/2006/main" xmlns:c="http://schemas.openxmlformats.org/drawingml/2006/chart" xmlns:dgm="http://schemas.openxmlformats.org/drawingml/2006/diagram" xmlns:o="urn:schemas-microsoft-com:office:office" xmlns:v="urn:schemas-microsoft-com:vml" xmlns:pvml="urn:schemas-microsoft-com:office:powerpoint" xmlns:com="http://schemas.openxmlformats.org/drawingml/2006/compatibility" xmlns:p14="http://schemas.microsoft.com/office/powerpoint/2010/main" xmlns:p15="http://schemas.microsoft.com/office/powerpoint/2012/main" autoCompressPictures="0" embedTrueTypeFonts="1" strictFirstAndLastChars="0" saveSubsetFonts="1">
+<p:presentation xmlns:a="http://schemas.openxmlformats.org/drawingml/2006/main" xmlns:r="http://schemas.openxmlformats.org/officeDocument/2006/relationships" xmlns:p="http://schemas.openxmlformats.org/presentationml/2006/main" strictFirstAndLastChars="0" embedTrueTypeFonts="1" saveSubsetFonts="1" autoCompressPictures="0">
   <p:sldMasterIdLst>
-    <p:sldMasterId id="2147483659" r:id="rId4"/>
+    <p:sldMasterId id="2147483659" r:id="rId1"/>
   </p:sldMasterIdLst>
   <p:notesMasterIdLst>
-    <p:notesMasterId r:id="rId5"/>
+    <p:notesMasterId r:id="rId9"/>
   </p:notesMasterIdLst>
   <p:sldIdLst>
-    <p:sldId id="256" r:id="rId6"/>
-    <p:sldId id="257" r:id="rId7"/>
-    <p:sldId id="258" r:id="rId8"/>
-    <p:sldId id="259" r:id="rId9"/>
-    <p:sldId id="260" r:id="rId10"/>
-    <p:sldId id="261" r:id="rId11"/>
-    <p:sldId id="262" r:id="rId12"/>
+    <p:sldId id="256" r:id="rId2"/>
+    <p:sldId id="263" r:id="rId3"/>
+    <p:sldId id="258" r:id="rId4"/>
+    <p:sldId id="259" r:id="rId5"/>
+    <p:sldId id="260" r:id="rId6"/>
+    <p:sldId id="261" r:id="rId7"/>
+    <p:sldId id="262" r:id="rId8"/>
   </p:sldIdLst>
-  <p:sldSz cy="5143500" cx="9144000"/>
+  <p:sldSz cx="9144000" cy="5143500" type="screen16x9"/>
   <p:notesSz cx="6858000" cy="9144000"/>
   <p:embeddedFontLst>
     <p:embeddedFont>
-      <p:font typeface="Old Standard TT"/>
-      <p:regular r:id="rId13"/>
-      <p:bold r:id="rId14"/>
-      <p:italic r:id="rId15"/>
+      <p:font typeface="Old Standard TT" panose="020B0604020202020204" charset="0"/>
+      <p:regular r:id="rId10"/>
+      <p:bold r:id="rId11"/>
+      <p:italic r:id="rId12"/>
     </p:embeddedFont>
   </p:embeddedFontLst>
   <p:defaultTextStyle>
-    <a:defPPr lvl="0" marR="0" rtl="0" algn="l">
+    <a:defPPr marR="0" lvl="0" algn="l" rtl="0">
       <a:lnSpc>
         <a:spcPct val="100000"/>
       </a:lnSpc>
@@ -38,7 +38,7 @@
         <a:spcPts val="0"/>
       </a:spcAft>
     </a:defPPr>
-    <a:lvl1pPr lvl="0" marR="0" rtl="0" algn="l">
+    <a:lvl1pPr marR="0" lvl="0" algn="l" rtl="0">
       <a:lnSpc>
         <a:spcPct val="100000"/>
       </a:lnSpc>
@@ -52,7 +52,7 @@
         <a:srgbClr val="000000"/>
       </a:buClr>
       <a:buFont typeface="Arial"/>
-      <a:defRPr b="0" i="0" sz="1400" u="none" cap="none" strike="noStrike">
+      <a:defRPr sz="1400" b="0" i="0" u="none" strike="noStrike" cap="none">
         <a:solidFill>
           <a:srgbClr val="000000"/>
         </a:solidFill>
@@ -62,7 +62,7 @@
         <a:sym typeface="Arial"/>
       </a:defRPr>
     </a:lvl1pPr>
-    <a:lvl2pPr lvl="1" marR="0" rtl="0" algn="l">
+    <a:lvl2pPr marR="0" lvl="1" algn="l" rtl="0">
       <a:lnSpc>
         <a:spcPct val="100000"/>
       </a:lnSpc>
@@ -76,7 +76,7 @@
         <a:srgbClr val="000000"/>
       </a:buClr>
       <a:buFont typeface="Arial"/>
-      <a:defRPr b="0" i="0" sz="1400" u="none" cap="none" strike="noStrike">
+      <a:defRPr sz="1400" b="0" i="0" u="none" strike="noStrike" cap="none">
         <a:solidFill>
           <a:srgbClr val="000000"/>
         </a:solidFill>
@@ -86,7 +86,7 @@
         <a:sym typeface="Arial"/>
       </a:defRPr>
     </a:lvl2pPr>
-    <a:lvl3pPr lvl="2" marR="0" rtl="0" algn="l">
+    <a:lvl3pPr marR="0" lvl="2" algn="l" rtl="0">
       <a:lnSpc>
         <a:spcPct val="100000"/>
       </a:lnSpc>
@@ -100,7 +100,7 @@
         <a:srgbClr val="000000"/>
       </a:buClr>
       <a:buFont typeface="Arial"/>
-      <a:defRPr b="0" i="0" sz="1400" u="none" cap="none" strike="noStrike">
+      <a:defRPr sz="1400" b="0" i="0" u="none" strike="noStrike" cap="none">
         <a:solidFill>
           <a:srgbClr val="000000"/>
         </a:solidFill>
@@ -110,7 +110,7 @@
         <a:sym typeface="Arial"/>
       </a:defRPr>
     </a:lvl3pPr>
-    <a:lvl4pPr lvl="3" marR="0" rtl="0" algn="l">
+    <a:lvl4pPr marR="0" lvl="3" algn="l" rtl="0">
       <a:lnSpc>
         <a:spcPct val="100000"/>
       </a:lnSpc>
@@ -124,7 +124,7 @@
         <a:srgbClr val="000000"/>
       </a:buClr>
       <a:buFont typeface="Arial"/>
-      <a:defRPr b="0" i="0" sz="1400" u="none" cap="none" strike="noStrike">
+      <a:defRPr sz="1400" b="0" i="0" u="none" strike="noStrike" cap="none">
         <a:solidFill>
           <a:srgbClr val="000000"/>
         </a:solidFill>
@@ -134,7 +134,7 @@
         <a:sym typeface="Arial"/>
       </a:defRPr>
     </a:lvl4pPr>
-    <a:lvl5pPr lvl="4" marR="0" rtl="0" algn="l">
+    <a:lvl5pPr marR="0" lvl="4" algn="l" rtl="0">
       <a:lnSpc>
         <a:spcPct val="100000"/>
       </a:lnSpc>
@@ -148,7 +148,7 @@
         <a:srgbClr val="000000"/>
       </a:buClr>
       <a:buFont typeface="Arial"/>
-      <a:defRPr b="0" i="0" sz="1400" u="none" cap="none" strike="noStrike">
+      <a:defRPr sz="1400" b="0" i="0" u="none" strike="noStrike" cap="none">
         <a:solidFill>
           <a:srgbClr val="000000"/>
         </a:solidFill>
@@ -158,7 +158,7 @@
         <a:sym typeface="Arial"/>
       </a:defRPr>
     </a:lvl5pPr>
-    <a:lvl6pPr lvl="5" marR="0" rtl="0" algn="l">
+    <a:lvl6pPr marR="0" lvl="5" algn="l" rtl="0">
       <a:lnSpc>
         <a:spcPct val="100000"/>
       </a:lnSpc>
@@ -172,7 +172,7 @@
         <a:srgbClr val="000000"/>
       </a:buClr>
       <a:buFont typeface="Arial"/>
-      <a:defRPr b="0" i="0" sz="1400" u="none" cap="none" strike="noStrike">
+      <a:defRPr sz="1400" b="0" i="0" u="none" strike="noStrike" cap="none">
         <a:solidFill>
           <a:srgbClr val="000000"/>
         </a:solidFill>
@@ -182,7 +182,7 @@
         <a:sym typeface="Arial"/>
       </a:defRPr>
     </a:lvl6pPr>
-    <a:lvl7pPr lvl="6" marR="0" rtl="0" algn="l">
+    <a:lvl7pPr marR="0" lvl="6" algn="l" rtl="0">
       <a:lnSpc>
         <a:spcPct val="100000"/>
       </a:lnSpc>
@@ -196,7 +196,7 @@
         <a:srgbClr val="000000"/>
       </a:buClr>
       <a:buFont typeface="Arial"/>
-      <a:defRPr b="0" i="0" sz="1400" u="none" cap="none" strike="noStrike">
+      <a:defRPr sz="1400" b="0" i="0" u="none" strike="noStrike" cap="none">
         <a:solidFill>
           <a:srgbClr val="000000"/>
         </a:solidFill>
@@ -206,7 +206,7 @@
         <a:sym typeface="Arial"/>
       </a:defRPr>
     </a:lvl7pPr>
-    <a:lvl8pPr lvl="7" marR="0" rtl="0" algn="l">
+    <a:lvl8pPr marR="0" lvl="7" algn="l" rtl="0">
       <a:lnSpc>
         <a:spcPct val="100000"/>
       </a:lnSpc>
@@ -220,7 +220,7 @@
         <a:srgbClr val="000000"/>
       </a:buClr>
       <a:buFont typeface="Arial"/>
-      <a:defRPr b="0" i="0" sz="1400" u="none" cap="none" strike="noStrike">
+      <a:defRPr sz="1400" b="0" i="0" u="none" strike="noStrike" cap="none">
         <a:solidFill>
           <a:srgbClr val="000000"/>
         </a:solidFill>
@@ -230,7 +230,7 @@
         <a:sym typeface="Arial"/>
       </a:defRPr>
     </a:lvl8pPr>
-    <a:lvl9pPr lvl="8" marR="0" rtl="0" algn="l">
+    <a:lvl9pPr marR="0" lvl="8" algn="l" rtl="0">
       <a:lnSpc>
         <a:spcPct val="100000"/>
       </a:lnSpc>
@@ -244,7 +244,7 @@
         <a:srgbClr val="000000"/>
       </a:buClr>
       <a:buFont typeface="Arial"/>
-      <a:defRPr b="0" i="0" sz="1400" u="none" cap="none" strike="noStrike">
+      <a:defRPr sz="1400" b="0" i="0" u="none" strike="noStrike" cap="none">
         <a:solidFill>
           <a:srgbClr val="000000"/>
         </a:solidFill>
@@ -259,11 +259,16 @@
 </file>
 
 <file path=ppt/notesMasters/notesMaster1.xml><?xml version="1.0" encoding="utf-8"?>
-<p:notesMaster xmlns:a="http://schemas.openxmlformats.org/drawingml/2006/main" xmlns:r="http://schemas.openxmlformats.org/officeDocument/2006/relationships" xmlns:mc="http://schemas.openxmlformats.org/markup-compatibility/2006" xmlns:mv="urn:schemas-microsoft-com:mac:vml" xmlns:p="http://schemas.openxmlformats.org/presentationml/2006/main" xmlns:c="http://schemas.openxmlformats.org/drawingml/2006/chart" xmlns:dgm="http://schemas.openxmlformats.org/drawingml/2006/diagram" xmlns:o="urn:schemas-microsoft-com:office:office" xmlns:v="urn:schemas-microsoft-com:vml" xmlns:pvml="urn:schemas-microsoft-com:office:powerpoint" xmlns:com="http://schemas.openxmlformats.org/drawingml/2006/compatibility" xmlns:p14="http://schemas.microsoft.com/office/powerpoint/2010/main" xmlns:p15="http://schemas.microsoft.com/office/powerpoint/2012/main">
+<p:notesMaster xmlns:a="http://schemas.openxmlformats.org/drawingml/2006/main" xmlns:r="http://schemas.openxmlformats.org/officeDocument/2006/relationships" xmlns:p="http://schemas.openxmlformats.org/presentationml/2006/main">
   <p:cSld>
+    <p:bg>
+      <p:bgRef idx="1001">
+        <a:schemeClr val="bg1"/>
+      </p:bgRef>
+    </p:bg>
     <p:spTree>
       <p:nvGrpSpPr>
-        <p:cNvPr id="2" name="Shape 2"/>
+        <p:cNvPr id="1" name="Shape 2"/>
         <p:cNvGrpSpPr/>
         <p:nvPr/>
       </p:nvGrpSpPr>
@@ -278,9 +283,11 @@
       <p:sp>
         <p:nvSpPr>
           <p:cNvPr id="3" name="Google Shape;3;n"/>
-          <p:cNvSpPr/>
+          <p:cNvSpPr>
+            <a:spLocks noGrp="1" noRot="1" noChangeAspect="1"/>
+          </p:cNvSpPr>
           <p:nvPr>
-            <p:ph idx="2" type="sldImg"/>
+            <p:ph type="sldImg" idx="2"/>
           </p:nvPr>
         </p:nvSpPr>
         <p:spPr>
@@ -289,9 +296,13 @@
             <a:ext cx="6096075" cy="3429000"/>
           </a:xfrm>
           <a:custGeom>
-            <a:rect b="b" l="l" r="r" t="t"/>
+            <a:avLst/>
+            <a:gdLst/>
+            <a:ahLst/>
+            <a:cxnLst/>
+            <a:rect l="l" t="t" r="r" b="b"/>
             <a:pathLst>
-              <a:path extrusionOk="0" h="120000" w="120000">
+              <a:path w="120000" h="120000" extrusionOk="0">
                 <a:moveTo>
                   <a:pt x="0" y="0"/>
                 </a:moveTo>
@@ -309,23 +320,25 @@
             </a:pathLst>
           </a:custGeom>
           <a:noFill/>
-          <a:ln cap="flat" cmpd="sng" w="9525">
+          <a:ln w="9525" cap="flat" cmpd="sng">
             <a:solidFill>
               <a:srgbClr val="000000"/>
             </a:solidFill>
             <a:prstDash val="solid"/>
             <a:round/>
-            <a:headEnd len="sm" w="sm" type="none"/>
-            <a:tailEnd len="sm" w="sm" type="none"/>
+            <a:headEnd type="none" w="sm" len="sm"/>
+            <a:tailEnd type="none" w="sm" len="sm"/>
           </a:ln>
         </p:spPr>
       </p:sp>
       <p:sp>
         <p:nvSpPr>
           <p:cNvPr id="4" name="Google Shape;4;n"/>
-          <p:cNvSpPr txBox="1"/>
+          <p:cNvSpPr txBox="1">
+            <a:spLocks noGrp="1"/>
+          </p:cNvSpPr>
           <p:nvPr>
-            <p:ph idx="1" type="body"/>
+            <p:ph type="body" idx="1"/>
           </p:nvPr>
         </p:nvSpPr>
         <p:spPr>
@@ -342,9 +355,9 @@
           </a:ln>
         </p:spPr>
         <p:txBody>
-          <a:bodyPr anchorCtr="0" anchor="t" bIns="91425" lIns="91425" spcFirstLastPara="1" rIns="91425" wrap="square" tIns="91425"/>
+          <a:bodyPr spcFirstLastPara="1" wrap="square" lIns="91425" tIns="91425" rIns="91425" bIns="91425" anchor="t" anchorCtr="0"/>
           <a:lstStyle>
-            <a:lvl1pPr indent="-298450" lvl="0" marL="457200">
+            <a:lvl1pPr marL="457200" lvl="0" indent="-298450">
               <a:spcBef>
                 <a:spcPts val="0"/>
               </a:spcBef>
@@ -355,7 +368,7 @@
               <a:buChar char="●"/>
               <a:defRPr sz="1100"/>
             </a:lvl1pPr>
-            <a:lvl2pPr indent="-298450" lvl="1" marL="914400">
+            <a:lvl2pPr marL="914400" lvl="1" indent="-298450">
               <a:spcBef>
                 <a:spcPts val="0"/>
               </a:spcBef>
@@ -366,7 +379,7 @@
               <a:buChar char="○"/>
               <a:defRPr sz="1100"/>
             </a:lvl2pPr>
-            <a:lvl3pPr indent="-298450" lvl="2" marL="1371600">
+            <a:lvl3pPr marL="1371600" lvl="2" indent="-298450">
               <a:spcBef>
                 <a:spcPts val="0"/>
               </a:spcBef>
@@ -377,7 +390,7 @@
               <a:buChar char="■"/>
               <a:defRPr sz="1100"/>
             </a:lvl3pPr>
-            <a:lvl4pPr indent="-298450" lvl="3" marL="1828800">
+            <a:lvl4pPr marL="1828800" lvl="3" indent="-298450">
               <a:spcBef>
                 <a:spcPts val="0"/>
               </a:spcBef>
@@ -388,7 +401,7 @@
               <a:buChar char="●"/>
               <a:defRPr sz="1100"/>
             </a:lvl4pPr>
-            <a:lvl5pPr indent="-298450" lvl="4" marL="2286000">
+            <a:lvl5pPr marL="2286000" lvl="4" indent="-298450">
               <a:spcBef>
                 <a:spcPts val="0"/>
               </a:spcBef>
@@ -399,7 +412,7 @@
               <a:buChar char="○"/>
               <a:defRPr sz="1100"/>
             </a:lvl5pPr>
-            <a:lvl6pPr indent="-298450" lvl="5" marL="2743200">
+            <a:lvl6pPr marL="2743200" lvl="5" indent="-298450">
               <a:spcBef>
                 <a:spcPts val="0"/>
               </a:spcBef>
@@ -410,7 +423,7 @@
               <a:buChar char="■"/>
               <a:defRPr sz="1100"/>
             </a:lvl6pPr>
-            <a:lvl7pPr indent="-298450" lvl="6" marL="3200400">
+            <a:lvl7pPr marL="3200400" lvl="6" indent="-298450">
               <a:spcBef>
                 <a:spcPts val="0"/>
               </a:spcBef>
@@ -421,7 +434,7 @@
               <a:buChar char="●"/>
               <a:defRPr sz="1100"/>
             </a:lvl7pPr>
-            <a:lvl8pPr indent="-298450" lvl="7" marL="3657600">
+            <a:lvl8pPr marL="3657600" lvl="7" indent="-298450">
               <a:spcBef>
                 <a:spcPts val="0"/>
               </a:spcBef>
@@ -432,7 +445,7 @@
               <a:buChar char="○"/>
               <a:defRPr sz="1100"/>
             </a:lvl8pPr>
-            <a:lvl9pPr indent="-298450" lvl="8" marL="4114800">
+            <a:lvl9pPr marL="4114800" lvl="8" indent="-298450">
               <a:spcBef>
                 <a:spcPts val="0"/>
               </a:spcBef>
@@ -444,14 +457,16 @@
               <a:defRPr sz="1100"/>
             </a:lvl9pPr>
           </a:lstStyle>
-          <a:p/>
+          <a:p>
+            <a:endParaRPr/>
+          </a:p>
         </p:txBody>
       </p:sp>
     </p:spTree>
   </p:cSld>
-  <p:clrMap accent1="accent1" accent2="accent2" accent3="accent3" accent4="accent4" accent5="accent5" accent6="accent6" bg1="lt1" bg2="dk2" tx1="dk1" tx2="lt2" folHlink="folHlink" hlink="hlink"/>
+  <p:clrMap bg1="lt1" tx1="dk1" bg2="dk2" tx2="lt2" accent1="accent1" accent2="accent2" accent3="accent3" accent4="accent4" accent5="accent5" accent6="accent6" hlink="hlink" folHlink="folHlink"/>
   <p:notesStyle>
-    <a:defPPr lvl="0" marR="0" rtl="0" algn="l">
+    <a:defPPr marR="0" lvl="0" algn="l" rtl="0">
       <a:lnSpc>
         <a:spcPct val="100000"/>
       </a:lnSpc>
@@ -462,7 +477,7 @@
         <a:spcPts val="0"/>
       </a:spcAft>
     </a:defPPr>
-    <a:lvl1pPr lvl="0" marR="0" rtl="0" algn="l">
+    <a:lvl1pPr marR="0" lvl="0" algn="l" rtl="0">
       <a:lnSpc>
         <a:spcPct val="100000"/>
       </a:lnSpc>
@@ -476,7 +491,7 @@
         <a:srgbClr val="000000"/>
       </a:buClr>
       <a:buFont typeface="Arial"/>
-      <a:defRPr b="0" i="0" sz="1400" u="none" cap="none" strike="noStrike">
+      <a:defRPr sz="1400" b="0" i="0" u="none" strike="noStrike" cap="none">
         <a:solidFill>
           <a:srgbClr val="000000"/>
         </a:solidFill>
@@ -486,7 +501,7 @@
         <a:sym typeface="Arial"/>
       </a:defRPr>
     </a:lvl1pPr>
-    <a:lvl2pPr lvl="1" marR="0" rtl="0" algn="l">
+    <a:lvl2pPr marR="0" lvl="1" algn="l" rtl="0">
       <a:lnSpc>
         <a:spcPct val="100000"/>
       </a:lnSpc>
@@ -500,7 +515,7 @@
         <a:srgbClr val="000000"/>
       </a:buClr>
       <a:buFont typeface="Arial"/>
-      <a:defRPr b="0" i="0" sz="1400" u="none" cap="none" strike="noStrike">
+      <a:defRPr sz="1400" b="0" i="0" u="none" strike="noStrike" cap="none">
         <a:solidFill>
           <a:srgbClr val="000000"/>
         </a:solidFill>
@@ -510,7 +525,7 @@
         <a:sym typeface="Arial"/>
       </a:defRPr>
     </a:lvl2pPr>
-    <a:lvl3pPr lvl="2" marR="0" rtl="0" algn="l">
+    <a:lvl3pPr marR="0" lvl="2" algn="l" rtl="0">
       <a:lnSpc>
         <a:spcPct val="100000"/>
       </a:lnSpc>
@@ -524,7 +539,7 @@
         <a:srgbClr val="000000"/>
       </a:buClr>
       <a:buFont typeface="Arial"/>
-      <a:defRPr b="0" i="0" sz="1400" u="none" cap="none" strike="noStrike">
+      <a:defRPr sz="1400" b="0" i="0" u="none" strike="noStrike" cap="none">
         <a:solidFill>
           <a:srgbClr val="000000"/>
         </a:solidFill>
@@ -534,7 +549,7 @@
         <a:sym typeface="Arial"/>
       </a:defRPr>
     </a:lvl3pPr>
-    <a:lvl4pPr lvl="3" marR="0" rtl="0" algn="l">
+    <a:lvl4pPr marR="0" lvl="3" algn="l" rtl="0">
       <a:lnSpc>
         <a:spcPct val="100000"/>
       </a:lnSpc>
@@ -548,7 +563,7 @@
         <a:srgbClr val="000000"/>
       </a:buClr>
       <a:buFont typeface="Arial"/>
-      <a:defRPr b="0" i="0" sz="1400" u="none" cap="none" strike="noStrike">
+      <a:defRPr sz="1400" b="0" i="0" u="none" strike="noStrike" cap="none">
         <a:solidFill>
           <a:srgbClr val="000000"/>
         </a:solidFill>
@@ -558,7 +573,7 @@
         <a:sym typeface="Arial"/>
       </a:defRPr>
     </a:lvl4pPr>
-    <a:lvl5pPr lvl="4" marR="0" rtl="0" algn="l">
+    <a:lvl5pPr marR="0" lvl="4" algn="l" rtl="0">
       <a:lnSpc>
         <a:spcPct val="100000"/>
       </a:lnSpc>
@@ -572,7 +587,7 @@
         <a:srgbClr val="000000"/>
       </a:buClr>
       <a:buFont typeface="Arial"/>
-      <a:defRPr b="0" i="0" sz="1400" u="none" cap="none" strike="noStrike">
+      <a:defRPr sz="1400" b="0" i="0" u="none" strike="noStrike" cap="none">
         <a:solidFill>
           <a:srgbClr val="000000"/>
         </a:solidFill>
@@ -582,7 +597,7 @@
         <a:sym typeface="Arial"/>
       </a:defRPr>
     </a:lvl5pPr>
-    <a:lvl6pPr lvl="5" marR="0" rtl="0" algn="l">
+    <a:lvl6pPr marR="0" lvl="5" algn="l" rtl="0">
       <a:lnSpc>
         <a:spcPct val="100000"/>
       </a:lnSpc>
@@ -596,7 +611,7 @@
         <a:srgbClr val="000000"/>
       </a:buClr>
       <a:buFont typeface="Arial"/>
-      <a:defRPr b="0" i="0" sz="1400" u="none" cap="none" strike="noStrike">
+      <a:defRPr sz="1400" b="0" i="0" u="none" strike="noStrike" cap="none">
         <a:solidFill>
           <a:srgbClr val="000000"/>
         </a:solidFill>
@@ -606,7 +621,7 @@
         <a:sym typeface="Arial"/>
       </a:defRPr>
     </a:lvl6pPr>
-    <a:lvl7pPr lvl="6" marR="0" rtl="0" algn="l">
+    <a:lvl7pPr marR="0" lvl="6" algn="l" rtl="0">
       <a:lnSpc>
         <a:spcPct val="100000"/>
       </a:lnSpc>
@@ -620,7 +635,7 @@
         <a:srgbClr val="000000"/>
       </a:buClr>
       <a:buFont typeface="Arial"/>
-      <a:defRPr b="0" i="0" sz="1400" u="none" cap="none" strike="noStrike">
+      <a:defRPr sz="1400" b="0" i="0" u="none" strike="noStrike" cap="none">
         <a:solidFill>
           <a:srgbClr val="000000"/>
         </a:solidFill>
@@ -630,7 +645,7 @@
         <a:sym typeface="Arial"/>
       </a:defRPr>
     </a:lvl7pPr>
-    <a:lvl8pPr lvl="7" marR="0" rtl="0" algn="l">
+    <a:lvl8pPr marR="0" lvl="7" algn="l" rtl="0">
       <a:lnSpc>
         <a:spcPct val="100000"/>
       </a:lnSpc>
@@ -644,7 +659,7 @@
         <a:srgbClr val="000000"/>
       </a:buClr>
       <a:buFont typeface="Arial"/>
-      <a:defRPr b="0" i="0" sz="1400" u="none" cap="none" strike="noStrike">
+      <a:defRPr sz="1400" b="0" i="0" u="none" strike="noStrike" cap="none">
         <a:solidFill>
           <a:srgbClr val="000000"/>
         </a:solidFill>
@@ -654,7 +669,7 @@
         <a:sym typeface="Arial"/>
       </a:defRPr>
     </a:lvl8pPr>
-    <a:lvl9pPr lvl="8" marR="0" rtl="0" algn="l">
+    <a:lvl9pPr marR="0" lvl="8" algn="l" rtl="0">
       <a:lnSpc>
         <a:spcPct val="100000"/>
       </a:lnSpc>
@@ -668,7 +683,7 @@
         <a:srgbClr val="000000"/>
       </a:buClr>
       <a:buFont typeface="Arial"/>
-      <a:defRPr b="0" i="0" sz="1400" u="none" cap="none" strike="noStrike">
+      <a:defRPr sz="1400" b="0" i="0" u="none" strike="noStrike" cap="none">
         <a:solidFill>
           <a:srgbClr val="000000"/>
         </a:solidFill>
@@ -683,11 +698,11 @@
 </file>
 
 <file path=ppt/notesSlides/notesSlide1.xml><?xml version="1.0" encoding="utf-8"?>
-<p:notes xmlns:a="http://schemas.openxmlformats.org/drawingml/2006/main" xmlns:r="http://schemas.openxmlformats.org/officeDocument/2006/relationships" xmlns:mc="http://schemas.openxmlformats.org/markup-compatibility/2006" xmlns:mv="urn:schemas-microsoft-com:mac:vml" xmlns:p="http://schemas.openxmlformats.org/presentationml/2006/main" xmlns:c="http://schemas.openxmlformats.org/drawingml/2006/chart" xmlns:dgm="http://schemas.openxmlformats.org/drawingml/2006/diagram" xmlns:o="urn:schemas-microsoft-com:office:office" xmlns:v="urn:schemas-microsoft-com:vml" xmlns:pvml="urn:schemas-microsoft-com:office:powerpoint" xmlns:com="http://schemas.openxmlformats.org/drawingml/2006/compatibility" xmlns:p14="http://schemas.microsoft.com/office/powerpoint/2010/main" xmlns:p15="http://schemas.microsoft.com/office/powerpoint/2012/main" showMasterPhAnim="0" showMasterSp="0">
+<p:notes xmlns:a="http://schemas.openxmlformats.org/drawingml/2006/main" xmlns:r="http://schemas.openxmlformats.org/officeDocument/2006/relationships" xmlns:p="http://schemas.openxmlformats.org/presentationml/2006/main" showMasterSp="0" showMasterPhAnim="0">
   <p:cSld>
     <p:spTree>
       <p:nvGrpSpPr>
-        <p:cNvPr id="55" name="Shape 55"/>
+        <p:cNvPr id="1" name="Shape 55"/>
         <p:cNvGrpSpPr/>
         <p:nvPr/>
       </p:nvGrpSpPr>
@@ -702,9 +717,11 @@
       <p:sp>
         <p:nvSpPr>
           <p:cNvPr id="56" name="Google Shape;56;p:notes"/>
-          <p:cNvSpPr/>
+          <p:cNvSpPr>
+            <a:spLocks noGrp="1" noRot="1" noChangeAspect="1"/>
+          </p:cNvSpPr>
           <p:nvPr>
-            <p:ph idx="2" type="sldImg"/>
+            <p:ph type="sldImg" idx="2"/>
           </p:nvPr>
         </p:nvSpPr>
         <p:spPr>
@@ -713,9 +730,13 @@
             <a:ext cx="6096075" cy="3429000"/>
           </a:xfrm>
           <a:custGeom>
-            <a:rect b="b" l="l" r="r" t="t"/>
+            <a:avLst/>
+            <a:gdLst/>
+            <a:ahLst/>
+            <a:cxnLst/>
+            <a:rect l="l" t="t" r="r" b="b"/>
             <a:pathLst>
-              <a:path extrusionOk="0" h="120000" w="120000">
+              <a:path w="120000" h="120000" extrusionOk="0">
                 <a:moveTo>
                   <a:pt x="0" y="0"/>
                 </a:moveTo>
@@ -737,9 +758,11 @@
       <p:sp>
         <p:nvSpPr>
           <p:cNvPr id="57" name="Google Shape;57;p:notes"/>
-          <p:cNvSpPr txBox="1"/>
+          <p:cNvSpPr txBox="1">
+            <a:spLocks noGrp="1"/>
+          </p:cNvSpPr>
           <p:nvPr>
-            <p:ph idx="1" type="body"/>
+            <p:ph type="body" idx="1"/>
           </p:nvPr>
         </p:nvSpPr>
         <p:spPr>
@@ -752,12 +775,12 @@
           </a:prstGeom>
         </p:spPr>
         <p:txBody>
-          <a:bodyPr anchorCtr="0" anchor="t" bIns="91425" lIns="91425" spcFirstLastPara="1" rIns="91425" wrap="square" tIns="91425">
+          <a:bodyPr spcFirstLastPara="1" wrap="square" lIns="91425" tIns="91425" rIns="91425" bIns="91425" anchor="t" anchorCtr="0">
             <a:noAutofit/>
           </a:bodyPr>
           <a:lstStyle/>
           <a:p>
-            <a:pPr indent="0" lvl="0" marL="0" rtl="0" algn="l">
+            <a:pPr marL="0" lvl="0" indent="0" algn="l" rtl="0">
               <a:spcBef>
                 <a:spcPts val="0"/>
               </a:spcBef>
@@ -766,9 +789,6 @@
               </a:spcAft>
               <a:buNone/>
             </a:pPr>
-            <a:r>
-              <a:t/>
-            </a:r>
             <a:endParaRPr/>
           </a:p>
         </p:txBody>
@@ -782,110 +802,11 @@
 </file>
 
 <file path=ppt/notesSlides/notesSlide2.xml><?xml version="1.0" encoding="utf-8"?>
-<p:notes xmlns:a="http://schemas.openxmlformats.org/drawingml/2006/main" xmlns:r="http://schemas.openxmlformats.org/officeDocument/2006/relationships" xmlns:mc="http://schemas.openxmlformats.org/markup-compatibility/2006" xmlns:mv="urn:schemas-microsoft-com:mac:vml" xmlns:p="http://schemas.openxmlformats.org/presentationml/2006/main" xmlns:c="http://schemas.openxmlformats.org/drawingml/2006/chart" xmlns:dgm="http://schemas.openxmlformats.org/drawingml/2006/diagram" xmlns:o="urn:schemas-microsoft-com:office:office" xmlns:v="urn:schemas-microsoft-com:vml" xmlns:pvml="urn:schemas-microsoft-com:office:powerpoint" xmlns:com="http://schemas.openxmlformats.org/drawingml/2006/compatibility" xmlns:p14="http://schemas.microsoft.com/office/powerpoint/2010/main" xmlns:p15="http://schemas.microsoft.com/office/powerpoint/2012/main" showMasterPhAnim="0" showMasterSp="0">
+<p:notes xmlns:a="http://schemas.openxmlformats.org/drawingml/2006/main" xmlns:r="http://schemas.openxmlformats.org/officeDocument/2006/relationships" xmlns:p="http://schemas.openxmlformats.org/presentationml/2006/main" showMasterSp="0" showMasterPhAnim="0">
   <p:cSld>
     <p:spTree>
       <p:nvGrpSpPr>
-        <p:cNvPr id="61" name="Shape 61"/>
-        <p:cNvGrpSpPr/>
-        <p:nvPr/>
-      </p:nvGrpSpPr>
-      <p:grpSpPr>
-        <a:xfrm>
-          <a:off x="0" y="0"/>
-          <a:ext cx="0" cy="0"/>
-          <a:chOff x="0" y="0"/>
-          <a:chExt cx="0" cy="0"/>
-        </a:xfrm>
-      </p:grpSpPr>
-      <p:sp>
-        <p:nvSpPr>
-          <p:cNvPr id="62" name="Google Shape;62;g4cc8b7df64_0_0:notes"/>
-          <p:cNvSpPr/>
-          <p:nvPr>
-            <p:ph idx="2" type="sldImg"/>
-          </p:nvPr>
-        </p:nvSpPr>
-        <p:spPr>
-          <a:xfrm>
-            <a:off x="381300" y="685800"/>
-            <a:ext cx="6096000" cy="3429000"/>
-          </a:xfrm>
-          <a:custGeom>
-            <a:rect b="b" l="l" r="r" t="t"/>
-            <a:pathLst>
-              <a:path extrusionOk="0" h="120000" w="120000">
-                <a:moveTo>
-                  <a:pt x="0" y="0"/>
-                </a:moveTo>
-                <a:lnTo>
-                  <a:pt x="120000" y="0"/>
-                </a:lnTo>
-                <a:lnTo>
-                  <a:pt x="120000" y="120000"/>
-                </a:lnTo>
-                <a:lnTo>
-                  <a:pt x="0" y="120000"/>
-                </a:lnTo>
-                <a:close/>
-              </a:path>
-            </a:pathLst>
-          </a:custGeom>
-        </p:spPr>
-      </p:sp>
-      <p:sp>
-        <p:nvSpPr>
-          <p:cNvPr id="63" name="Google Shape;63;g4cc8b7df64_0_0:notes"/>
-          <p:cNvSpPr txBox="1"/>
-          <p:nvPr>
-            <p:ph idx="1" type="body"/>
-          </p:nvPr>
-        </p:nvSpPr>
-        <p:spPr>
-          <a:xfrm>
-            <a:off x="685800" y="4343400"/>
-            <a:ext cx="5486400" cy="4114800"/>
-          </a:xfrm>
-          <a:prstGeom prst="rect">
-            <a:avLst/>
-          </a:prstGeom>
-        </p:spPr>
-        <p:txBody>
-          <a:bodyPr anchorCtr="0" anchor="t" bIns="91425" lIns="91425" spcFirstLastPara="1" rIns="91425" wrap="square" tIns="91425">
-            <a:noAutofit/>
-          </a:bodyPr>
-          <a:lstStyle/>
-          <a:p>
-            <a:pPr indent="0" lvl="0" marL="0" rtl="0" algn="l">
-              <a:spcBef>
-                <a:spcPts val="0"/>
-              </a:spcBef>
-              <a:spcAft>
-                <a:spcPts val="0"/>
-              </a:spcAft>
-              <a:buNone/>
-            </a:pPr>
-            <a:r>
-              <a:t/>
-            </a:r>
-            <a:endParaRPr/>
-          </a:p>
-        </p:txBody>
-      </p:sp>
-    </p:spTree>
-  </p:cSld>
-  <p:clrMapOvr>
-    <a:masterClrMapping/>
-  </p:clrMapOvr>
-</p:notes>
-</file>
-
-<file path=ppt/notesSlides/notesSlide3.xml><?xml version="1.0" encoding="utf-8"?>
-<p:notes xmlns:a="http://schemas.openxmlformats.org/drawingml/2006/main" xmlns:r="http://schemas.openxmlformats.org/officeDocument/2006/relationships" xmlns:mc="http://schemas.openxmlformats.org/markup-compatibility/2006" xmlns:mv="urn:schemas-microsoft-com:mac:vml" xmlns:p="http://schemas.openxmlformats.org/presentationml/2006/main" xmlns:c="http://schemas.openxmlformats.org/drawingml/2006/chart" xmlns:dgm="http://schemas.openxmlformats.org/drawingml/2006/diagram" xmlns:o="urn:schemas-microsoft-com:office:office" xmlns:v="urn:schemas-microsoft-com:vml" xmlns:pvml="urn:schemas-microsoft-com:office:powerpoint" xmlns:com="http://schemas.openxmlformats.org/drawingml/2006/compatibility" xmlns:p14="http://schemas.microsoft.com/office/powerpoint/2010/main" xmlns:p15="http://schemas.microsoft.com/office/powerpoint/2012/main" showMasterPhAnim="0" showMasterSp="0">
-  <p:cSld>
-    <p:spTree>
-      <p:nvGrpSpPr>
-        <p:cNvPr id="67" name="Shape 67"/>
+        <p:cNvPr id="1" name="Shape 67"/>
         <p:cNvGrpSpPr/>
         <p:nvPr/>
       </p:nvGrpSpPr>
@@ -900,9 +821,11 @@
       <p:sp>
         <p:nvSpPr>
           <p:cNvPr id="68" name="Google Shape;68;g4f135e4081_0_5:notes"/>
-          <p:cNvSpPr/>
+          <p:cNvSpPr>
+            <a:spLocks noGrp="1" noRot="1" noChangeAspect="1"/>
+          </p:cNvSpPr>
           <p:nvPr>
-            <p:ph idx="2" type="sldImg"/>
+            <p:ph type="sldImg" idx="2"/>
           </p:nvPr>
         </p:nvSpPr>
         <p:spPr>
@@ -911,9 +834,13 @@
             <a:ext cx="6096000" cy="3429000"/>
           </a:xfrm>
           <a:custGeom>
-            <a:rect b="b" l="l" r="r" t="t"/>
+            <a:avLst/>
+            <a:gdLst/>
+            <a:ahLst/>
+            <a:cxnLst/>
+            <a:rect l="l" t="t" r="r" b="b"/>
             <a:pathLst>
-              <a:path extrusionOk="0" h="120000" w="120000">
+              <a:path w="120000" h="120000" extrusionOk="0">
                 <a:moveTo>
                   <a:pt x="0" y="0"/>
                 </a:moveTo>
@@ -935,9 +862,11 @@
       <p:sp>
         <p:nvSpPr>
           <p:cNvPr id="69" name="Google Shape;69;g4f135e4081_0_5:notes"/>
-          <p:cNvSpPr txBox="1"/>
+          <p:cNvSpPr txBox="1">
+            <a:spLocks noGrp="1"/>
+          </p:cNvSpPr>
           <p:nvPr>
-            <p:ph idx="1" type="body"/>
+            <p:ph type="body" idx="1"/>
           </p:nvPr>
         </p:nvSpPr>
         <p:spPr>
@@ -950,12 +879,12 @@
           </a:prstGeom>
         </p:spPr>
         <p:txBody>
-          <a:bodyPr anchorCtr="0" anchor="t" bIns="91425" lIns="91425" spcFirstLastPara="1" rIns="91425" wrap="square" tIns="91425">
+          <a:bodyPr spcFirstLastPara="1" wrap="square" lIns="91425" tIns="91425" rIns="91425" bIns="91425" anchor="t" anchorCtr="0">
             <a:noAutofit/>
           </a:bodyPr>
           <a:lstStyle/>
           <a:p>
-            <a:pPr indent="0" lvl="0" marL="0" rtl="0" algn="l">
+            <a:pPr marL="0" lvl="0" indent="0" algn="l" rtl="0">
               <a:spcBef>
                 <a:spcPts val="0"/>
               </a:spcBef>
@@ -964,9 +893,6 @@
               </a:spcAft>
               <a:buNone/>
             </a:pPr>
-            <a:r>
-              <a:t/>
-            </a:r>
             <a:endParaRPr/>
           </a:p>
         </p:txBody>
@@ -979,12 +905,12 @@
 </p:notes>
 </file>
 
-<file path=ppt/notesSlides/notesSlide4.xml><?xml version="1.0" encoding="utf-8"?>
-<p:notes xmlns:a="http://schemas.openxmlformats.org/drawingml/2006/main" xmlns:r="http://schemas.openxmlformats.org/officeDocument/2006/relationships" xmlns:mc="http://schemas.openxmlformats.org/markup-compatibility/2006" xmlns:mv="urn:schemas-microsoft-com:mac:vml" xmlns:p="http://schemas.openxmlformats.org/presentationml/2006/main" xmlns:c="http://schemas.openxmlformats.org/drawingml/2006/chart" xmlns:dgm="http://schemas.openxmlformats.org/drawingml/2006/diagram" xmlns:o="urn:schemas-microsoft-com:office:office" xmlns:v="urn:schemas-microsoft-com:vml" xmlns:pvml="urn:schemas-microsoft-com:office:powerpoint" xmlns:com="http://schemas.openxmlformats.org/drawingml/2006/compatibility" xmlns:p14="http://schemas.microsoft.com/office/powerpoint/2010/main" xmlns:p15="http://schemas.microsoft.com/office/powerpoint/2012/main" showMasterPhAnim="0" showMasterSp="0">
+<file path=ppt/notesSlides/notesSlide3.xml><?xml version="1.0" encoding="utf-8"?>
+<p:notes xmlns:a="http://schemas.openxmlformats.org/drawingml/2006/main" xmlns:r="http://schemas.openxmlformats.org/officeDocument/2006/relationships" xmlns:p="http://schemas.openxmlformats.org/presentationml/2006/main" showMasterSp="0" showMasterPhAnim="0">
   <p:cSld>
     <p:spTree>
       <p:nvGrpSpPr>
-        <p:cNvPr id="73" name="Shape 73"/>
+        <p:cNvPr id="1" name="Shape 73"/>
         <p:cNvGrpSpPr/>
         <p:nvPr/>
       </p:nvGrpSpPr>
@@ -999,9 +925,11 @@
       <p:sp>
         <p:nvSpPr>
           <p:cNvPr id="74" name="Google Shape;74;g4cc8b7df64_0_5:notes"/>
-          <p:cNvSpPr/>
+          <p:cNvSpPr>
+            <a:spLocks noGrp="1" noRot="1" noChangeAspect="1"/>
+          </p:cNvSpPr>
           <p:nvPr>
-            <p:ph idx="2" type="sldImg"/>
+            <p:ph type="sldImg" idx="2"/>
           </p:nvPr>
         </p:nvSpPr>
         <p:spPr>
@@ -1010,9 +938,13 @@
             <a:ext cx="6096000" cy="3429000"/>
           </a:xfrm>
           <a:custGeom>
-            <a:rect b="b" l="l" r="r" t="t"/>
+            <a:avLst/>
+            <a:gdLst/>
+            <a:ahLst/>
+            <a:cxnLst/>
+            <a:rect l="l" t="t" r="r" b="b"/>
             <a:pathLst>
-              <a:path extrusionOk="0" h="120000" w="120000">
+              <a:path w="120000" h="120000" extrusionOk="0">
                 <a:moveTo>
                   <a:pt x="0" y="0"/>
                 </a:moveTo>
@@ -1034,9 +966,11 @@
       <p:sp>
         <p:nvSpPr>
           <p:cNvPr id="75" name="Google Shape;75;g4cc8b7df64_0_5:notes"/>
-          <p:cNvSpPr txBox="1"/>
+          <p:cNvSpPr txBox="1">
+            <a:spLocks noGrp="1"/>
+          </p:cNvSpPr>
           <p:nvPr>
-            <p:ph idx="1" type="body"/>
+            <p:ph type="body" idx="1"/>
           </p:nvPr>
         </p:nvSpPr>
         <p:spPr>
@@ -1049,12 +983,12 @@
           </a:prstGeom>
         </p:spPr>
         <p:txBody>
-          <a:bodyPr anchorCtr="0" anchor="t" bIns="91425" lIns="91425" spcFirstLastPara="1" rIns="91425" wrap="square" tIns="91425">
+          <a:bodyPr spcFirstLastPara="1" wrap="square" lIns="91425" tIns="91425" rIns="91425" bIns="91425" anchor="t" anchorCtr="0">
             <a:noAutofit/>
           </a:bodyPr>
           <a:lstStyle/>
           <a:p>
-            <a:pPr indent="0" lvl="0" marL="0" rtl="0" algn="l">
+            <a:pPr marL="0" lvl="0" indent="0" algn="l" rtl="0">
               <a:spcBef>
                 <a:spcPts val="0"/>
               </a:spcBef>
@@ -1063,9 +997,6 @@
               </a:spcAft>
               <a:buNone/>
             </a:pPr>
-            <a:r>
-              <a:t/>
-            </a:r>
             <a:endParaRPr/>
           </a:p>
         </p:txBody>
@@ -1078,12 +1009,12 @@
 </p:notes>
 </file>
 
-<file path=ppt/notesSlides/notesSlide5.xml><?xml version="1.0" encoding="utf-8"?>
-<p:notes xmlns:a="http://schemas.openxmlformats.org/drawingml/2006/main" xmlns:r="http://schemas.openxmlformats.org/officeDocument/2006/relationships" xmlns:mc="http://schemas.openxmlformats.org/markup-compatibility/2006" xmlns:mv="urn:schemas-microsoft-com:mac:vml" xmlns:p="http://schemas.openxmlformats.org/presentationml/2006/main" xmlns:c="http://schemas.openxmlformats.org/drawingml/2006/chart" xmlns:dgm="http://schemas.openxmlformats.org/drawingml/2006/diagram" xmlns:o="urn:schemas-microsoft-com:office:office" xmlns:v="urn:schemas-microsoft-com:vml" xmlns:pvml="urn:schemas-microsoft-com:office:powerpoint" xmlns:com="http://schemas.openxmlformats.org/drawingml/2006/compatibility" xmlns:p14="http://schemas.microsoft.com/office/powerpoint/2010/main" xmlns:p15="http://schemas.microsoft.com/office/powerpoint/2012/main" showMasterPhAnim="0" showMasterSp="0">
+<file path=ppt/notesSlides/notesSlide4.xml><?xml version="1.0" encoding="utf-8"?>
+<p:notes xmlns:a="http://schemas.openxmlformats.org/drawingml/2006/main" xmlns:r="http://schemas.openxmlformats.org/officeDocument/2006/relationships" xmlns:p="http://schemas.openxmlformats.org/presentationml/2006/main" showMasterSp="0" showMasterPhAnim="0">
   <p:cSld>
     <p:spTree>
       <p:nvGrpSpPr>
-        <p:cNvPr id="79" name="Shape 79"/>
+        <p:cNvPr id="1" name="Shape 79"/>
         <p:cNvGrpSpPr/>
         <p:nvPr/>
       </p:nvGrpSpPr>
@@ -1098,9 +1029,11 @@
       <p:sp>
         <p:nvSpPr>
           <p:cNvPr id="80" name="Google Shape;80;g4cc8b7df64_0_130:notes"/>
-          <p:cNvSpPr/>
+          <p:cNvSpPr>
+            <a:spLocks noGrp="1" noRot="1" noChangeAspect="1"/>
+          </p:cNvSpPr>
           <p:nvPr>
-            <p:ph idx="2" type="sldImg"/>
+            <p:ph type="sldImg" idx="2"/>
           </p:nvPr>
         </p:nvSpPr>
         <p:spPr>
@@ -1109,9 +1042,13 @@
             <a:ext cx="6096000" cy="3429000"/>
           </a:xfrm>
           <a:custGeom>
-            <a:rect b="b" l="l" r="r" t="t"/>
+            <a:avLst/>
+            <a:gdLst/>
+            <a:ahLst/>
+            <a:cxnLst/>
+            <a:rect l="l" t="t" r="r" b="b"/>
             <a:pathLst>
-              <a:path extrusionOk="0" h="120000" w="120000">
+              <a:path w="120000" h="120000" extrusionOk="0">
                 <a:moveTo>
                   <a:pt x="0" y="0"/>
                 </a:moveTo>
@@ -1133,9 +1070,11 @@
       <p:sp>
         <p:nvSpPr>
           <p:cNvPr id="81" name="Google Shape;81;g4cc8b7df64_0_130:notes"/>
-          <p:cNvSpPr txBox="1"/>
+          <p:cNvSpPr txBox="1">
+            <a:spLocks noGrp="1"/>
+          </p:cNvSpPr>
           <p:nvPr>
-            <p:ph idx="1" type="body"/>
+            <p:ph type="body" idx="1"/>
           </p:nvPr>
         </p:nvSpPr>
         <p:spPr>
@@ -1148,12 +1087,12 @@
           </a:prstGeom>
         </p:spPr>
         <p:txBody>
-          <a:bodyPr anchorCtr="0" anchor="t" bIns="91425" lIns="91425" spcFirstLastPara="1" rIns="91425" wrap="square" tIns="91425">
+          <a:bodyPr spcFirstLastPara="1" wrap="square" lIns="91425" tIns="91425" rIns="91425" bIns="91425" anchor="t" anchorCtr="0">
             <a:noAutofit/>
           </a:bodyPr>
           <a:lstStyle/>
           <a:p>
-            <a:pPr indent="0" lvl="0" marL="0" rtl="0" algn="l">
+            <a:pPr marL="0" lvl="0" indent="0" algn="l" rtl="0">
               <a:spcBef>
                 <a:spcPts val="0"/>
               </a:spcBef>
@@ -1162,9 +1101,6 @@
               </a:spcAft>
               <a:buNone/>
             </a:pPr>
-            <a:r>
-              <a:t/>
-            </a:r>
             <a:endParaRPr/>
           </a:p>
         </p:txBody>
@@ -1177,12 +1113,12 @@
 </p:notes>
 </file>
 
-<file path=ppt/notesSlides/notesSlide6.xml><?xml version="1.0" encoding="utf-8"?>
-<p:notes xmlns:a="http://schemas.openxmlformats.org/drawingml/2006/main" xmlns:r="http://schemas.openxmlformats.org/officeDocument/2006/relationships" xmlns:mc="http://schemas.openxmlformats.org/markup-compatibility/2006" xmlns:mv="urn:schemas-microsoft-com:mac:vml" xmlns:p="http://schemas.openxmlformats.org/presentationml/2006/main" xmlns:c="http://schemas.openxmlformats.org/drawingml/2006/chart" xmlns:dgm="http://schemas.openxmlformats.org/drawingml/2006/diagram" xmlns:o="urn:schemas-microsoft-com:office:office" xmlns:v="urn:schemas-microsoft-com:vml" xmlns:pvml="urn:schemas-microsoft-com:office:powerpoint" xmlns:com="http://schemas.openxmlformats.org/drawingml/2006/compatibility" xmlns:p14="http://schemas.microsoft.com/office/powerpoint/2010/main" xmlns:p15="http://schemas.microsoft.com/office/powerpoint/2012/main" showMasterPhAnim="0" showMasterSp="0">
+<file path=ppt/notesSlides/notesSlide5.xml><?xml version="1.0" encoding="utf-8"?>
+<p:notes xmlns:a="http://schemas.openxmlformats.org/drawingml/2006/main" xmlns:r="http://schemas.openxmlformats.org/officeDocument/2006/relationships" xmlns:p="http://schemas.openxmlformats.org/presentationml/2006/main" showMasterSp="0" showMasterPhAnim="0">
   <p:cSld>
     <p:spTree>
       <p:nvGrpSpPr>
-        <p:cNvPr id="86" name="Shape 86"/>
+        <p:cNvPr id="1" name="Shape 86"/>
         <p:cNvGrpSpPr/>
         <p:nvPr/>
       </p:nvGrpSpPr>
@@ -1197,9 +1133,11 @@
       <p:sp>
         <p:nvSpPr>
           <p:cNvPr id="87" name="Google Shape;87;g4f135e4108_0_5:notes"/>
-          <p:cNvSpPr/>
+          <p:cNvSpPr>
+            <a:spLocks noGrp="1" noRot="1" noChangeAspect="1"/>
+          </p:cNvSpPr>
           <p:nvPr>
-            <p:ph idx="2" type="sldImg"/>
+            <p:ph type="sldImg" idx="2"/>
           </p:nvPr>
         </p:nvSpPr>
         <p:spPr>
@@ -1208,9 +1146,13 @@
             <a:ext cx="6096000" cy="3429000"/>
           </a:xfrm>
           <a:custGeom>
-            <a:rect b="b" l="l" r="r" t="t"/>
+            <a:avLst/>
+            <a:gdLst/>
+            <a:ahLst/>
+            <a:cxnLst/>
+            <a:rect l="l" t="t" r="r" b="b"/>
             <a:pathLst>
-              <a:path extrusionOk="0" h="120000" w="120000">
+              <a:path w="120000" h="120000" extrusionOk="0">
                 <a:moveTo>
                   <a:pt x="0" y="0"/>
                 </a:moveTo>
@@ -1232,9 +1174,11 @@
       <p:sp>
         <p:nvSpPr>
           <p:cNvPr id="88" name="Google Shape;88;g4f135e4108_0_5:notes"/>
-          <p:cNvSpPr txBox="1"/>
+          <p:cNvSpPr txBox="1">
+            <a:spLocks noGrp="1"/>
+          </p:cNvSpPr>
           <p:nvPr>
-            <p:ph idx="1" type="body"/>
+            <p:ph type="body" idx="1"/>
           </p:nvPr>
         </p:nvSpPr>
         <p:spPr>
@@ -1247,12 +1191,12 @@
           </a:prstGeom>
         </p:spPr>
         <p:txBody>
-          <a:bodyPr anchorCtr="0" anchor="t" bIns="91425" lIns="91425" spcFirstLastPara="1" rIns="91425" wrap="square" tIns="91425">
+          <a:bodyPr spcFirstLastPara="1" wrap="square" lIns="91425" tIns="91425" rIns="91425" bIns="91425" anchor="t" anchorCtr="0">
             <a:noAutofit/>
           </a:bodyPr>
           <a:lstStyle/>
           <a:p>
-            <a:pPr indent="0" lvl="0" marL="0" rtl="0" algn="l">
+            <a:pPr marL="0" lvl="0" indent="0" algn="l" rtl="0">
               <a:spcBef>
                 <a:spcPts val="0"/>
               </a:spcBef>
@@ -1261,9 +1205,6 @@
               </a:spcAft>
               <a:buNone/>
             </a:pPr>
-            <a:r>
-              <a:t/>
-            </a:r>
             <a:endParaRPr/>
           </a:p>
         </p:txBody>
@@ -1276,12 +1217,12 @@
 </p:notes>
 </file>
 
-<file path=ppt/notesSlides/notesSlide7.xml><?xml version="1.0" encoding="utf-8"?>
-<p:notes xmlns:a="http://schemas.openxmlformats.org/drawingml/2006/main" xmlns:r="http://schemas.openxmlformats.org/officeDocument/2006/relationships" xmlns:mc="http://schemas.openxmlformats.org/markup-compatibility/2006" xmlns:mv="urn:schemas-microsoft-com:mac:vml" xmlns:p="http://schemas.openxmlformats.org/presentationml/2006/main" xmlns:c="http://schemas.openxmlformats.org/drawingml/2006/chart" xmlns:dgm="http://schemas.openxmlformats.org/drawingml/2006/diagram" xmlns:o="urn:schemas-microsoft-com:office:office" xmlns:v="urn:schemas-microsoft-com:vml" xmlns:pvml="urn:schemas-microsoft-com:office:powerpoint" xmlns:com="http://schemas.openxmlformats.org/drawingml/2006/compatibility" xmlns:p14="http://schemas.microsoft.com/office/powerpoint/2010/main" xmlns:p15="http://schemas.microsoft.com/office/powerpoint/2012/main" showMasterPhAnim="0" showMasterSp="0">
+<file path=ppt/notesSlides/notesSlide6.xml><?xml version="1.0" encoding="utf-8"?>
+<p:notes xmlns:a="http://schemas.openxmlformats.org/drawingml/2006/main" xmlns:r="http://schemas.openxmlformats.org/officeDocument/2006/relationships" xmlns:p="http://schemas.openxmlformats.org/presentationml/2006/main" showMasterSp="0" showMasterPhAnim="0">
   <p:cSld>
     <p:spTree>
       <p:nvGrpSpPr>
-        <p:cNvPr id="93" name="Shape 93"/>
+        <p:cNvPr id="1" name="Shape 93"/>
         <p:cNvGrpSpPr/>
         <p:nvPr/>
       </p:nvGrpSpPr>
@@ -1296,9 +1237,11 @@
       <p:sp>
         <p:nvSpPr>
           <p:cNvPr id="94" name="Google Shape;94;g4cc8b7df64_0_10:notes"/>
-          <p:cNvSpPr/>
+          <p:cNvSpPr>
+            <a:spLocks noGrp="1" noRot="1" noChangeAspect="1"/>
+          </p:cNvSpPr>
           <p:nvPr>
-            <p:ph idx="2" type="sldImg"/>
+            <p:ph type="sldImg" idx="2"/>
           </p:nvPr>
         </p:nvSpPr>
         <p:spPr>
@@ -1307,9 +1250,13 @@
             <a:ext cx="6096000" cy="3429000"/>
           </a:xfrm>
           <a:custGeom>
-            <a:rect b="b" l="l" r="r" t="t"/>
+            <a:avLst/>
+            <a:gdLst/>
+            <a:ahLst/>
+            <a:cxnLst/>
+            <a:rect l="l" t="t" r="r" b="b"/>
             <a:pathLst>
-              <a:path extrusionOk="0" h="120000" w="120000">
+              <a:path w="120000" h="120000" extrusionOk="0">
                 <a:moveTo>
                   <a:pt x="0" y="0"/>
                 </a:moveTo>
@@ -1331,9 +1278,11 @@
       <p:sp>
         <p:nvSpPr>
           <p:cNvPr id="95" name="Google Shape;95;g4cc8b7df64_0_10:notes"/>
-          <p:cNvSpPr txBox="1"/>
+          <p:cNvSpPr txBox="1">
+            <a:spLocks noGrp="1"/>
+          </p:cNvSpPr>
           <p:nvPr>
-            <p:ph idx="1" type="body"/>
+            <p:ph type="body" idx="1"/>
           </p:nvPr>
         </p:nvSpPr>
         <p:spPr>
@@ -1346,12 +1295,12 @@
           </a:prstGeom>
         </p:spPr>
         <p:txBody>
-          <a:bodyPr anchorCtr="0" anchor="t" bIns="91425" lIns="91425" spcFirstLastPara="1" rIns="91425" wrap="square" tIns="91425">
+          <a:bodyPr spcFirstLastPara="1" wrap="square" lIns="91425" tIns="91425" rIns="91425" bIns="91425" anchor="t" anchorCtr="0">
             <a:noAutofit/>
           </a:bodyPr>
           <a:lstStyle/>
           <a:p>
-            <a:pPr indent="0" lvl="0" marL="0" rtl="0" algn="l">
+            <a:pPr marL="0" lvl="0" indent="0" algn="l" rtl="0">
               <a:spcBef>
                 <a:spcPts val="0"/>
               </a:spcBef>
@@ -1360,9 +1309,6 @@
               </a:spcAft>
               <a:buNone/>
             </a:pPr>
-            <a:r>
-              <a:t/>
-            </a:r>
             <a:endParaRPr/>
           </a:p>
         </p:txBody>
@@ -1376,18 +1322,19 @@
 </file>
 
 <file path=ppt/slideLayouts/slideLayout1.xml><?xml version="1.0" encoding="utf-8"?>
-<p:sldLayout xmlns:a="http://schemas.openxmlformats.org/drawingml/2006/main" xmlns:r="http://schemas.openxmlformats.org/officeDocument/2006/relationships" xmlns:mc="http://schemas.openxmlformats.org/markup-compatibility/2006" xmlns:mv="urn:schemas-microsoft-com:mac:vml" xmlns:p="http://schemas.openxmlformats.org/presentationml/2006/main" xmlns:c="http://schemas.openxmlformats.org/drawingml/2006/chart" xmlns:dgm="http://schemas.openxmlformats.org/drawingml/2006/diagram" xmlns:o="urn:schemas-microsoft-com:office:office" xmlns:v="urn:schemas-microsoft-com:vml" xmlns:pvml="urn:schemas-microsoft-com:office:powerpoint" xmlns:com="http://schemas.openxmlformats.org/drawingml/2006/compatibility" xmlns:p14="http://schemas.microsoft.com/office/powerpoint/2010/main" xmlns:p15="http://schemas.microsoft.com/office/powerpoint/2012/main" matchingName="Title slide" type="title">
+<p:sldLayout xmlns:a="http://schemas.openxmlformats.org/drawingml/2006/main" xmlns:r="http://schemas.openxmlformats.org/officeDocument/2006/relationships" xmlns:p="http://schemas.openxmlformats.org/presentationml/2006/main" matchingName="Title slide" type="title">
   <p:cSld name="TITLE">
     <p:bg>
       <p:bgPr>
         <a:solidFill>
           <a:schemeClr val="dk1"/>
         </a:solidFill>
+        <a:effectLst/>
       </p:bgPr>
     </p:bg>
     <p:spTree>
       <p:nvGrpSpPr>
-        <p:cNvPr id="9" name="Shape 9"/>
+        <p:cNvPr id="1" name="Shape 9"/>
         <p:cNvGrpSpPr/>
         <p:nvPr/>
       </p:nvGrpSpPr>
@@ -1421,12 +1368,12 @@
           </a:ln>
         </p:spPr>
         <p:txBody>
-          <a:bodyPr anchorCtr="0" anchor="ctr" bIns="91425" lIns="91425" spcFirstLastPara="1" rIns="91425" wrap="square" tIns="91425">
+          <a:bodyPr spcFirstLastPara="1" wrap="square" lIns="91425" tIns="91425" rIns="91425" bIns="91425" anchor="ctr" anchorCtr="0">
             <a:noAutofit/>
           </a:bodyPr>
           <a:lstStyle/>
           <a:p>
-            <a:pPr indent="0" lvl="0" marL="0" rtl="0" algn="l">
+            <a:pPr marL="0" lvl="0" indent="0" algn="l" rtl="0">
               <a:spcBef>
                 <a:spcPts val="0"/>
               </a:spcBef>
@@ -1435,9 +1382,6 @@
               </a:spcAft>
               <a:buNone/>
             </a:pPr>
-            <a:r>
-              <a:t/>
-            </a:r>
             <a:endParaRPr/>
           </a:p>
         </p:txBody>
@@ -1457,21 +1401,23 @@
             <a:avLst/>
           </a:prstGeom>
           <a:noFill/>
-          <a:ln cap="flat" cmpd="sng" w="28575">
+          <a:ln w="28575" cap="flat" cmpd="sng">
             <a:solidFill>
               <a:schemeClr val="accent1"/>
             </a:solidFill>
             <a:prstDash val="solid"/>
             <a:round/>
-            <a:headEnd len="sm" w="sm" type="none"/>
-            <a:tailEnd len="sm" w="sm" type="none"/>
+            <a:headEnd type="none" w="sm" len="sm"/>
+            <a:tailEnd type="none" w="sm" len="sm"/>
           </a:ln>
         </p:spPr>
       </p:cxnSp>
       <p:sp>
         <p:nvSpPr>
           <p:cNvPr id="12" name="Google Shape;12;p2"/>
-          <p:cNvSpPr txBox="1"/>
+          <p:cNvSpPr txBox="1">
+            <a:spLocks noGrp="1"/>
+          </p:cNvSpPr>
           <p:nvPr>
             <p:ph type="ctrTitle"/>
           </p:nvPr>
@@ -1486,7 +1432,7 @@
           </a:prstGeom>
         </p:spPr>
         <p:txBody>
-          <a:bodyPr anchorCtr="0" anchor="b" bIns="91425" lIns="91425" spcFirstLastPara="1" rIns="91425" wrap="square" tIns="91425"/>
+          <a:bodyPr spcFirstLastPara="1" wrap="square" lIns="91425" tIns="91425" rIns="91425" bIns="91425" anchor="b" anchorCtr="0"/>
           <a:lstStyle>
             <a:lvl1pPr lvl="0">
               <a:spcBef>
@@ -1651,15 +1597,19 @@
               </a:defRPr>
             </a:lvl9pPr>
           </a:lstStyle>
-          <a:p/>
+          <a:p>
+            <a:endParaRPr/>
+          </a:p>
         </p:txBody>
       </p:sp>
       <p:sp>
         <p:nvSpPr>
           <p:cNvPr id="13" name="Google Shape;13;p2"/>
-          <p:cNvSpPr txBox="1"/>
+          <p:cNvSpPr txBox="1">
+            <a:spLocks noGrp="1"/>
+          </p:cNvSpPr>
           <p:nvPr>
-            <p:ph idx="1" type="subTitle"/>
+            <p:ph type="subTitle" idx="1"/>
           </p:nvPr>
         </p:nvSpPr>
         <p:spPr>
@@ -1672,7 +1622,7 @@
           </a:prstGeom>
         </p:spPr>
         <p:txBody>
-          <a:bodyPr anchorCtr="0" anchor="t" bIns="91425" lIns="91425" spcFirstLastPara="1" rIns="91425" wrap="square" tIns="91425"/>
+          <a:bodyPr spcFirstLastPara="1" wrap="square" lIns="91425" tIns="91425" rIns="91425" bIns="91425" anchor="t" anchorCtr="0"/>
           <a:lstStyle>
             <a:lvl1pPr lvl="0">
               <a:lnSpc>
@@ -1864,15 +1814,19 @@
               </a:defRPr>
             </a:lvl9pPr>
           </a:lstStyle>
-          <a:p/>
+          <a:p>
+            <a:endParaRPr/>
+          </a:p>
         </p:txBody>
       </p:sp>
       <p:sp>
         <p:nvSpPr>
           <p:cNvPr id="14" name="Google Shape;14;p2"/>
-          <p:cNvSpPr txBox="1"/>
+          <p:cNvSpPr txBox="1">
+            <a:spLocks noGrp="1"/>
+          </p:cNvSpPr>
           <p:nvPr>
-            <p:ph idx="12" type="sldNum"/>
+            <p:ph type="sldNum" idx="12"/>
           </p:nvPr>
         </p:nvSpPr>
         <p:spPr>
@@ -1885,7 +1839,7 @@
           </a:prstGeom>
         </p:spPr>
         <p:txBody>
-          <a:bodyPr anchorCtr="0" anchor="ctr" bIns="91425" lIns="91425" spcFirstLastPara="1" rIns="91425" wrap="square" tIns="91425">
+          <a:bodyPr spcFirstLastPara="1" wrap="square" lIns="91425" tIns="91425" rIns="91425" bIns="91425" anchor="ctr" anchorCtr="0">
             <a:noAutofit/>
           </a:bodyPr>
           <a:lstStyle>
@@ -1963,7 +1917,7 @@
             </a:lvl9pPr>
           </a:lstStyle>
           <a:p>
-            <a:pPr indent="0" lvl="0" marL="0" rtl="0" algn="r">
+            <a:pPr marL="0" lvl="0" indent="0" algn="r" rtl="0">
               <a:spcBef>
                 <a:spcPts val="0"/>
               </a:spcBef>
@@ -1989,11 +1943,11 @@
 </file>
 
 <file path=ppt/slideLayouts/slideLayout10.xml><?xml version="1.0" encoding="utf-8"?>
-<p:sldLayout xmlns:a="http://schemas.openxmlformats.org/drawingml/2006/main" xmlns:r="http://schemas.openxmlformats.org/officeDocument/2006/relationships" xmlns:mc="http://schemas.openxmlformats.org/markup-compatibility/2006" xmlns:mv="urn:schemas-microsoft-com:mac:vml" xmlns:p="http://schemas.openxmlformats.org/presentationml/2006/main" xmlns:c="http://schemas.openxmlformats.org/drawingml/2006/chart" xmlns:dgm="http://schemas.openxmlformats.org/drawingml/2006/diagram" xmlns:o="urn:schemas-microsoft-com:office:office" xmlns:v="urn:schemas-microsoft-com:vml" xmlns:pvml="urn:schemas-microsoft-com:office:powerpoint" xmlns:com="http://schemas.openxmlformats.org/drawingml/2006/compatibility" xmlns:p14="http://schemas.microsoft.com/office/powerpoint/2010/main" xmlns:p15="http://schemas.microsoft.com/office/powerpoint/2012/main" matchingName="Big number">
+<p:sldLayout xmlns:a="http://schemas.openxmlformats.org/drawingml/2006/main" xmlns:r="http://schemas.openxmlformats.org/officeDocument/2006/relationships" xmlns:p="http://schemas.openxmlformats.org/presentationml/2006/main" matchingName="Big number">
   <p:cSld name="BIG_NUMBER">
     <p:spTree>
       <p:nvGrpSpPr>
-        <p:cNvPr id="49" name="Shape 49"/>
+        <p:cNvPr id="1" name="Shape 49"/>
         <p:cNvGrpSpPr/>
         <p:nvPr/>
       </p:nvGrpSpPr>
@@ -2008,9 +1962,11 @@
       <p:sp>
         <p:nvSpPr>
           <p:cNvPr id="50" name="Google Shape;50;p11"/>
-          <p:cNvSpPr txBox="1"/>
+          <p:cNvSpPr txBox="1">
+            <a:spLocks noGrp="1"/>
+          </p:cNvSpPr>
           <p:nvPr>
-            <p:ph hasCustomPrompt="1" type="title"/>
+            <p:ph type="title" hasCustomPrompt="1"/>
           </p:nvPr>
         </p:nvSpPr>
         <p:spPr>
@@ -2023,7 +1979,7 @@
           </a:prstGeom>
         </p:spPr>
         <p:txBody>
-          <a:bodyPr anchorCtr="0" anchor="b" bIns="91425" lIns="91425" spcFirstLastPara="1" rIns="91425" wrap="square" tIns="91425"/>
+          <a:bodyPr spcFirstLastPara="1" wrap="square" lIns="91425" tIns="91425" rIns="91425" bIns="91425" anchor="b" anchorCtr="0"/>
           <a:lstStyle>
             <a:lvl1pPr lvl="0" algn="ctr">
               <a:spcBef>
@@ -2034,7 +1990,7 @@
               </a:spcAft>
               <a:buSzPts val="14000"/>
               <a:buNone/>
-              <a:defRPr b="1" sz="14000"/>
+              <a:defRPr sz="14000" b="1"/>
             </a:lvl1pPr>
             <a:lvl2pPr lvl="1" algn="ctr">
               <a:spcBef>
@@ -2045,7 +2001,7 @@
               </a:spcAft>
               <a:buSzPts val="14000"/>
               <a:buNone/>
-              <a:defRPr b="1" sz="14000"/>
+              <a:defRPr sz="14000" b="1"/>
             </a:lvl2pPr>
             <a:lvl3pPr lvl="2" algn="ctr">
               <a:spcBef>
@@ -2056,7 +2012,7 @@
               </a:spcAft>
               <a:buSzPts val="14000"/>
               <a:buNone/>
-              <a:defRPr b="1" sz="14000"/>
+              <a:defRPr sz="14000" b="1"/>
             </a:lvl3pPr>
             <a:lvl4pPr lvl="3" algn="ctr">
               <a:spcBef>
@@ -2067,7 +2023,7 @@
               </a:spcAft>
               <a:buSzPts val="14000"/>
               <a:buNone/>
-              <a:defRPr b="1" sz="14000"/>
+              <a:defRPr sz="14000" b="1"/>
             </a:lvl4pPr>
             <a:lvl5pPr lvl="4" algn="ctr">
               <a:spcBef>
@@ -2078,7 +2034,7 @@
               </a:spcAft>
               <a:buSzPts val="14000"/>
               <a:buNone/>
-              <a:defRPr b="1" sz="14000"/>
+              <a:defRPr sz="14000" b="1"/>
             </a:lvl5pPr>
             <a:lvl6pPr lvl="5" algn="ctr">
               <a:spcBef>
@@ -2089,7 +2045,7 @@
               </a:spcAft>
               <a:buSzPts val="14000"/>
               <a:buNone/>
-              <a:defRPr b="1" sz="14000"/>
+              <a:defRPr sz="14000" b="1"/>
             </a:lvl6pPr>
             <a:lvl7pPr lvl="6" algn="ctr">
               <a:spcBef>
@@ -2100,7 +2056,7 @@
               </a:spcAft>
               <a:buSzPts val="14000"/>
               <a:buNone/>
-              <a:defRPr b="1" sz="14000"/>
+              <a:defRPr sz="14000" b="1"/>
             </a:lvl7pPr>
             <a:lvl8pPr lvl="7" algn="ctr">
               <a:spcBef>
@@ -2111,7 +2067,7 @@
               </a:spcAft>
               <a:buSzPts val="14000"/>
               <a:buNone/>
-              <a:defRPr b="1" sz="14000"/>
+              <a:defRPr sz="14000" b="1"/>
             </a:lvl8pPr>
             <a:lvl9pPr lvl="8" algn="ctr">
               <a:spcBef>
@@ -2122,7 +2078,7 @@
               </a:spcAft>
               <a:buSzPts val="14000"/>
               <a:buNone/>
-              <a:defRPr b="1" sz="14000"/>
+              <a:defRPr sz="14000" b="1"/>
             </a:lvl9pPr>
           </a:lstStyle>
           <a:p>
@@ -2135,9 +2091,11 @@
       <p:sp>
         <p:nvSpPr>
           <p:cNvPr id="51" name="Google Shape;51;p11"/>
-          <p:cNvSpPr txBox="1"/>
+          <p:cNvSpPr txBox="1">
+            <a:spLocks noGrp="1"/>
+          </p:cNvSpPr>
           <p:nvPr>
-            <p:ph idx="1" type="body"/>
+            <p:ph type="body" idx="1"/>
           </p:nvPr>
         </p:nvSpPr>
         <p:spPr>
@@ -2150,9 +2108,9 @@
           </a:prstGeom>
         </p:spPr>
         <p:txBody>
-          <a:bodyPr anchorCtr="0" anchor="t" bIns="91425" lIns="91425" spcFirstLastPara="1" rIns="91425" wrap="square" tIns="91425"/>
+          <a:bodyPr spcFirstLastPara="1" wrap="square" lIns="91425" tIns="91425" rIns="91425" bIns="91425" anchor="t" anchorCtr="0"/>
           <a:lstStyle>
-            <a:lvl1pPr indent="-342900" lvl="0" marL="457200" algn="ctr">
+            <a:lvl1pPr marL="457200" lvl="0" indent="-342900" algn="ctr">
               <a:spcBef>
                 <a:spcPts val="0"/>
               </a:spcBef>
@@ -2163,7 +2121,7 @@
               <a:buChar char="●"/>
               <a:defRPr/>
             </a:lvl1pPr>
-            <a:lvl2pPr indent="-317500" lvl="1" marL="914400" algn="ctr">
+            <a:lvl2pPr marL="914400" lvl="1" indent="-317500" algn="ctr">
               <a:spcBef>
                 <a:spcPts val="1600"/>
               </a:spcBef>
@@ -2174,7 +2132,7 @@
               <a:buChar char="○"/>
               <a:defRPr/>
             </a:lvl2pPr>
-            <a:lvl3pPr indent="-317500" lvl="2" marL="1371600" algn="ctr">
+            <a:lvl3pPr marL="1371600" lvl="2" indent="-317500" algn="ctr">
               <a:spcBef>
                 <a:spcPts val="1600"/>
               </a:spcBef>
@@ -2185,7 +2143,7 @@
               <a:buChar char="■"/>
               <a:defRPr/>
             </a:lvl3pPr>
-            <a:lvl4pPr indent="-317500" lvl="3" marL="1828800" algn="ctr">
+            <a:lvl4pPr marL="1828800" lvl="3" indent="-317500" algn="ctr">
               <a:spcBef>
                 <a:spcPts val="1600"/>
               </a:spcBef>
@@ -2196,7 +2154,7 @@
               <a:buChar char="●"/>
               <a:defRPr/>
             </a:lvl4pPr>
-            <a:lvl5pPr indent="-317500" lvl="4" marL="2286000" algn="ctr">
+            <a:lvl5pPr marL="2286000" lvl="4" indent="-317500" algn="ctr">
               <a:spcBef>
                 <a:spcPts val="1600"/>
               </a:spcBef>
@@ -2207,7 +2165,7 @@
               <a:buChar char="○"/>
               <a:defRPr/>
             </a:lvl5pPr>
-            <a:lvl6pPr indent="-317500" lvl="5" marL="2743200" algn="ctr">
+            <a:lvl6pPr marL="2743200" lvl="5" indent="-317500" algn="ctr">
               <a:spcBef>
                 <a:spcPts val="1600"/>
               </a:spcBef>
@@ -2218,7 +2176,7 @@
               <a:buChar char="■"/>
               <a:defRPr/>
             </a:lvl6pPr>
-            <a:lvl7pPr indent="-317500" lvl="6" marL="3200400" algn="ctr">
+            <a:lvl7pPr marL="3200400" lvl="6" indent="-317500" algn="ctr">
               <a:spcBef>
                 <a:spcPts val="1600"/>
               </a:spcBef>
@@ -2229,7 +2187,7 @@
               <a:buChar char="●"/>
               <a:defRPr/>
             </a:lvl7pPr>
-            <a:lvl8pPr indent="-317500" lvl="7" marL="3657600" algn="ctr">
+            <a:lvl8pPr marL="3657600" lvl="7" indent="-317500" algn="ctr">
               <a:spcBef>
                 <a:spcPts val="1600"/>
               </a:spcBef>
@@ -2240,7 +2198,7 @@
               <a:buChar char="○"/>
               <a:defRPr/>
             </a:lvl8pPr>
-            <a:lvl9pPr indent="-317500" lvl="8" marL="4114800" algn="ctr">
+            <a:lvl9pPr marL="4114800" lvl="8" indent="-317500" algn="ctr">
               <a:spcBef>
                 <a:spcPts val="1600"/>
               </a:spcBef>
@@ -2252,15 +2210,19 @@
               <a:defRPr/>
             </a:lvl9pPr>
           </a:lstStyle>
-          <a:p/>
+          <a:p>
+            <a:endParaRPr/>
+          </a:p>
         </p:txBody>
       </p:sp>
       <p:sp>
         <p:nvSpPr>
           <p:cNvPr id="52" name="Google Shape;52;p11"/>
-          <p:cNvSpPr txBox="1"/>
+          <p:cNvSpPr txBox="1">
+            <a:spLocks noGrp="1"/>
+          </p:cNvSpPr>
           <p:nvPr>
-            <p:ph idx="12" type="sldNum"/>
+            <p:ph type="sldNum" idx="12"/>
           </p:nvPr>
         </p:nvSpPr>
         <p:spPr>
@@ -2273,7 +2235,7 @@
           </a:prstGeom>
         </p:spPr>
         <p:txBody>
-          <a:bodyPr anchorCtr="0" anchor="ctr" bIns="91425" lIns="91425" spcFirstLastPara="1" rIns="91425" wrap="square" tIns="91425">
+          <a:bodyPr spcFirstLastPara="1" wrap="square" lIns="91425" tIns="91425" rIns="91425" bIns="91425" anchor="ctr" anchorCtr="0">
             <a:noAutofit/>
           </a:bodyPr>
           <a:lstStyle>
@@ -2315,7 +2277,7 @@
             </a:lvl9pPr>
           </a:lstStyle>
           <a:p>
-            <a:pPr indent="0" lvl="0" marL="0" rtl="0" algn="r">
+            <a:pPr marL="0" lvl="0" indent="0" algn="r" rtl="0">
               <a:spcBef>
                 <a:spcPts val="0"/>
               </a:spcBef>
@@ -2341,11 +2303,11 @@
 </file>
 
 <file path=ppt/slideLayouts/slideLayout11.xml><?xml version="1.0" encoding="utf-8"?>
-<p:sldLayout xmlns:a="http://schemas.openxmlformats.org/drawingml/2006/main" xmlns:r="http://schemas.openxmlformats.org/officeDocument/2006/relationships" xmlns:mc="http://schemas.openxmlformats.org/markup-compatibility/2006" xmlns:mv="urn:schemas-microsoft-com:mac:vml" xmlns:p="http://schemas.openxmlformats.org/presentationml/2006/main" xmlns:c="http://schemas.openxmlformats.org/drawingml/2006/chart" xmlns:dgm="http://schemas.openxmlformats.org/drawingml/2006/diagram" xmlns:o="urn:schemas-microsoft-com:office:office" xmlns:v="urn:schemas-microsoft-com:vml" xmlns:pvml="urn:schemas-microsoft-com:office:powerpoint" xmlns:com="http://schemas.openxmlformats.org/drawingml/2006/compatibility" xmlns:p14="http://schemas.microsoft.com/office/powerpoint/2010/main" xmlns:p15="http://schemas.microsoft.com/office/powerpoint/2012/main" matchingName="Blank" type="blank">
+<p:sldLayout xmlns:a="http://schemas.openxmlformats.org/drawingml/2006/main" xmlns:r="http://schemas.openxmlformats.org/officeDocument/2006/relationships" xmlns:p="http://schemas.openxmlformats.org/presentationml/2006/main" matchingName="Blank" type="blank">
   <p:cSld name="BLANK">
     <p:spTree>
       <p:nvGrpSpPr>
-        <p:cNvPr id="53" name="Shape 53"/>
+        <p:cNvPr id="1" name="Shape 53"/>
         <p:cNvGrpSpPr/>
         <p:nvPr/>
       </p:nvGrpSpPr>
@@ -2360,9 +2322,11 @@
       <p:sp>
         <p:nvSpPr>
           <p:cNvPr id="54" name="Google Shape;54;p12"/>
-          <p:cNvSpPr txBox="1"/>
+          <p:cNvSpPr txBox="1">
+            <a:spLocks noGrp="1"/>
+          </p:cNvSpPr>
           <p:nvPr>
-            <p:ph idx="12" type="sldNum"/>
+            <p:ph type="sldNum" idx="12"/>
           </p:nvPr>
         </p:nvSpPr>
         <p:spPr>
@@ -2375,7 +2339,7 @@
           </a:prstGeom>
         </p:spPr>
         <p:txBody>
-          <a:bodyPr anchorCtr="0" anchor="ctr" bIns="91425" lIns="91425" spcFirstLastPara="1" rIns="91425" wrap="square" tIns="91425">
+          <a:bodyPr spcFirstLastPara="1" wrap="square" lIns="91425" tIns="91425" rIns="91425" bIns="91425" anchor="ctr" anchorCtr="0">
             <a:noAutofit/>
           </a:bodyPr>
           <a:lstStyle>
@@ -2417,7 +2381,7 @@
             </a:lvl9pPr>
           </a:lstStyle>
           <a:p>
-            <a:pPr indent="0" lvl="0" marL="0" rtl="0" algn="r">
+            <a:pPr marL="0" lvl="0" indent="0" algn="r" rtl="0">
               <a:spcBef>
                 <a:spcPts val="0"/>
               </a:spcBef>
@@ -2443,18 +2407,19 @@
 </file>
 
 <file path=ppt/slideLayouts/slideLayout2.xml><?xml version="1.0" encoding="utf-8"?>
-<p:sldLayout xmlns:a="http://schemas.openxmlformats.org/drawingml/2006/main" xmlns:r="http://schemas.openxmlformats.org/officeDocument/2006/relationships" xmlns:mc="http://schemas.openxmlformats.org/markup-compatibility/2006" xmlns:mv="urn:schemas-microsoft-com:mac:vml" xmlns:p="http://schemas.openxmlformats.org/presentationml/2006/main" xmlns:c="http://schemas.openxmlformats.org/drawingml/2006/chart" xmlns:dgm="http://schemas.openxmlformats.org/drawingml/2006/diagram" xmlns:o="urn:schemas-microsoft-com:office:office" xmlns:v="urn:schemas-microsoft-com:vml" xmlns:pvml="urn:schemas-microsoft-com:office:powerpoint" xmlns:com="http://schemas.openxmlformats.org/drawingml/2006/compatibility" xmlns:p14="http://schemas.microsoft.com/office/powerpoint/2010/main" xmlns:p15="http://schemas.microsoft.com/office/powerpoint/2012/main" matchingName="Section header" type="secHead">
+<p:sldLayout xmlns:a="http://schemas.openxmlformats.org/drawingml/2006/main" xmlns:r="http://schemas.openxmlformats.org/officeDocument/2006/relationships" xmlns:p="http://schemas.openxmlformats.org/presentationml/2006/main" matchingName="Section header" type="secHead">
   <p:cSld name="SECTION_HEADER">
     <p:bg>
       <p:bgPr>
         <a:solidFill>
           <a:schemeClr val="dk1"/>
         </a:solidFill>
+        <a:effectLst/>
       </p:bgPr>
     </p:bg>
     <p:spTree>
       <p:nvGrpSpPr>
-        <p:cNvPr id="15" name="Shape 15"/>
+        <p:cNvPr id="1" name="Shape 15"/>
         <p:cNvGrpSpPr/>
         <p:nvPr/>
       </p:nvGrpSpPr>
@@ -2481,21 +2446,23 @@
             <a:avLst/>
           </a:prstGeom>
           <a:noFill/>
-          <a:ln cap="flat" cmpd="sng" w="28575">
+          <a:ln w="28575" cap="flat" cmpd="sng">
             <a:solidFill>
               <a:schemeClr val="lt2"/>
             </a:solidFill>
             <a:prstDash val="solid"/>
             <a:round/>
-            <a:headEnd len="sm" w="sm" type="none"/>
-            <a:tailEnd len="sm" w="sm" type="none"/>
+            <a:headEnd type="none" w="sm" len="sm"/>
+            <a:tailEnd type="none" w="sm" len="sm"/>
           </a:ln>
         </p:spPr>
       </p:cxnSp>
       <p:sp>
         <p:nvSpPr>
           <p:cNvPr id="17" name="Google Shape;17;p3"/>
-          <p:cNvSpPr txBox="1"/>
+          <p:cNvSpPr txBox="1">
+            <a:spLocks noGrp="1"/>
+          </p:cNvSpPr>
           <p:nvPr>
             <p:ph type="title"/>
           </p:nvPr>
@@ -2510,7 +2477,7 @@
           </a:prstGeom>
         </p:spPr>
         <p:txBody>
-          <a:bodyPr anchorCtr="0" anchor="b" bIns="91425" lIns="91425" spcFirstLastPara="1" rIns="91425" wrap="square" tIns="91425"/>
+          <a:bodyPr spcFirstLastPara="1" wrap="square" lIns="91425" tIns="91425" rIns="91425" bIns="91425" anchor="b" anchorCtr="0"/>
           <a:lstStyle>
             <a:lvl1pPr lvl="0">
               <a:spcBef>
@@ -2675,15 +2642,19 @@
               </a:defRPr>
             </a:lvl9pPr>
           </a:lstStyle>
-          <a:p/>
+          <a:p>
+            <a:endParaRPr/>
+          </a:p>
         </p:txBody>
       </p:sp>
       <p:sp>
         <p:nvSpPr>
           <p:cNvPr id="18" name="Google Shape;18;p3"/>
-          <p:cNvSpPr txBox="1"/>
+          <p:cNvSpPr txBox="1">
+            <a:spLocks noGrp="1"/>
+          </p:cNvSpPr>
           <p:nvPr>
-            <p:ph idx="12" type="sldNum"/>
+            <p:ph type="sldNum" idx="12"/>
           </p:nvPr>
         </p:nvSpPr>
         <p:spPr>
@@ -2696,7 +2667,7 @@
           </a:prstGeom>
         </p:spPr>
         <p:txBody>
-          <a:bodyPr anchorCtr="0" anchor="ctr" bIns="91425" lIns="91425" spcFirstLastPara="1" rIns="91425" wrap="square" tIns="91425">
+          <a:bodyPr spcFirstLastPara="1" wrap="square" lIns="91425" tIns="91425" rIns="91425" bIns="91425" anchor="ctr" anchorCtr="0">
             <a:noAutofit/>
           </a:bodyPr>
           <a:lstStyle>
@@ -2774,7 +2745,7 @@
             </a:lvl9pPr>
           </a:lstStyle>
           <a:p>
-            <a:pPr indent="0" lvl="0" marL="0" rtl="0" algn="r">
+            <a:pPr marL="0" lvl="0" indent="0" algn="r" rtl="0">
               <a:spcBef>
                 <a:spcPts val="0"/>
               </a:spcBef>
@@ -2800,11 +2771,11 @@
 </file>
 
 <file path=ppt/slideLayouts/slideLayout3.xml><?xml version="1.0" encoding="utf-8"?>
-<p:sldLayout xmlns:a="http://schemas.openxmlformats.org/drawingml/2006/main" xmlns:r="http://schemas.openxmlformats.org/officeDocument/2006/relationships" xmlns:mc="http://schemas.openxmlformats.org/markup-compatibility/2006" xmlns:mv="urn:schemas-microsoft-com:mac:vml" xmlns:p="http://schemas.openxmlformats.org/presentationml/2006/main" xmlns:c="http://schemas.openxmlformats.org/drawingml/2006/chart" xmlns:dgm="http://schemas.openxmlformats.org/drawingml/2006/diagram" xmlns:o="urn:schemas-microsoft-com:office:office" xmlns:v="urn:schemas-microsoft-com:vml" xmlns:pvml="urn:schemas-microsoft-com:office:powerpoint" xmlns:com="http://schemas.openxmlformats.org/drawingml/2006/compatibility" xmlns:p14="http://schemas.microsoft.com/office/powerpoint/2010/main" xmlns:p15="http://schemas.microsoft.com/office/powerpoint/2012/main" matchingName="Title and body" type="tx">
+<p:sldLayout xmlns:a="http://schemas.openxmlformats.org/drawingml/2006/main" xmlns:r="http://schemas.openxmlformats.org/officeDocument/2006/relationships" xmlns:p="http://schemas.openxmlformats.org/presentationml/2006/main" matchingName="Title and body" type="tx">
   <p:cSld name="TITLE_AND_BODY">
     <p:spTree>
       <p:nvGrpSpPr>
-        <p:cNvPr id="19" name="Shape 19"/>
+        <p:cNvPr id="1" name="Shape 19"/>
         <p:cNvGrpSpPr/>
         <p:nvPr/>
       </p:nvGrpSpPr>
@@ -2838,12 +2809,12 @@
           </a:ln>
         </p:spPr>
         <p:txBody>
-          <a:bodyPr anchorCtr="0" anchor="ctr" bIns="91425" lIns="91425" spcFirstLastPara="1" rIns="91425" wrap="square" tIns="91425">
+          <a:bodyPr spcFirstLastPara="1" wrap="square" lIns="91425" tIns="91425" rIns="91425" bIns="91425" anchor="ctr" anchorCtr="0">
             <a:noAutofit/>
           </a:bodyPr>
           <a:lstStyle/>
           <a:p>
-            <a:pPr indent="0" lvl="0" marL="0" rtl="0" algn="l">
+            <a:pPr marL="0" lvl="0" indent="0" algn="l" rtl="0">
               <a:spcBef>
                 <a:spcPts val="0"/>
               </a:spcBef>
@@ -2852,9 +2823,6 @@
               </a:spcAft>
               <a:buNone/>
             </a:pPr>
-            <a:r>
-              <a:t/>
-            </a:r>
             <a:endParaRPr/>
           </a:p>
         </p:txBody>
@@ -2862,7 +2830,9 @@
       <p:sp>
         <p:nvSpPr>
           <p:cNvPr id="21" name="Google Shape;21;p4"/>
-          <p:cNvSpPr txBox="1"/>
+          <p:cNvSpPr txBox="1">
+            <a:spLocks noGrp="1"/>
+          </p:cNvSpPr>
           <p:nvPr>
             <p:ph type="title"/>
           </p:nvPr>
@@ -2877,7 +2847,7 @@
           </a:prstGeom>
         </p:spPr>
         <p:txBody>
-          <a:bodyPr anchorCtr="0" anchor="t" bIns="91425" lIns="91425" spcFirstLastPara="1" rIns="91425" wrap="square" tIns="91425"/>
+          <a:bodyPr spcFirstLastPara="1" wrap="square" lIns="91425" tIns="91425" rIns="91425" bIns="91425" anchor="t" anchorCtr="0"/>
           <a:lstStyle>
             <a:lvl1pPr lvl="0">
               <a:spcBef>
@@ -2979,15 +2949,19 @@
               <a:defRPr/>
             </a:lvl9pPr>
           </a:lstStyle>
-          <a:p/>
+          <a:p>
+            <a:endParaRPr/>
+          </a:p>
         </p:txBody>
       </p:sp>
       <p:sp>
         <p:nvSpPr>
           <p:cNvPr id="22" name="Google Shape;22;p4"/>
-          <p:cNvSpPr txBox="1"/>
+          <p:cNvSpPr txBox="1">
+            <a:spLocks noGrp="1"/>
+          </p:cNvSpPr>
           <p:nvPr>
-            <p:ph idx="1" type="body"/>
+            <p:ph type="body" idx="1"/>
           </p:nvPr>
         </p:nvSpPr>
         <p:spPr>
@@ -3000,9 +2974,9 @@
           </a:prstGeom>
         </p:spPr>
         <p:txBody>
-          <a:bodyPr anchorCtr="0" anchor="t" bIns="91425" lIns="91425" spcFirstLastPara="1" rIns="91425" wrap="square" tIns="91425"/>
+          <a:bodyPr spcFirstLastPara="1" wrap="square" lIns="91425" tIns="91425" rIns="91425" bIns="91425" anchor="t" anchorCtr="0"/>
           <a:lstStyle>
-            <a:lvl1pPr indent="-342900" lvl="0" marL="457200">
+            <a:lvl1pPr marL="457200" lvl="0" indent="-342900">
               <a:spcBef>
                 <a:spcPts val="0"/>
               </a:spcBef>
@@ -3013,7 +2987,7 @@
               <a:buChar char="●"/>
               <a:defRPr/>
             </a:lvl1pPr>
-            <a:lvl2pPr indent="-317500" lvl="1" marL="914400">
+            <a:lvl2pPr marL="914400" lvl="1" indent="-317500">
               <a:spcBef>
                 <a:spcPts val="1600"/>
               </a:spcBef>
@@ -3024,7 +2998,7 @@
               <a:buChar char="○"/>
               <a:defRPr/>
             </a:lvl2pPr>
-            <a:lvl3pPr indent="-317500" lvl="2" marL="1371600">
+            <a:lvl3pPr marL="1371600" lvl="2" indent="-317500">
               <a:spcBef>
                 <a:spcPts val="1600"/>
               </a:spcBef>
@@ -3035,7 +3009,7 @@
               <a:buChar char="■"/>
               <a:defRPr/>
             </a:lvl3pPr>
-            <a:lvl4pPr indent="-317500" lvl="3" marL="1828800">
+            <a:lvl4pPr marL="1828800" lvl="3" indent="-317500">
               <a:spcBef>
                 <a:spcPts val="1600"/>
               </a:spcBef>
@@ -3046,7 +3020,7 @@
               <a:buChar char="●"/>
               <a:defRPr/>
             </a:lvl4pPr>
-            <a:lvl5pPr indent="-317500" lvl="4" marL="2286000">
+            <a:lvl5pPr marL="2286000" lvl="4" indent="-317500">
               <a:spcBef>
                 <a:spcPts val="1600"/>
               </a:spcBef>
@@ -3057,7 +3031,7 @@
               <a:buChar char="○"/>
               <a:defRPr/>
             </a:lvl5pPr>
-            <a:lvl6pPr indent="-317500" lvl="5" marL="2743200">
+            <a:lvl6pPr marL="2743200" lvl="5" indent="-317500">
               <a:spcBef>
                 <a:spcPts val="1600"/>
               </a:spcBef>
@@ -3068,7 +3042,7 @@
               <a:buChar char="■"/>
               <a:defRPr/>
             </a:lvl6pPr>
-            <a:lvl7pPr indent="-317500" lvl="6" marL="3200400">
+            <a:lvl7pPr marL="3200400" lvl="6" indent="-317500">
               <a:spcBef>
                 <a:spcPts val="1600"/>
               </a:spcBef>
@@ -3079,7 +3053,7 @@
               <a:buChar char="●"/>
               <a:defRPr/>
             </a:lvl7pPr>
-            <a:lvl8pPr indent="-317500" lvl="7" marL="3657600">
+            <a:lvl8pPr marL="3657600" lvl="7" indent="-317500">
               <a:spcBef>
                 <a:spcPts val="1600"/>
               </a:spcBef>
@@ -3090,7 +3064,7 @@
               <a:buChar char="○"/>
               <a:defRPr/>
             </a:lvl8pPr>
-            <a:lvl9pPr indent="-317500" lvl="8" marL="4114800">
+            <a:lvl9pPr marL="4114800" lvl="8" indent="-317500">
               <a:spcBef>
                 <a:spcPts val="1600"/>
               </a:spcBef>
@@ -3102,15 +3076,19 @@
               <a:defRPr/>
             </a:lvl9pPr>
           </a:lstStyle>
-          <a:p/>
+          <a:p>
+            <a:endParaRPr/>
+          </a:p>
         </p:txBody>
       </p:sp>
       <p:sp>
         <p:nvSpPr>
           <p:cNvPr id="23" name="Google Shape;23;p4"/>
-          <p:cNvSpPr txBox="1"/>
+          <p:cNvSpPr txBox="1">
+            <a:spLocks noGrp="1"/>
+          </p:cNvSpPr>
           <p:nvPr>
-            <p:ph idx="12" type="sldNum"/>
+            <p:ph type="sldNum" idx="12"/>
           </p:nvPr>
         </p:nvSpPr>
         <p:spPr>
@@ -3123,7 +3101,7 @@
           </a:prstGeom>
         </p:spPr>
         <p:txBody>
-          <a:bodyPr anchorCtr="0" anchor="ctr" bIns="91425" lIns="91425" spcFirstLastPara="1" rIns="91425" wrap="square" tIns="91425">
+          <a:bodyPr spcFirstLastPara="1" wrap="square" lIns="91425" tIns="91425" rIns="91425" bIns="91425" anchor="ctr" anchorCtr="0">
             <a:noAutofit/>
           </a:bodyPr>
           <a:lstStyle>
@@ -3165,7 +3143,7 @@
             </a:lvl9pPr>
           </a:lstStyle>
           <a:p>
-            <a:pPr indent="0" lvl="0" marL="0" rtl="0" algn="r">
+            <a:pPr marL="0" lvl="0" indent="0" algn="r" rtl="0">
               <a:spcBef>
                 <a:spcPts val="0"/>
               </a:spcBef>
@@ -3191,11 +3169,11 @@
 </file>
 
 <file path=ppt/slideLayouts/slideLayout4.xml><?xml version="1.0" encoding="utf-8"?>
-<p:sldLayout xmlns:a="http://schemas.openxmlformats.org/drawingml/2006/main" xmlns:r="http://schemas.openxmlformats.org/officeDocument/2006/relationships" xmlns:mc="http://schemas.openxmlformats.org/markup-compatibility/2006" xmlns:mv="urn:schemas-microsoft-com:mac:vml" xmlns:p="http://schemas.openxmlformats.org/presentationml/2006/main" xmlns:c="http://schemas.openxmlformats.org/drawingml/2006/chart" xmlns:dgm="http://schemas.openxmlformats.org/drawingml/2006/diagram" xmlns:o="urn:schemas-microsoft-com:office:office" xmlns:v="urn:schemas-microsoft-com:vml" xmlns:pvml="urn:schemas-microsoft-com:office:powerpoint" xmlns:com="http://schemas.openxmlformats.org/drawingml/2006/compatibility" xmlns:p14="http://schemas.microsoft.com/office/powerpoint/2010/main" xmlns:p15="http://schemas.microsoft.com/office/powerpoint/2012/main" matchingName="Title and two columns" type="twoColTx">
+<p:sldLayout xmlns:a="http://schemas.openxmlformats.org/drawingml/2006/main" xmlns:r="http://schemas.openxmlformats.org/officeDocument/2006/relationships" xmlns:p="http://schemas.openxmlformats.org/presentationml/2006/main" matchingName="Title and two columns" type="twoColTx">
   <p:cSld name="TITLE_AND_TWO_COLUMNS">
     <p:spTree>
       <p:nvGrpSpPr>
-        <p:cNvPr id="24" name="Shape 24"/>
+        <p:cNvPr id="1" name="Shape 24"/>
         <p:cNvGrpSpPr/>
         <p:nvPr/>
       </p:nvGrpSpPr>
@@ -3210,7 +3188,9 @@
       <p:sp>
         <p:nvSpPr>
           <p:cNvPr id="25" name="Google Shape;25;p5"/>
-          <p:cNvSpPr txBox="1"/>
+          <p:cNvSpPr txBox="1">
+            <a:spLocks noGrp="1"/>
+          </p:cNvSpPr>
           <p:nvPr>
             <p:ph type="title"/>
           </p:nvPr>
@@ -3225,7 +3205,7 @@
           </a:prstGeom>
         </p:spPr>
         <p:txBody>
-          <a:bodyPr anchorCtr="0" anchor="t" bIns="91425" lIns="91425" spcFirstLastPara="1" rIns="91425" wrap="square" tIns="91425"/>
+          <a:bodyPr spcFirstLastPara="1" wrap="square" lIns="91425" tIns="91425" rIns="91425" bIns="91425" anchor="t" anchorCtr="0"/>
           <a:lstStyle>
             <a:lvl1pPr lvl="0">
               <a:spcBef>
@@ -3327,15 +3307,19 @@
               <a:defRPr/>
             </a:lvl9pPr>
           </a:lstStyle>
-          <a:p/>
+          <a:p>
+            <a:endParaRPr/>
+          </a:p>
         </p:txBody>
       </p:sp>
       <p:sp>
         <p:nvSpPr>
           <p:cNvPr id="26" name="Google Shape;26;p5"/>
-          <p:cNvSpPr txBox="1"/>
+          <p:cNvSpPr txBox="1">
+            <a:spLocks noGrp="1"/>
+          </p:cNvSpPr>
           <p:nvPr>
-            <p:ph idx="1" type="body"/>
+            <p:ph type="body" idx="1"/>
           </p:nvPr>
         </p:nvSpPr>
         <p:spPr>
@@ -3348,9 +3332,9 @@
           </a:prstGeom>
         </p:spPr>
         <p:txBody>
-          <a:bodyPr anchorCtr="0" anchor="t" bIns="91425" lIns="91425" spcFirstLastPara="1" rIns="91425" wrap="square" tIns="91425"/>
+          <a:bodyPr spcFirstLastPara="1" wrap="square" lIns="91425" tIns="91425" rIns="91425" bIns="91425" anchor="t" anchorCtr="0"/>
           <a:lstStyle>
-            <a:lvl1pPr indent="-317500" lvl="0" marL="457200">
+            <a:lvl1pPr marL="457200" lvl="0" indent="-317500">
               <a:spcBef>
                 <a:spcPts val="0"/>
               </a:spcBef>
@@ -3361,7 +3345,7 @@
               <a:buChar char="●"/>
               <a:defRPr sz="1400"/>
             </a:lvl1pPr>
-            <a:lvl2pPr indent="-304800" lvl="1" marL="914400">
+            <a:lvl2pPr marL="914400" lvl="1" indent="-304800">
               <a:spcBef>
                 <a:spcPts val="1600"/>
               </a:spcBef>
@@ -3372,7 +3356,7 @@
               <a:buChar char="○"/>
               <a:defRPr sz="1200"/>
             </a:lvl2pPr>
-            <a:lvl3pPr indent="-304800" lvl="2" marL="1371600">
+            <a:lvl3pPr marL="1371600" lvl="2" indent="-304800">
               <a:spcBef>
                 <a:spcPts val="1600"/>
               </a:spcBef>
@@ -3383,7 +3367,7 @@
               <a:buChar char="■"/>
               <a:defRPr sz="1200"/>
             </a:lvl3pPr>
-            <a:lvl4pPr indent="-304800" lvl="3" marL="1828800">
+            <a:lvl4pPr marL="1828800" lvl="3" indent="-304800">
               <a:spcBef>
                 <a:spcPts val="1600"/>
               </a:spcBef>
@@ -3394,7 +3378,7 @@
               <a:buChar char="●"/>
               <a:defRPr sz="1200"/>
             </a:lvl4pPr>
-            <a:lvl5pPr indent="-304800" lvl="4" marL="2286000">
+            <a:lvl5pPr marL="2286000" lvl="4" indent="-304800">
               <a:spcBef>
                 <a:spcPts val="1600"/>
               </a:spcBef>
@@ -3405,7 +3389,7 @@
               <a:buChar char="○"/>
               <a:defRPr sz="1200"/>
             </a:lvl5pPr>
-            <a:lvl6pPr indent="-304800" lvl="5" marL="2743200">
+            <a:lvl6pPr marL="2743200" lvl="5" indent="-304800">
               <a:spcBef>
                 <a:spcPts val="1600"/>
               </a:spcBef>
@@ -3416,7 +3400,7 @@
               <a:buChar char="■"/>
               <a:defRPr sz="1200"/>
             </a:lvl6pPr>
-            <a:lvl7pPr indent="-304800" lvl="6" marL="3200400">
+            <a:lvl7pPr marL="3200400" lvl="6" indent="-304800">
               <a:spcBef>
                 <a:spcPts val="1600"/>
               </a:spcBef>
@@ -3427,7 +3411,7 @@
               <a:buChar char="●"/>
               <a:defRPr sz="1200"/>
             </a:lvl7pPr>
-            <a:lvl8pPr indent="-304800" lvl="7" marL="3657600">
+            <a:lvl8pPr marL="3657600" lvl="7" indent="-304800">
               <a:spcBef>
                 <a:spcPts val="1600"/>
               </a:spcBef>
@@ -3438,7 +3422,7 @@
               <a:buChar char="○"/>
               <a:defRPr sz="1200"/>
             </a:lvl8pPr>
-            <a:lvl9pPr indent="-304800" lvl="8" marL="4114800">
+            <a:lvl9pPr marL="4114800" lvl="8" indent="-304800">
               <a:spcBef>
                 <a:spcPts val="1600"/>
               </a:spcBef>
@@ -3450,15 +3434,19 @@
               <a:defRPr sz="1200"/>
             </a:lvl9pPr>
           </a:lstStyle>
-          <a:p/>
+          <a:p>
+            <a:endParaRPr/>
+          </a:p>
         </p:txBody>
       </p:sp>
       <p:sp>
         <p:nvSpPr>
           <p:cNvPr id="27" name="Google Shape;27;p5"/>
-          <p:cNvSpPr txBox="1"/>
+          <p:cNvSpPr txBox="1">
+            <a:spLocks noGrp="1"/>
+          </p:cNvSpPr>
           <p:nvPr>
-            <p:ph idx="2" type="body"/>
+            <p:ph type="body" idx="2"/>
           </p:nvPr>
         </p:nvSpPr>
         <p:spPr>
@@ -3471,9 +3459,9 @@
           </a:prstGeom>
         </p:spPr>
         <p:txBody>
-          <a:bodyPr anchorCtr="0" anchor="t" bIns="91425" lIns="91425" spcFirstLastPara="1" rIns="91425" wrap="square" tIns="91425"/>
+          <a:bodyPr spcFirstLastPara="1" wrap="square" lIns="91425" tIns="91425" rIns="91425" bIns="91425" anchor="t" anchorCtr="0"/>
           <a:lstStyle>
-            <a:lvl1pPr indent="-317500" lvl="0" marL="457200">
+            <a:lvl1pPr marL="457200" lvl="0" indent="-317500">
               <a:spcBef>
                 <a:spcPts val="0"/>
               </a:spcBef>
@@ -3484,7 +3472,7 @@
               <a:buChar char="●"/>
               <a:defRPr sz="1400"/>
             </a:lvl1pPr>
-            <a:lvl2pPr indent="-304800" lvl="1" marL="914400">
+            <a:lvl2pPr marL="914400" lvl="1" indent="-304800">
               <a:spcBef>
                 <a:spcPts val="1600"/>
               </a:spcBef>
@@ -3495,7 +3483,7 @@
               <a:buChar char="○"/>
               <a:defRPr sz="1200"/>
             </a:lvl2pPr>
-            <a:lvl3pPr indent="-304800" lvl="2" marL="1371600">
+            <a:lvl3pPr marL="1371600" lvl="2" indent="-304800">
               <a:spcBef>
                 <a:spcPts val="1600"/>
               </a:spcBef>
@@ -3506,7 +3494,7 @@
               <a:buChar char="■"/>
               <a:defRPr sz="1200"/>
             </a:lvl3pPr>
-            <a:lvl4pPr indent="-304800" lvl="3" marL="1828800">
+            <a:lvl4pPr marL="1828800" lvl="3" indent="-304800">
               <a:spcBef>
                 <a:spcPts val="1600"/>
               </a:spcBef>
@@ -3517,7 +3505,7 @@
               <a:buChar char="●"/>
               <a:defRPr sz="1200"/>
             </a:lvl4pPr>
-            <a:lvl5pPr indent="-304800" lvl="4" marL="2286000">
+            <a:lvl5pPr marL="2286000" lvl="4" indent="-304800">
               <a:spcBef>
                 <a:spcPts val="1600"/>
               </a:spcBef>
@@ -3528,7 +3516,7 @@
               <a:buChar char="○"/>
               <a:defRPr sz="1200"/>
             </a:lvl5pPr>
-            <a:lvl6pPr indent="-304800" lvl="5" marL="2743200">
+            <a:lvl6pPr marL="2743200" lvl="5" indent="-304800">
               <a:spcBef>
                 <a:spcPts val="1600"/>
               </a:spcBef>
@@ -3539,7 +3527,7 @@
               <a:buChar char="■"/>
               <a:defRPr sz="1200"/>
             </a:lvl6pPr>
-            <a:lvl7pPr indent="-304800" lvl="6" marL="3200400">
+            <a:lvl7pPr marL="3200400" lvl="6" indent="-304800">
               <a:spcBef>
                 <a:spcPts val="1600"/>
               </a:spcBef>
@@ -3550,7 +3538,7 @@
               <a:buChar char="●"/>
               <a:defRPr sz="1200"/>
             </a:lvl7pPr>
-            <a:lvl8pPr indent="-304800" lvl="7" marL="3657600">
+            <a:lvl8pPr marL="3657600" lvl="7" indent="-304800">
               <a:spcBef>
                 <a:spcPts val="1600"/>
               </a:spcBef>
@@ -3561,7 +3549,7 @@
               <a:buChar char="○"/>
               <a:defRPr sz="1200"/>
             </a:lvl8pPr>
-            <a:lvl9pPr indent="-304800" lvl="8" marL="4114800">
+            <a:lvl9pPr marL="4114800" lvl="8" indent="-304800">
               <a:spcBef>
                 <a:spcPts val="1600"/>
               </a:spcBef>
@@ -3573,15 +3561,19 @@
               <a:defRPr sz="1200"/>
             </a:lvl9pPr>
           </a:lstStyle>
-          <a:p/>
+          <a:p>
+            <a:endParaRPr/>
+          </a:p>
         </p:txBody>
       </p:sp>
       <p:sp>
         <p:nvSpPr>
           <p:cNvPr id="28" name="Google Shape;28;p5"/>
-          <p:cNvSpPr txBox="1"/>
+          <p:cNvSpPr txBox="1">
+            <a:spLocks noGrp="1"/>
+          </p:cNvSpPr>
           <p:nvPr>
-            <p:ph idx="12" type="sldNum"/>
+            <p:ph type="sldNum" idx="12"/>
           </p:nvPr>
         </p:nvSpPr>
         <p:spPr>
@@ -3594,7 +3586,7 @@
           </a:prstGeom>
         </p:spPr>
         <p:txBody>
-          <a:bodyPr anchorCtr="0" anchor="ctr" bIns="91425" lIns="91425" spcFirstLastPara="1" rIns="91425" wrap="square" tIns="91425">
+          <a:bodyPr spcFirstLastPara="1" wrap="square" lIns="91425" tIns="91425" rIns="91425" bIns="91425" anchor="ctr" anchorCtr="0">
             <a:noAutofit/>
           </a:bodyPr>
           <a:lstStyle>
@@ -3636,7 +3628,7 @@
             </a:lvl9pPr>
           </a:lstStyle>
           <a:p>
-            <a:pPr indent="0" lvl="0" marL="0" rtl="0" algn="r">
+            <a:pPr marL="0" lvl="0" indent="0" algn="r" rtl="0">
               <a:spcBef>
                 <a:spcPts val="0"/>
               </a:spcBef>
@@ -3662,11 +3654,11 @@
 </file>
 
 <file path=ppt/slideLayouts/slideLayout5.xml><?xml version="1.0" encoding="utf-8"?>
-<p:sldLayout xmlns:a="http://schemas.openxmlformats.org/drawingml/2006/main" xmlns:r="http://schemas.openxmlformats.org/officeDocument/2006/relationships" xmlns:mc="http://schemas.openxmlformats.org/markup-compatibility/2006" xmlns:mv="urn:schemas-microsoft-com:mac:vml" xmlns:p="http://schemas.openxmlformats.org/presentationml/2006/main" xmlns:c="http://schemas.openxmlformats.org/drawingml/2006/chart" xmlns:dgm="http://schemas.openxmlformats.org/drawingml/2006/diagram" xmlns:o="urn:schemas-microsoft-com:office:office" xmlns:v="urn:schemas-microsoft-com:vml" xmlns:pvml="urn:schemas-microsoft-com:office:powerpoint" xmlns:com="http://schemas.openxmlformats.org/drawingml/2006/compatibility" xmlns:p14="http://schemas.microsoft.com/office/powerpoint/2010/main" xmlns:p15="http://schemas.microsoft.com/office/powerpoint/2012/main" matchingName="Title only" type="titleOnly">
+<p:sldLayout xmlns:a="http://schemas.openxmlformats.org/drawingml/2006/main" xmlns:r="http://schemas.openxmlformats.org/officeDocument/2006/relationships" xmlns:p="http://schemas.openxmlformats.org/presentationml/2006/main" matchingName="Title only" type="titleOnly">
   <p:cSld name="TITLE_ONLY">
     <p:spTree>
       <p:nvGrpSpPr>
-        <p:cNvPr id="29" name="Shape 29"/>
+        <p:cNvPr id="1" name="Shape 29"/>
         <p:cNvGrpSpPr/>
         <p:nvPr/>
       </p:nvGrpSpPr>
@@ -3681,7 +3673,9 @@
       <p:sp>
         <p:nvSpPr>
           <p:cNvPr id="30" name="Google Shape;30;p6"/>
-          <p:cNvSpPr txBox="1"/>
+          <p:cNvSpPr txBox="1">
+            <a:spLocks noGrp="1"/>
+          </p:cNvSpPr>
           <p:nvPr>
             <p:ph type="title"/>
           </p:nvPr>
@@ -3696,7 +3690,7 @@
           </a:prstGeom>
         </p:spPr>
         <p:txBody>
-          <a:bodyPr anchorCtr="0" anchor="t" bIns="91425" lIns="91425" spcFirstLastPara="1" rIns="91425" wrap="square" tIns="91425"/>
+          <a:bodyPr spcFirstLastPara="1" wrap="square" lIns="91425" tIns="91425" rIns="91425" bIns="91425" anchor="t" anchorCtr="0"/>
           <a:lstStyle>
             <a:lvl1pPr lvl="0">
               <a:spcBef>
@@ -3798,15 +3792,19 @@
               <a:defRPr/>
             </a:lvl9pPr>
           </a:lstStyle>
-          <a:p/>
+          <a:p>
+            <a:endParaRPr/>
+          </a:p>
         </p:txBody>
       </p:sp>
       <p:sp>
         <p:nvSpPr>
           <p:cNvPr id="31" name="Google Shape;31;p6"/>
-          <p:cNvSpPr txBox="1"/>
+          <p:cNvSpPr txBox="1">
+            <a:spLocks noGrp="1"/>
+          </p:cNvSpPr>
           <p:nvPr>
-            <p:ph idx="12" type="sldNum"/>
+            <p:ph type="sldNum" idx="12"/>
           </p:nvPr>
         </p:nvSpPr>
         <p:spPr>
@@ -3819,7 +3817,7 @@
           </a:prstGeom>
         </p:spPr>
         <p:txBody>
-          <a:bodyPr anchorCtr="0" anchor="ctr" bIns="91425" lIns="91425" spcFirstLastPara="1" rIns="91425" wrap="square" tIns="91425">
+          <a:bodyPr spcFirstLastPara="1" wrap="square" lIns="91425" tIns="91425" rIns="91425" bIns="91425" anchor="ctr" anchorCtr="0">
             <a:noAutofit/>
           </a:bodyPr>
           <a:lstStyle>
@@ -3861,7 +3859,7 @@
             </a:lvl9pPr>
           </a:lstStyle>
           <a:p>
-            <a:pPr indent="0" lvl="0" marL="0" rtl="0" algn="r">
+            <a:pPr marL="0" lvl="0" indent="0" algn="r" rtl="0">
               <a:spcBef>
                 <a:spcPts val="0"/>
               </a:spcBef>
@@ -3887,11 +3885,11 @@
 </file>
 
 <file path=ppt/slideLayouts/slideLayout6.xml><?xml version="1.0" encoding="utf-8"?>
-<p:sldLayout xmlns:a="http://schemas.openxmlformats.org/drawingml/2006/main" xmlns:r="http://schemas.openxmlformats.org/officeDocument/2006/relationships" xmlns:mc="http://schemas.openxmlformats.org/markup-compatibility/2006" xmlns:mv="urn:schemas-microsoft-com:mac:vml" xmlns:p="http://schemas.openxmlformats.org/presentationml/2006/main" xmlns:c="http://schemas.openxmlformats.org/drawingml/2006/chart" xmlns:dgm="http://schemas.openxmlformats.org/drawingml/2006/diagram" xmlns:o="urn:schemas-microsoft-com:office:office" xmlns:v="urn:schemas-microsoft-com:vml" xmlns:pvml="urn:schemas-microsoft-com:office:powerpoint" xmlns:com="http://schemas.openxmlformats.org/drawingml/2006/compatibility" xmlns:p14="http://schemas.microsoft.com/office/powerpoint/2010/main" xmlns:p15="http://schemas.microsoft.com/office/powerpoint/2012/main" matchingName="One column text">
+<p:sldLayout xmlns:a="http://schemas.openxmlformats.org/drawingml/2006/main" xmlns:r="http://schemas.openxmlformats.org/officeDocument/2006/relationships" xmlns:p="http://schemas.openxmlformats.org/presentationml/2006/main" matchingName="One column text">
   <p:cSld name="ONE_COLUMN_TEXT">
     <p:spTree>
       <p:nvGrpSpPr>
-        <p:cNvPr id="32" name="Shape 32"/>
+        <p:cNvPr id="1" name="Shape 32"/>
         <p:cNvGrpSpPr/>
         <p:nvPr/>
       </p:nvGrpSpPr>
@@ -3906,7 +3904,9 @@
       <p:sp>
         <p:nvSpPr>
           <p:cNvPr id="33" name="Google Shape;33;p7"/>
-          <p:cNvSpPr txBox="1"/>
+          <p:cNvSpPr txBox="1">
+            <a:spLocks noGrp="1"/>
+          </p:cNvSpPr>
           <p:nvPr>
             <p:ph type="title"/>
           </p:nvPr>
@@ -3921,7 +3921,7 @@
           </a:prstGeom>
         </p:spPr>
         <p:txBody>
-          <a:bodyPr anchorCtr="0" anchor="b" bIns="91425" lIns="91425" spcFirstLastPara="1" rIns="91425" wrap="square" tIns="91425"/>
+          <a:bodyPr spcFirstLastPara="1" wrap="square" lIns="91425" tIns="91425" rIns="91425" bIns="91425" anchor="b" anchorCtr="0"/>
           <a:lstStyle>
             <a:lvl1pPr lvl="0">
               <a:spcBef>
@@ -4023,15 +4023,19 @@
               <a:defRPr sz="2400"/>
             </a:lvl9pPr>
           </a:lstStyle>
-          <a:p/>
+          <a:p>
+            <a:endParaRPr/>
+          </a:p>
         </p:txBody>
       </p:sp>
       <p:sp>
         <p:nvSpPr>
           <p:cNvPr id="34" name="Google Shape;34;p7"/>
-          <p:cNvSpPr txBox="1"/>
+          <p:cNvSpPr txBox="1">
+            <a:spLocks noGrp="1"/>
+          </p:cNvSpPr>
           <p:nvPr>
-            <p:ph idx="1" type="body"/>
+            <p:ph type="body" idx="1"/>
           </p:nvPr>
         </p:nvSpPr>
         <p:spPr>
@@ -4044,9 +4048,9 @@
           </a:prstGeom>
         </p:spPr>
         <p:txBody>
-          <a:bodyPr anchorCtr="0" anchor="t" bIns="91425" lIns="91425" spcFirstLastPara="1" rIns="91425" wrap="square" tIns="91425"/>
+          <a:bodyPr spcFirstLastPara="1" wrap="square" lIns="91425" tIns="91425" rIns="91425" bIns="91425" anchor="t" anchorCtr="0"/>
           <a:lstStyle>
-            <a:lvl1pPr indent="-304800" lvl="0" marL="457200">
+            <a:lvl1pPr marL="457200" lvl="0" indent="-304800">
               <a:spcBef>
                 <a:spcPts val="0"/>
               </a:spcBef>
@@ -4057,7 +4061,7 @@
               <a:buChar char="●"/>
               <a:defRPr sz="1200"/>
             </a:lvl1pPr>
-            <a:lvl2pPr indent="-304800" lvl="1" marL="914400">
+            <a:lvl2pPr marL="914400" lvl="1" indent="-304800">
               <a:spcBef>
                 <a:spcPts val="1600"/>
               </a:spcBef>
@@ -4068,7 +4072,7 @@
               <a:buChar char="○"/>
               <a:defRPr sz="1200"/>
             </a:lvl2pPr>
-            <a:lvl3pPr indent="-304800" lvl="2" marL="1371600">
+            <a:lvl3pPr marL="1371600" lvl="2" indent="-304800">
               <a:spcBef>
                 <a:spcPts val="1600"/>
               </a:spcBef>
@@ -4079,7 +4083,7 @@
               <a:buChar char="■"/>
               <a:defRPr sz="1200"/>
             </a:lvl3pPr>
-            <a:lvl4pPr indent="-304800" lvl="3" marL="1828800">
+            <a:lvl4pPr marL="1828800" lvl="3" indent="-304800">
               <a:spcBef>
                 <a:spcPts val="1600"/>
               </a:spcBef>
@@ -4090,7 +4094,7 @@
               <a:buChar char="●"/>
               <a:defRPr sz="1200"/>
             </a:lvl4pPr>
-            <a:lvl5pPr indent="-304800" lvl="4" marL="2286000">
+            <a:lvl5pPr marL="2286000" lvl="4" indent="-304800">
               <a:spcBef>
                 <a:spcPts val="1600"/>
               </a:spcBef>
@@ -4101,7 +4105,7 @@
               <a:buChar char="○"/>
               <a:defRPr sz="1200"/>
             </a:lvl5pPr>
-            <a:lvl6pPr indent="-304800" lvl="5" marL="2743200">
+            <a:lvl6pPr marL="2743200" lvl="5" indent="-304800">
               <a:spcBef>
                 <a:spcPts val="1600"/>
               </a:spcBef>
@@ -4112,7 +4116,7 @@
               <a:buChar char="■"/>
               <a:defRPr sz="1200"/>
             </a:lvl6pPr>
-            <a:lvl7pPr indent="-304800" lvl="6" marL="3200400">
+            <a:lvl7pPr marL="3200400" lvl="6" indent="-304800">
               <a:spcBef>
                 <a:spcPts val="1600"/>
               </a:spcBef>
@@ -4123,7 +4127,7 @@
               <a:buChar char="●"/>
               <a:defRPr sz="1200"/>
             </a:lvl7pPr>
-            <a:lvl8pPr indent="-304800" lvl="7" marL="3657600">
+            <a:lvl8pPr marL="3657600" lvl="7" indent="-304800">
               <a:spcBef>
                 <a:spcPts val="1600"/>
               </a:spcBef>
@@ -4134,7 +4138,7 @@
               <a:buChar char="○"/>
               <a:defRPr sz="1200"/>
             </a:lvl8pPr>
-            <a:lvl9pPr indent="-304800" lvl="8" marL="4114800">
+            <a:lvl9pPr marL="4114800" lvl="8" indent="-304800">
               <a:spcBef>
                 <a:spcPts val="1600"/>
               </a:spcBef>
@@ -4146,15 +4150,19 @@
               <a:defRPr sz="1200"/>
             </a:lvl9pPr>
           </a:lstStyle>
-          <a:p/>
+          <a:p>
+            <a:endParaRPr/>
+          </a:p>
         </p:txBody>
       </p:sp>
       <p:sp>
         <p:nvSpPr>
           <p:cNvPr id="35" name="Google Shape;35;p7"/>
-          <p:cNvSpPr txBox="1"/>
+          <p:cNvSpPr txBox="1">
+            <a:spLocks noGrp="1"/>
+          </p:cNvSpPr>
           <p:nvPr>
-            <p:ph idx="12" type="sldNum"/>
+            <p:ph type="sldNum" idx="12"/>
           </p:nvPr>
         </p:nvSpPr>
         <p:spPr>
@@ -4167,7 +4175,7 @@
           </a:prstGeom>
         </p:spPr>
         <p:txBody>
-          <a:bodyPr anchorCtr="0" anchor="ctr" bIns="91425" lIns="91425" spcFirstLastPara="1" rIns="91425" wrap="square" tIns="91425">
+          <a:bodyPr spcFirstLastPara="1" wrap="square" lIns="91425" tIns="91425" rIns="91425" bIns="91425" anchor="ctr" anchorCtr="0">
             <a:noAutofit/>
           </a:bodyPr>
           <a:lstStyle>
@@ -4209,7 +4217,7 @@
             </a:lvl9pPr>
           </a:lstStyle>
           <a:p>
-            <a:pPr indent="0" lvl="0" marL="0" rtl="0" algn="r">
+            <a:pPr marL="0" lvl="0" indent="0" algn="r" rtl="0">
               <a:spcBef>
                 <a:spcPts val="0"/>
               </a:spcBef>
@@ -4235,18 +4243,19 @@
 </file>
 
 <file path=ppt/slideLayouts/slideLayout7.xml><?xml version="1.0" encoding="utf-8"?>
-<p:sldLayout xmlns:a="http://schemas.openxmlformats.org/drawingml/2006/main" xmlns:r="http://schemas.openxmlformats.org/officeDocument/2006/relationships" xmlns:mc="http://schemas.openxmlformats.org/markup-compatibility/2006" xmlns:mv="urn:schemas-microsoft-com:mac:vml" xmlns:p="http://schemas.openxmlformats.org/presentationml/2006/main" xmlns:c="http://schemas.openxmlformats.org/drawingml/2006/chart" xmlns:dgm="http://schemas.openxmlformats.org/drawingml/2006/diagram" xmlns:o="urn:schemas-microsoft-com:office:office" xmlns:v="urn:schemas-microsoft-com:vml" xmlns:pvml="urn:schemas-microsoft-com:office:powerpoint" xmlns:com="http://schemas.openxmlformats.org/drawingml/2006/compatibility" xmlns:p14="http://schemas.microsoft.com/office/powerpoint/2010/main" xmlns:p15="http://schemas.microsoft.com/office/powerpoint/2012/main" matchingName="Main point">
+<p:sldLayout xmlns:a="http://schemas.openxmlformats.org/drawingml/2006/main" xmlns:r="http://schemas.openxmlformats.org/officeDocument/2006/relationships" xmlns:p="http://schemas.openxmlformats.org/presentationml/2006/main" matchingName="Main point">
   <p:cSld name="MAIN_POINT">
     <p:bg>
       <p:bgPr>
         <a:solidFill>
           <a:schemeClr val="lt2"/>
         </a:solidFill>
+        <a:effectLst/>
       </p:bgPr>
     </p:bg>
     <p:spTree>
       <p:nvGrpSpPr>
-        <p:cNvPr id="36" name="Shape 36"/>
+        <p:cNvPr id="1" name="Shape 36"/>
         <p:cNvGrpSpPr/>
         <p:nvPr/>
       </p:nvGrpSpPr>
@@ -4261,7 +4270,9 @@
       <p:sp>
         <p:nvSpPr>
           <p:cNvPr id="37" name="Google Shape;37;p8"/>
-          <p:cNvSpPr txBox="1"/>
+          <p:cNvSpPr txBox="1">
+            <a:spLocks noGrp="1"/>
+          </p:cNvSpPr>
           <p:nvPr>
             <p:ph type="title"/>
           </p:nvPr>
@@ -4276,7 +4287,7 @@
           </a:prstGeom>
         </p:spPr>
         <p:txBody>
-          <a:bodyPr anchorCtr="0" anchor="ctr" bIns="91425" lIns="91425" spcFirstLastPara="1" rIns="91425" wrap="square" tIns="91425"/>
+          <a:bodyPr spcFirstLastPara="1" wrap="square" lIns="91425" tIns="91425" rIns="91425" bIns="91425" anchor="ctr" anchorCtr="0"/>
           <a:lstStyle>
             <a:lvl1pPr lvl="0">
               <a:spcBef>
@@ -4441,15 +4452,19 @@
               </a:defRPr>
             </a:lvl9pPr>
           </a:lstStyle>
-          <a:p/>
+          <a:p>
+            <a:endParaRPr/>
+          </a:p>
         </p:txBody>
       </p:sp>
       <p:sp>
         <p:nvSpPr>
           <p:cNvPr id="38" name="Google Shape;38;p8"/>
-          <p:cNvSpPr txBox="1"/>
+          <p:cNvSpPr txBox="1">
+            <a:spLocks noGrp="1"/>
+          </p:cNvSpPr>
           <p:nvPr>
-            <p:ph idx="12" type="sldNum"/>
+            <p:ph type="sldNum" idx="12"/>
           </p:nvPr>
         </p:nvSpPr>
         <p:spPr>
@@ -4462,7 +4477,7 @@
           </a:prstGeom>
         </p:spPr>
         <p:txBody>
-          <a:bodyPr anchorCtr="0" anchor="ctr" bIns="91425" lIns="91425" spcFirstLastPara="1" rIns="91425" wrap="square" tIns="91425">
+          <a:bodyPr spcFirstLastPara="1" wrap="square" lIns="91425" tIns="91425" rIns="91425" bIns="91425" anchor="ctr" anchorCtr="0">
             <a:noAutofit/>
           </a:bodyPr>
           <a:lstStyle>
@@ -4540,7 +4555,7 @@
             </a:lvl9pPr>
           </a:lstStyle>
           <a:p>
-            <a:pPr indent="0" lvl="0" marL="0" rtl="0" algn="r">
+            <a:pPr marL="0" lvl="0" indent="0" algn="r" rtl="0">
               <a:spcBef>
                 <a:spcPts val="0"/>
               </a:spcBef>
@@ -4566,11 +4581,11 @@
 </file>
 
 <file path=ppt/slideLayouts/slideLayout8.xml><?xml version="1.0" encoding="utf-8"?>
-<p:sldLayout xmlns:a="http://schemas.openxmlformats.org/drawingml/2006/main" xmlns:r="http://schemas.openxmlformats.org/officeDocument/2006/relationships" xmlns:mc="http://schemas.openxmlformats.org/markup-compatibility/2006" xmlns:mv="urn:schemas-microsoft-com:mac:vml" xmlns:p="http://schemas.openxmlformats.org/presentationml/2006/main" xmlns:c="http://schemas.openxmlformats.org/drawingml/2006/chart" xmlns:dgm="http://schemas.openxmlformats.org/drawingml/2006/diagram" xmlns:o="urn:schemas-microsoft-com:office:office" xmlns:v="urn:schemas-microsoft-com:vml" xmlns:pvml="urn:schemas-microsoft-com:office:powerpoint" xmlns:com="http://schemas.openxmlformats.org/drawingml/2006/compatibility" xmlns:p14="http://schemas.microsoft.com/office/powerpoint/2010/main" xmlns:p15="http://schemas.microsoft.com/office/powerpoint/2012/main" matchingName="Section title and description">
+<p:sldLayout xmlns:a="http://schemas.openxmlformats.org/drawingml/2006/main" xmlns:r="http://schemas.openxmlformats.org/officeDocument/2006/relationships" xmlns:p="http://schemas.openxmlformats.org/presentationml/2006/main" matchingName="Section title and description">
   <p:cSld name="SECTION_TITLE_AND_DESCRIPTION">
     <p:spTree>
       <p:nvGrpSpPr>
-        <p:cNvPr id="39" name="Shape 39"/>
+        <p:cNvPr id="1" name="Shape 39"/>
         <p:cNvGrpSpPr/>
         <p:nvPr/>
       </p:nvGrpSpPr>
@@ -4604,12 +4619,12 @@
           </a:ln>
         </p:spPr>
         <p:txBody>
-          <a:bodyPr anchorCtr="0" anchor="ctr" bIns="91425" lIns="91425" spcFirstLastPara="1" rIns="91425" wrap="square" tIns="91425">
+          <a:bodyPr spcFirstLastPara="1" wrap="square" lIns="91425" tIns="91425" rIns="91425" bIns="91425" anchor="ctr" anchorCtr="0">
             <a:noAutofit/>
           </a:bodyPr>
           <a:lstStyle/>
           <a:p>
-            <a:pPr indent="0" lvl="0" marL="0" rtl="0" algn="l">
+            <a:pPr marL="0" lvl="0" indent="0" algn="l" rtl="0">
               <a:spcBef>
                 <a:spcPts val="0"/>
               </a:spcBef>
@@ -4618,9 +4633,6 @@
               </a:spcAft>
               <a:buNone/>
             </a:pPr>
-            <a:r>
-              <a:t/>
-            </a:r>
             <a:endParaRPr/>
           </a:p>
         </p:txBody>
@@ -4640,21 +4652,23 @@
             <a:avLst/>
           </a:prstGeom>
           <a:noFill/>
-          <a:ln cap="flat" cmpd="sng" w="19050">
+          <a:ln w="19050" cap="flat" cmpd="sng">
             <a:solidFill>
               <a:schemeClr val="lt2"/>
             </a:solidFill>
             <a:prstDash val="solid"/>
             <a:round/>
-            <a:headEnd len="sm" w="sm" type="none"/>
-            <a:tailEnd len="sm" w="sm" type="none"/>
+            <a:headEnd type="none" w="sm" len="sm"/>
+            <a:tailEnd type="none" w="sm" len="sm"/>
           </a:ln>
         </p:spPr>
       </p:cxnSp>
       <p:sp>
         <p:nvSpPr>
           <p:cNvPr id="42" name="Google Shape;42;p9"/>
-          <p:cNvSpPr txBox="1"/>
+          <p:cNvSpPr txBox="1">
+            <a:spLocks noGrp="1"/>
+          </p:cNvSpPr>
           <p:nvPr>
             <p:ph type="title"/>
           </p:nvPr>
@@ -4669,7 +4683,7 @@
           </a:prstGeom>
         </p:spPr>
         <p:txBody>
-          <a:bodyPr anchorCtr="0" anchor="b" bIns="91425" lIns="91425" spcFirstLastPara="1" rIns="91425" wrap="square" tIns="91425"/>
+          <a:bodyPr spcFirstLastPara="1" wrap="square" lIns="91425" tIns="91425" rIns="91425" bIns="91425" anchor="b" anchorCtr="0"/>
           <a:lstStyle>
             <a:lvl1pPr lvl="0" algn="ctr">
               <a:spcBef>
@@ -4834,15 +4848,19 @@
               </a:defRPr>
             </a:lvl9pPr>
           </a:lstStyle>
-          <a:p/>
+          <a:p>
+            <a:endParaRPr/>
+          </a:p>
         </p:txBody>
       </p:sp>
       <p:sp>
         <p:nvSpPr>
           <p:cNvPr id="43" name="Google Shape;43;p9"/>
-          <p:cNvSpPr txBox="1"/>
+          <p:cNvSpPr txBox="1">
+            <a:spLocks noGrp="1"/>
+          </p:cNvSpPr>
           <p:nvPr>
-            <p:ph idx="1" type="subTitle"/>
+            <p:ph type="subTitle" idx="1"/>
           </p:nvPr>
         </p:nvSpPr>
         <p:spPr>
@@ -4855,7 +4873,7 @@
           </a:prstGeom>
         </p:spPr>
         <p:txBody>
-          <a:bodyPr anchorCtr="0" anchor="t" bIns="91425" lIns="91425" spcFirstLastPara="1" rIns="91425" wrap="square" tIns="91425"/>
+          <a:bodyPr spcFirstLastPara="1" wrap="square" lIns="91425" tIns="91425" rIns="91425" bIns="91425" anchor="t" anchorCtr="0"/>
           <a:lstStyle>
             <a:lvl1pPr lvl="0" algn="ctr">
               <a:lnSpc>
@@ -4984,15 +5002,19 @@
               <a:defRPr sz="2100"/>
             </a:lvl9pPr>
           </a:lstStyle>
-          <a:p/>
+          <a:p>
+            <a:endParaRPr/>
+          </a:p>
         </p:txBody>
       </p:sp>
       <p:sp>
         <p:nvSpPr>
           <p:cNvPr id="44" name="Google Shape;44;p9"/>
-          <p:cNvSpPr txBox="1"/>
+          <p:cNvSpPr txBox="1">
+            <a:spLocks noGrp="1"/>
+          </p:cNvSpPr>
           <p:nvPr>
-            <p:ph idx="2" type="body"/>
+            <p:ph type="body" idx="2"/>
           </p:nvPr>
         </p:nvSpPr>
         <p:spPr>
@@ -5005,9 +5027,9 @@
           </a:prstGeom>
         </p:spPr>
         <p:txBody>
-          <a:bodyPr anchorCtr="0" anchor="ctr" bIns="91425" lIns="91425" spcFirstLastPara="1" rIns="91425" wrap="square" tIns="91425"/>
+          <a:bodyPr spcFirstLastPara="1" wrap="square" lIns="91425" tIns="91425" rIns="91425" bIns="91425" anchor="ctr" anchorCtr="0"/>
           <a:lstStyle>
-            <a:lvl1pPr indent="-342900" lvl="0" marL="457200">
+            <a:lvl1pPr marL="457200" lvl="0" indent="-342900">
               <a:spcBef>
                 <a:spcPts val="0"/>
               </a:spcBef>
@@ -5025,7 +5047,7 @@
                 </a:solidFill>
               </a:defRPr>
             </a:lvl1pPr>
-            <a:lvl2pPr indent="-317500" lvl="1" marL="914400">
+            <a:lvl2pPr marL="914400" lvl="1" indent="-317500">
               <a:spcBef>
                 <a:spcPts val="1600"/>
               </a:spcBef>
@@ -5043,7 +5065,7 @@
                 </a:solidFill>
               </a:defRPr>
             </a:lvl2pPr>
-            <a:lvl3pPr indent="-317500" lvl="2" marL="1371600">
+            <a:lvl3pPr marL="1371600" lvl="2" indent="-317500">
               <a:spcBef>
                 <a:spcPts val="1600"/>
               </a:spcBef>
@@ -5061,7 +5083,7 @@
                 </a:solidFill>
               </a:defRPr>
             </a:lvl3pPr>
-            <a:lvl4pPr indent="-317500" lvl="3" marL="1828800">
+            <a:lvl4pPr marL="1828800" lvl="3" indent="-317500">
               <a:spcBef>
                 <a:spcPts val="1600"/>
               </a:spcBef>
@@ -5079,7 +5101,7 @@
                 </a:solidFill>
               </a:defRPr>
             </a:lvl4pPr>
-            <a:lvl5pPr indent="-317500" lvl="4" marL="2286000">
+            <a:lvl5pPr marL="2286000" lvl="4" indent="-317500">
               <a:spcBef>
                 <a:spcPts val="1600"/>
               </a:spcBef>
@@ -5097,7 +5119,7 @@
                 </a:solidFill>
               </a:defRPr>
             </a:lvl5pPr>
-            <a:lvl6pPr indent="-317500" lvl="5" marL="2743200">
+            <a:lvl6pPr marL="2743200" lvl="5" indent="-317500">
               <a:spcBef>
                 <a:spcPts val="1600"/>
               </a:spcBef>
@@ -5115,7 +5137,7 @@
                 </a:solidFill>
               </a:defRPr>
             </a:lvl6pPr>
-            <a:lvl7pPr indent="-317500" lvl="6" marL="3200400">
+            <a:lvl7pPr marL="3200400" lvl="6" indent="-317500">
               <a:spcBef>
                 <a:spcPts val="1600"/>
               </a:spcBef>
@@ -5133,7 +5155,7 @@
                 </a:solidFill>
               </a:defRPr>
             </a:lvl7pPr>
-            <a:lvl8pPr indent="-317500" lvl="7" marL="3657600">
+            <a:lvl8pPr marL="3657600" lvl="7" indent="-317500">
               <a:spcBef>
                 <a:spcPts val="1600"/>
               </a:spcBef>
@@ -5151,7 +5173,7 @@
                 </a:solidFill>
               </a:defRPr>
             </a:lvl8pPr>
-            <a:lvl9pPr indent="-317500" lvl="8" marL="4114800">
+            <a:lvl9pPr marL="4114800" lvl="8" indent="-317500">
               <a:spcBef>
                 <a:spcPts val="1600"/>
               </a:spcBef>
@@ -5170,15 +5192,19 @@
               </a:defRPr>
             </a:lvl9pPr>
           </a:lstStyle>
-          <a:p/>
+          <a:p>
+            <a:endParaRPr/>
+          </a:p>
         </p:txBody>
       </p:sp>
       <p:sp>
         <p:nvSpPr>
           <p:cNvPr id="45" name="Google Shape;45;p9"/>
-          <p:cNvSpPr txBox="1"/>
+          <p:cNvSpPr txBox="1">
+            <a:spLocks noGrp="1"/>
+          </p:cNvSpPr>
           <p:nvPr>
-            <p:ph idx="12" type="sldNum"/>
+            <p:ph type="sldNum" idx="12"/>
           </p:nvPr>
         </p:nvSpPr>
         <p:spPr>
@@ -5191,7 +5217,7 @@
           </a:prstGeom>
         </p:spPr>
         <p:txBody>
-          <a:bodyPr anchorCtr="0" anchor="ctr" bIns="91425" lIns="91425" spcFirstLastPara="1" rIns="91425" wrap="square" tIns="91425">
+          <a:bodyPr spcFirstLastPara="1" wrap="square" lIns="91425" tIns="91425" rIns="91425" bIns="91425" anchor="ctr" anchorCtr="0">
             <a:noAutofit/>
           </a:bodyPr>
           <a:lstStyle>
@@ -5269,7 +5295,7 @@
             </a:lvl9pPr>
           </a:lstStyle>
           <a:p>
-            <a:pPr indent="0" lvl="0" marL="0" rtl="0" algn="r">
+            <a:pPr marL="0" lvl="0" indent="0" algn="r" rtl="0">
               <a:spcBef>
                 <a:spcPts val="0"/>
               </a:spcBef>
@@ -5295,11 +5321,11 @@
 </file>
 
 <file path=ppt/slideLayouts/slideLayout9.xml><?xml version="1.0" encoding="utf-8"?>
-<p:sldLayout xmlns:a="http://schemas.openxmlformats.org/drawingml/2006/main" xmlns:r="http://schemas.openxmlformats.org/officeDocument/2006/relationships" xmlns:mc="http://schemas.openxmlformats.org/markup-compatibility/2006" xmlns:mv="urn:schemas-microsoft-com:mac:vml" xmlns:p="http://schemas.openxmlformats.org/presentationml/2006/main" xmlns:c="http://schemas.openxmlformats.org/drawingml/2006/chart" xmlns:dgm="http://schemas.openxmlformats.org/drawingml/2006/diagram" xmlns:o="urn:schemas-microsoft-com:office:office" xmlns:v="urn:schemas-microsoft-com:vml" xmlns:pvml="urn:schemas-microsoft-com:office:powerpoint" xmlns:com="http://schemas.openxmlformats.org/drawingml/2006/compatibility" xmlns:p14="http://schemas.microsoft.com/office/powerpoint/2010/main" xmlns:p15="http://schemas.microsoft.com/office/powerpoint/2012/main" matchingName="Caption">
+<p:sldLayout xmlns:a="http://schemas.openxmlformats.org/drawingml/2006/main" xmlns:r="http://schemas.openxmlformats.org/officeDocument/2006/relationships" xmlns:p="http://schemas.openxmlformats.org/presentationml/2006/main" matchingName="Caption">
   <p:cSld name="CAPTION_ONLY">
     <p:spTree>
       <p:nvGrpSpPr>
-        <p:cNvPr id="46" name="Shape 46"/>
+        <p:cNvPr id="1" name="Shape 46"/>
         <p:cNvGrpSpPr/>
         <p:nvPr/>
       </p:nvGrpSpPr>
@@ -5314,9 +5340,11 @@
       <p:sp>
         <p:nvSpPr>
           <p:cNvPr id="47" name="Google Shape;47;p10"/>
-          <p:cNvSpPr txBox="1"/>
+          <p:cNvSpPr txBox="1">
+            <a:spLocks noGrp="1"/>
+          </p:cNvSpPr>
           <p:nvPr>
-            <p:ph idx="1" type="body"/>
+            <p:ph type="body" idx="1"/>
           </p:nvPr>
         </p:nvSpPr>
         <p:spPr>
@@ -5329,9 +5357,9 @@
           </a:prstGeom>
         </p:spPr>
         <p:txBody>
-          <a:bodyPr anchorCtr="0" anchor="ctr" bIns="91425" lIns="91425" spcFirstLastPara="1" rIns="91425" wrap="square" tIns="91425"/>
+          <a:bodyPr spcFirstLastPara="1" wrap="square" lIns="91425" tIns="91425" rIns="91425" bIns="91425" anchor="ctr" anchorCtr="0"/>
           <a:lstStyle>
-            <a:lvl1pPr indent="-228600" lvl="0" marL="457200">
+            <a:lvl1pPr marL="457200" lvl="0" indent="-228600">
               <a:lnSpc>
                 <a:spcPct val="100000"/>
               </a:lnSpc>
@@ -5346,15 +5374,19 @@
               <a:defRPr/>
             </a:lvl1pPr>
           </a:lstStyle>
-          <a:p/>
+          <a:p>
+            <a:endParaRPr/>
+          </a:p>
         </p:txBody>
       </p:sp>
       <p:sp>
         <p:nvSpPr>
           <p:cNvPr id="48" name="Google Shape;48;p10"/>
-          <p:cNvSpPr txBox="1"/>
+          <p:cNvSpPr txBox="1">
+            <a:spLocks noGrp="1"/>
+          </p:cNvSpPr>
           <p:nvPr>
-            <p:ph idx="12" type="sldNum"/>
+            <p:ph type="sldNum" idx="12"/>
           </p:nvPr>
         </p:nvSpPr>
         <p:spPr>
@@ -5367,7 +5399,7 @@
           </a:prstGeom>
         </p:spPr>
         <p:txBody>
-          <a:bodyPr anchorCtr="0" anchor="ctr" bIns="91425" lIns="91425" spcFirstLastPara="1" rIns="91425" wrap="square" tIns="91425">
+          <a:bodyPr spcFirstLastPara="1" wrap="square" lIns="91425" tIns="91425" rIns="91425" bIns="91425" anchor="ctr" anchorCtr="0">
             <a:noAutofit/>
           </a:bodyPr>
           <a:lstStyle>
@@ -5409,7 +5441,7 @@
             </a:lvl9pPr>
           </a:lstStyle>
           <a:p>
-            <a:pPr indent="0" lvl="0" marL="0" rtl="0" algn="r">
+            <a:pPr marL="0" lvl="0" indent="0" algn="r" rtl="0">
               <a:spcBef>
                 <a:spcPts val="0"/>
               </a:spcBef>
@@ -5435,18 +5467,19 @@
 </file>
 
 <file path=ppt/slideMasters/slideMaster1.xml><?xml version="1.0" encoding="utf-8"?>
-<p:sldMaster xmlns:a="http://schemas.openxmlformats.org/drawingml/2006/main" xmlns:r="http://schemas.openxmlformats.org/officeDocument/2006/relationships" xmlns:mc="http://schemas.openxmlformats.org/markup-compatibility/2006" xmlns:mv="urn:schemas-microsoft-com:mac:vml" xmlns:p="http://schemas.openxmlformats.org/presentationml/2006/main" xmlns:c="http://schemas.openxmlformats.org/drawingml/2006/chart" xmlns:dgm="http://schemas.openxmlformats.org/drawingml/2006/diagram" xmlns:o="urn:schemas-microsoft-com:office:office" xmlns:v="urn:schemas-microsoft-com:vml" xmlns:pvml="urn:schemas-microsoft-com:office:powerpoint" xmlns:com="http://schemas.openxmlformats.org/drawingml/2006/compatibility" xmlns:p14="http://schemas.microsoft.com/office/powerpoint/2010/main" xmlns:p15="http://schemas.microsoft.com/office/powerpoint/2012/main">
+<p:sldMaster xmlns:a="http://schemas.openxmlformats.org/drawingml/2006/main" xmlns:r="http://schemas.openxmlformats.org/officeDocument/2006/relationships" xmlns:p="http://schemas.openxmlformats.org/presentationml/2006/main">
   <p:cSld name="paperback">
     <p:bg>
       <p:bgPr>
         <a:solidFill>
           <a:schemeClr val="accent1"/>
         </a:solidFill>
+        <a:effectLst/>
       </p:bgPr>
     </p:bg>
     <p:spTree>
       <p:nvGrpSpPr>
-        <p:cNvPr id="5" name="Shape 5"/>
+        <p:cNvPr id="1" name="Shape 5"/>
         <p:cNvGrpSpPr/>
         <p:nvPr/>
       </p:nvGrpSpPr>
@@ -5461,7 +5494,9 @@
       <p:sp>
         <p:nvSpPr>
           <p:cNvPr id="6" name="Google Shape;6;p1"/>
-          <p:cNvSpPr txBox="1"/>
+          <p:cNvSpPr txBox="1">
+            <a:spLocks noGrp="1"/>
+          </p:cNvSpPr>
           <p:nvPr>
             <p:ph type="title"/>
           </p:nvPr>
@@ -5480,7 +5515,7 @@
           </a:ln>
         </p:spPr>
         <p:txBody>
-          <a:bodyPr anchorCtr="0" anchor="t" bIns="91425" lIns="91425" spcFirstLastPara="1" rIns="91425" wrap="square" tIns="91425"/>
+          <a:bodyPr spcFirstLastPara="1" wrap="square" lIns="91425" tIns="91425" rIns="91425" bIns="91425" anchor="t" anchorCtr="0"/>
           <a:lstStyle>
             <a:lvl1pPr lvl="0">
               <a:spcBef>
@@ -5690,15 +5725,19 @@
               </a:defRPr>
             </a:lvl9pPr>
           </a:lstStyle>
-          <a:p/>
+          <a:p>
+            <a:endParaRPr/>
+          </a:p>
         </p:txBody>
       </p:sp>
       <p:sp>
         <p:nvSpPr>
           <p:cNvPr id="7" name="Google Shape;7;p1"/>
-          <p:cNvSpPr txBox="1"/>
+          <p:cNvSpPr txBox="1">
+            <a:spLocks noGrp="1"/>
+          </p:cNvSpPr>
           <p:nvPr>
-            <p:ph idx="1" type="body"/>
+            <p:ph type="body" idx="1"/>
           </p:nvPr>
         </p:nvSpPr>
         <p:spPr>
@@ -5715,9 +5754,9 @@
           </a:ln>
         </p:spPr>
         <p:txBody>
-          <a:bodyPr anchorCtr="0" anchor="t" bIns="91425" lIns="91425" spcFirstLastPara="1" rIns="91425" wrap="square" tIns="91425"/>
+          <a:bodyPr spcFirstLastPara="1" wrap="square" lIns="91425" tIns="91425" rIns="91425" bIns="91425" anchor="t" anchorCtr="0"/>
           <a:lstStyle>
-            <a:lvl1pPr indent="-342900" lvl="0" marL="457200">
+            <a:lvl1pPr marL="457200" lvl="0" indent="-342900">
               <a:lnSpc>
                 <a:spcPct val="115000"/>
               </a:lnSpc>
@@ -5743,7 +5782,7 @@
                 <a:sym typeface="Old Standard TT"/>
               </a:defRPr>
             </a:lvl1pPr>
-            <a:lvl2pPr indent="-317500" lvl="1" marL="914400">
+            <a:lvl2pPr marL="914400" lvl="1" indent="-317500">
               <a:lnSpc>
                 <a:spcPct val="115000"/>
               </a:lnSpc>
@@ -5769,7 +5808,7 @@
                 <a:sym typeface="Old Standard TT"/>
               </a:defRPr>
             </a:lvl2pPr>
-            <a:lvl3pPr indent="-317500" lvl="2" marL="1371600">
+            <a:lvl3pPr marL="1371600" lvl="2" indent="-317500">
               <a:lnSpc>
                 <a:spcPct val="115000"/>
               </a:lnSpc>
@@ -5795,7 +5834,7 @@
                 <a:sym typeface="Old Standard TT"/>
               </a:defRPr>
             </a:lvl3pPr>
-            <a:lvl4pPr indent="-317500" lvl="3" marL="1828800">
+            <a:lvl4pPr marL="1828800" lvl="3" indent="-317500">
               <a:lnSpc>
                 <a:spcPct val="115000"/>
               </a:lnSpc>
@@ -5821,7 +5860,7 @@
                 <a:sym typeface="Old Standard TT"/>
               </a:defRPr>
             </a:lvl4pPr>
-            <a:lvl5pPr indent="-317500" lvl="4" marL="2286000">
+            <a:lvl5pPr marL="2286000" lvl="4" indent="-317500">
               <a:lnSpc>
                 <a:spcPct val="115000"/>
               </a:lnSpc>
@@ -5847,7 +5886,7 @@
                 <a:sym typeface="Old Standard TT"/>
               </a:defRPr>
             </a:lvl5pPr>
-            <a:lvl6pPr indent="-317500" lvl="5" marL="2743200">
+            <a:lvl6pPr marL="2743200" lvl="5" indent="-317500">
               <a:lnSpc>
                 <a:spcPct val="115000"/>
               </a:lnSpc>
@@ -5873,7 +5912,7 @@
                 <a:sym typeface="Old Standard TT"/>
               </a:defRPr>
             </a:lvl6pPr>
-            <a:lvl7pPr indent="-317500" lvl="6" marL="3200400">
+            <a:lvl7pPr marL="3200400" lvl="6" indent="-317500">
               <a:lnSpc>
                 <a:spcPct val="115000"/>
               </a:lnSpc>
@@ -5899,7 +5938,7 @@
                 <a:sym typeface="Old Standard TT"/>
               </a:defRPr>
             </a:lvl7pPr>
-            <a:lvl8pPr indent="-317500" lvl="7" marL="3657600">
+            <a:lvl8pPr marL="3657600" lvl="7" indent="-317500">
               <a:lnSpc>
                 <a:spcPct val="115000"/>
               </a:lnSpc>
@@ -5925,7 +5964,7 @@
                 <a:sym typeface="Old Standard TT"/>
               </a:defRPr>
             </a:lvl8pPr>
-            <a:lvl9pPr indent="-317500" lvl="8" marL="4114800">
+            <a:lvl9pPr marL="4114800" lvl="8" indent="-317500">
               <a:lnSpc>
                 <a:spcPct val="115000"/>
               </a:lnSpc>
@@ -5952,15 +5991,19 @@
               </a:defRPr>
             </a:lvl9pPr>
           </a:lstStyle>
-          <a:p/>
+          <a:p>
+            <a:endParaRPr/>
+          </a:p>
         </p:txBody>
       </p:sp>
       <p:sp>
         <p:nvSpPr>
           <p:cNvPr id="8" name="Google Shape;8;p1"/>
-          <p:cNvSpPr txBox="1"/>
+          <p:cNvSpPr txBox="1">
+            <a:spLocks noGrp="1"/>
+          </p:cNvSpPr>
           <p:nvPr>
-            <p:ph idx="12" type="sldNum"/>
+            <p:ph type="sldNum" idx="12"/>
           </p:nvPr>
         </p:nvSpPr>
         <p:spPr>
@@ -5977,7 +6020,7 @@
           </a:ln>
         </p:spPr>
         <p:txBody>
-          <a:bodyPr anchorCtr="0" anchor="ctr" bIns="91425" lIns="91425" spcFirstLastPara="1" rIns="91425" wrap="square" tIns="91425">
+          <a:bodyPr spcFirstLastPara="1" wrap="square" lIns="91425" tIns="91425" rIns="91425" bIns="91425" anchor="ctr" anchorCtr="0">
             <a:noAutofit/>
           </a:bodyPr>
           <a:lstStyle>
@@ -6091,7 +6134,7 @@
             </a:lvl9pPr>
           </a:lstStyle>
           <a:p>
-            <a:pPr indent="0" lvl="0" marL="0" rtl="0" algn="r">
+            <a:pPr marL="0" lvl="0" indent="0" algn="r" rtl="0">
               <a:spcBef>
                 <a:spcPts val="0"/>
               </a:spcBef>
@@ -6110,7 +6153,7 @@
       </p:sp>
     </p:spTree>
   </p:cSld>
-  <p:clrMap accent1="accent1" accent2="accent2" accent3="accent3" accent4="accent4" accent5="accent5" accent6="accent6" bg1="lt1" bg2="dk2" tx1="dk1" tx2="lt2" folHlink="folHlink" hlink="hlink"/>
+  <p:clrMap bg1="lt1" tx1="dk1" bg2="dk2" tx2="lt2" accent1="accent1" accent2="accent2" accent3="accent3" accent4="accent4" accent5="accent5" accent6="accent6" hlink="hlink" folHlink="folHlink"/>
   <p:sldLayoutIdLst>
     <p:sldLayoutId id="2147483648" r:id="rId1"/>
     <p:sldLayoutId id="2147483649" r:id="rId2"/>
@@ -6124,10 +6167,10 @@
     <p:sldLayoutId id="2147483657" r:id="rId10"/>
     <p:sldLayoutId id="2147483658" r:id="rId11"/>
   </p:sldLayoutIdLst>
-  <p:hf dt="0" ftr="0" hdr="0" sldNum="0"/>
+  <p:hf sldNum="0" hdr="0" ftr="0" dt="0"/>
   <p:txStyles>
     <p:titleStyle>
-      <a:defPPr lvl="0" marR="0" rtl="0" algn="l">
+      <a:defPPr marR="0" lvl="0" algn="l" rtl="0">
         <a:lnSpc>
           <a:spcPct val="100000"/>
         </a:lnSpc>
@@ -6138,7 +6181,7 @@
           <a:spcPts val="0"/>
         </a:spcAft>
       </a:defPPr>
-      <a:lvl1pPr lvl="0" marR="0" rtl="0" algn="l">
+      <a:lvl1pPr marR="0" lvl="0" algn="l" rtl="0">
         <a:lnSpc>
           <a:spcPct val="100000"/>
         </a:lnSpc>
@@ -6152,7 +6195,7 @@
           <a:srgbClr val="000000"/>
         </a:buClr>
         <a:buFont typeface="Arial"/>
-        <a:defRPr b="0" i="0" sz="1400" u="none" cap="none" strike="noStrike">
+        <a:defRPr sz="1400" b="0" i="0" u="none" strike="noStrike" cap="none">
           <a:solidFill>
             <a:srgbClr val="000000"/>
           </a:solidFill>
@@ -6162,7 +6205,7 @@
           <a:sym typeface="Arial"/>
         </a:defRPr>
       </a:lvl1pPr>
-      <a:lvl2pPr lvl="1" marR="0" rtl="0" algn="l">
+      <a:lvl2pPr marR="0" lvl="1" algn="l" rtl="0">
         <a:lnSpc>
           <a:spcPct val="100000"/>
         </a:lnSpc>
@@ -6176,7 +6219,7 @@
           <a:srgbClr val="000000"/>
         </a:buClr>
         <a:buFont typeface="Arial"/>
-        <a:defRPr b="0" i="0" sz="1400" u="none" cap="none" strike="noStrike">
+        <a:defRPr sz="1400" b="0" i="0" u="none" strike="noStrike" cap="none">
           <a:solidFill>
             <a:srgbClr val="000000"/>
           </a:solidFill>
@@ -6186,7 +6229,7 @@
           <a:sym typeface="Arial"/>
         </a:defRPr>
       </a:lvl2pPr>
-      <a:lvl3pPr lvl="2" marR="0" rtl="0" algn="l">
+      <a:lvl3pPr marR="0" lvl="2" algn="l" rtl="0">
         <a:lnSpc>
           <a:spcPct val="100000"/>
         </a:lnSpc>
@@ -6200,7 +6243,7 @@
           <a:srgbClr val="000000"/>
         </a:buClr>
         <a:buFont typeface="Arial"/>
-        <a:defRPr b="0" i="0" sz="1400" u="none" cap="none" strike="noStrike">
+        <a:defRPr sz="1400" b="0" i="0" u="none" strike="noStrike" cap="none">
           <a:solidFill>
             <a:srgbClr val="000000"/>
           </a:solidFill>
@@ -6210,7 +6253,7 @@
           <a:sym typeface="Arial"/>
         </a:defRPr>
       </a:lvl3pPr>
-      <a:lvl4pPr lvl="3" marR="0" rtl="0" algn="l">
+      <a:lvl4pPr marR="0" lvl="3" algn="l" rtl="0">
         <a:lnSpc>
           <a:spcPct val="100000"/>
         </a:lnSpc>
@@ -6224,7 +6267,7 @@
           <a:srgbClr val="000000"/>
         </a:buClr>
         <a:buFont typeface="Arial"/>
-        <a:defRPr b="0" i="0" sz="1400" u="none" cap="none" strike="noStrike">
+        <a:defRPr sz="1400" b="0" i="0" u="none" strike="noStrike" cap="none">
           <a:solidFill>
             <a:srgbClr val="000000"/>
           </a:solidFill>
@@ -6234,7 +6277,7 @@
           <a:sym typeface="Arial"/>
         </a:defRPr>
       </a:lvl4pPr>
-      <a:lvl5pPr lvl="4" marR="0" rtl="0" algn="l">
+      <a:lvl5pPr marR="0" lvl="4" algn="l" rtl="0">
         <a:lnSpc>
           <a:spcPct val="100000"/>
         </a:lnSpc>
@@ -6248,7 +6291,7 @@
           <a:srgbClr val="000000"/>
         </a:buClr>
         <a:buFont typeface="Arial"/>
-        <a:defRPr b="0" i="0" sz="1400" u="none" cap="none" strike="noStrike">
+        <a:defRPr sz="1400" b="0" i="0" u="none" strike="noStrike" cap="none">
           <a:solidFill>
             <a:srgbClr val="000000"/>
           </a:solidFill>
@@ -6258,7 +6301,7 @@
           <a:sym typeface="Arial"/>
         </a:defRPr>
       </a:lvl5pPr>
-      <a:lvl6pPr lvl="5" marR="0" rtl="0" algn="l">
+      <a:lvl6pPr marR="0" lvl="5" algn="l" rtl="0">
         <a:lnSpc>
           <a:spcPct val="100000"/>
         </a:lnSpc>
@@ -6272,7 +6315,7 @@
           <a:srgbClr val="000000"/>
         </a:buClr>
         <a:buFont typeface="Arial"/>
-        <a:defRPr b="0" i="0" sz="1400" u="none" cap="none" strike="noStrike">
+        <a:defRPr sz="1400" b="0" i="0" u="none" strike="noStrike" cap="none">
           <a:solidFill>
             <a:srgbClr val="000000"/>
           </a:solidFill>
@@ -6282,7 +6325,7 @@
           <a:sym typeface="Arial"/>
         </a:defRPr>
       </a:lvl6pPr>
-      <a:lvl7pPr lvl="6" marR="0" rtl="0" algn="l">
+      <a:lvl7pPr marR="0" lvl="6" algn="l" rtl="0">
         <a:lnSpc>
           <a:spcPct val="100000"/>
         </a:lnSpc>
@@ -6296,7 +6339,7 @@
           <a:srgbClr val="000000"/>
         </a:buClr>
         <a:buFont typeface="Arial"/>
-        <a:defRPr b="0" i="0" sz="1400" u="none" cap="none" strike="noStrike">
+        <a:defRPr sz="1400" b="0" i="0" u="none" strike="noStrike" cap="none">
           <a:solidFill>
             <a:srgbClr val="000000"/>
           </a:solidFill>
@@ -6306,7 +6349,7 @@
           <a:sym typeface="Arial"/>
         </a:defRPr>
       </a:lvl7pPr>
-      <a:lvl8pPr lvl="7" marR="0" rtl="0" algn="l">
+      <a:lvl8pPr marR="0" lvl="7" algn="l" rtl="0">
         <a:lnSpc>
           <a:spcPct val="100000"/>
         </a:lnSpc>
@@ -6320,7 +6363,7 @@
           <a:srgbClr val="000000"/>
         </a:buClr>
         <a:buFont typeface="Arial"/>
-        <a:defRPr b="0" i="0" sz="1400" u="none" cap="none" strike="noStrike">
+        <a:defRPr sz="1400" b="0" i="0" u="none" strike="noStrike" cap="none">
           <a:solidFill>
             <a:srgbClr val="000000"/>
           </a:solidFill>
@@ -6330,7 +6373,7 @@
           <a:sym typeface="Arial"/>
         </a:defRPr>
       </a:lvl8pPr>
-      <a:lvl9pPr lvl="8" marR="0" rtl="0" algn="l">
+      <a:lvl9pPr marR="0" lvl="8" algn="l" rtl="0">
         <a:lnSpc>
           <a:spcPct val="100000"/>
         </a:lnSpc>
@@ -6344,7 +6387,7 @@
           <a:srgbClr val="000000"/>
         </a:buClr>
         <a:buFont typeface="Arial"/>
-        <a:defRPr b="0" i="0" sz="1400" u="none" cap="none" strike="noStrike">
+        <a:defRPr sz="1400" b="0" i="0" u="none" strike="noStrike" cap="none">
           <a:solidFill>
             <a:srgbClr val="000000"/>
           </a:solidFill>
@@ -6356,7 +6399,7 @@
       </a:lvl9pPr>
     </p:titleStyle>
     <p:bodyStyle>
-      <a:defPPr lvl="0" marR="0" rtl="0" algn="l">
+      <a:defPPr marR="0" lvl="0" algn="l" rtl="0">
         <a:lnSpc>
           <a:spcPct val="100000"/>
         </a:lnSpc>
@@ -6367,7 +6410,7 @@
           <a:spcPts val="0"/>
         </a:spcAft>
       </a:defPPr>
-      <a:lvl1pPr lvl="0" marR="0" rtl="0" algn="l">
+      <a:lvl1pPr marR="0" lvl="0" algn="l" rtl="0">
         <a:lnSpc>
           <a:spcPct val="100000"/>
         </a:lnSpc>
@@ -6381,7 +6424,7 @@
           <a:srgbClr val="000000"/>
         </a:buClr>
         <a:buFont typeface="Arial"/>
-        <a:defRPr b="0" i="0" sz="1400" u="none" cap="none" strike="noStrike">
+        <a:defRPr sz="1400" b="0" i="0" u="none" strike="noStrike" cap="none">
           <a:solidFill>
             <a:srgbClr val="000000"/>
           </a:solidFill>
@@ -6391,7 +6434,7 @@
           <a:sym typeface="Arial"/>
         </a:defRPr>
       </a:lvl1pPr>
-      <a:lvl2pPr lvl="1" marR="0" rtl="0" algn="l">
+      <a:lvl2pPr marR="0" lvl="1" algn="l" rtl="0">
         <a:lnSpc>
           <a:spcPct val="100000"/>
         </a:lnSpc>
@@ -6405,7 +6448,7 @@
           <a:srgbClr val="000000"/>
         </a:buClr>
         <a:buFont typeface="Arial"/>
-        <a:defRPr b="0" i="0" sz="1400" u="none" cap="none" strike="noStrike">
+        <a:defRPr sz="1400" b="0" i="0" u="none" strike="noStrike" cap="none">
           <a:solidFill>
             <a:srgbClr val="000000"/>
           </a:solidFill>
@@ -6415,7 +6458,7 @@
           <a:sym typeface="Arial"/>
         </a:defRPr>
       </a:lvl2pPr>
-      <a:lvl3pPr lvl="2" marR="0" rtl="0" algn="l">
+      <a:lvl3pPr marR="0" lvl="2" algn="l" rtl="0">
         <a:lnSpc>
           <a:spcPct val="100000"/>
         </a:lnSpc>
@@ -6429,7 +6472,7 @@
           <a:srgbClr val="000000"/>
         </a:buClr>
         <a:buFont typeface="Arial"/>
-        <a:defRPr b="0" i="0" sz="1400" u="none" cap="none" strike="noStrike">
+        <a:defRPr sz="1400" b="0" i="0" u="none" strike="noStrike" cap="none">
           <a:solidFill>
             <a:srgbClr val="000000"/>
           </a:solidFill>
@@ -6439,7 +6482,7 @@
           <a:sym typeface="Arial"/>
         </a:defRPr>
       </a:lvl3pPr>
-      <a:lvl4pPr lvl="3" marR="0" rtl="0" algn="l">
+      <a:lvl4pPr marR="0" lvl="3" algn="l" rtl="0">
         <a:lnSpc>
           <a:spcPct val="100000"/>
         </a:lnSpc>
@@ -6453,7 +6496,7 @@
           <a:srgbClr val="000000"/>
         </a:buClr>
         <a:buFont typeface="Arial"/>
-        <a:defRPr b="0" i="0" sz="1400" u="none" cap="none" strike="noStrike">
+        <a:defRPr sz="1400" b="0" i="0" u="none" strike="noStrike" cap="none">
           <a:solidFill>
             <a:srgbClr val="000000"/>
           </a:solidFill>
@@ -6463,7 +6506,7 @@
           <a:sym typeface="Arial"/>
         </a:defRPr>
       </a:lvl4pPr>
-      <a:lvl5pPr lvl="4" marR="0" rtl="0" algn="l">
+      <a:lvl5pPr marR="0" lvl="4" algn="l" rtl="0">
         <a:lnSpc>
           <a:spcPct val="100000"/>
         </a:lnSpc>
@@ -6477,7 +6520,7 @@
           <a:srgbClr val="000000"/>
         </a:buClr>
         <a:buFont typeface="Arial"/>
-        <a:defRPr b="0" i="0" sz="1400" u="none" cap="none" strike="noStrike">
+        <a:defRPr sz="1400" b="0" i="0" u="none" strike="noStrike" cap="none">
           <a:solidFill>
             <a:srgbClr val="000000"/>
           </a:solidFill>
@@ -6487,7 +6530,7 @@
           <a:sym typeface="Arial"/>
         </a:defRPr>
       </a:lvl5pPr>
-      <a:lvl6pPr lvl="5" marR="0" rtl="0" algn="l">
+      <a:lvl6pPr marR="0" lvl="5" algn="l" rtl="0">
         <a:lnSpc>
           <a:spcPct val="100000"/>
         </a:lnSpc>
@@ -6501,7 +6544,7 @@
           <a:srgbClr val="000000"/>
         </a:buClr>
         <a:buFont typeface="Arial"/>
-        <a:defRPr b="0" i="0" sz="1400" u="none" cap="none" strike="noStrike">
+        <a:defRPr sz="1400" b="0" i="0" u="none" strike="noStrike" cap="none">
           <a:solidFill>
             <a:srgbClr val="000000"/>
           </a:solidFill>
@@ -6511,7 +6554,7 @@
           <a:sym typeface="Arial"/>
         </a:defRPr>
       </a:lvl6pPr>
-      <a:lvl7pPr lvl="6" marR="0" rtl="0" algn="l">
+      <a:lvl7pPr marR="0" lvl="6" algn="l" rtl="0">
         <a:lnSpc>
           <a:spcPct val="100000"/>
         </a:lnSpc>
@@ -6525,7 +6568,7 @@
           <a:srgbClr val="000000"/>
         </a:buClr>
         <a:buFont typeface="Arial"/>
-        <a:defRPr b="0" i="0" sz="1400" u="none" cap="none" strike="noStrike">
+        <a:defRPr sz="1400" b="0" i="0" u="none" strike="noStrike" cap="none">
           <a:solidFill>
             <a:srgbClr val="000000"/>
           </a:solidFill>
@@ -6535,7 +6578,7 @@
           <a:sym typeface="Arial"/>
         </a:defRPr>
       </a:lvl7pPr>
-      <a:lvl8pPr lvl="7" marR="0" rtl="0" algn="l">
+      <a:lvl8pPr marR="0" lvl="7" algn="l" rtl="0">
         <a:lnSpc>
           <a:spcPct val="100000"/>
         </a:lnSpc>
@@ -6549,7 +6592,7 @@
           <a:srgbClr val="000000"/>
         </a:buClr>
         <a:buFont typeface="Arial"/>
-        <a:defRPr b="0" i="0" sz="1400" u="none" cap="none" strike="noStrike">
+        <a:defRPr sz="1400" b="0" i="0" u="none" strike="noStrike" cap="none">
           <a:solidFill>
             <a:srgbClr val="000000"/>
           </a:solidFill>
@@ -6559,7 +6602,7 @@
           <a:sym typeface="Arial"/>
         </a:defRPr>
       </a:lvl8pPr>
-      <a:lvl9pPr lvl="8" marR="0" rtl="0" algn="l">
+      <a:lvl9pPr marR="0" lvl="8" algn="l" rtl="0">
         <a:lnSpc>
           <a:spcPct val="100000"/>
         </a:lnSpc>
@@ -6573,7 +6616,7 @@
           <a:srgbClr val="000000"/>
         </a:buClr>
         <a:buFont typeface="Arial"/>
-        <a:defRPr b="0" i="0" sz="1400" u="none" cap="none" strike="noStrike">
+        <a:defRPr sz="1400" b="0" i="0" u="none" strike="noStrike" cap="none">
           <a:solidFill>
             <a:srgbClr val="000000"/>
           </a:solidFill>
@@ -6585,7 +6628,7 @@
       </a:lvl9pPr>
     </p:bodyStyle>
     <p:otherStyle>
-      <a:defPPr lvl="0" marR="0" rtl="0" algn="l">
+      <a:defPPr marR="0" lvl="0" algn="l" rtl="0">
         <a:lnSpc>
           <a:spcPct val="100000"/>
         </a:lnSpc>
@@ -6596,7 +6639,7 @@
           <a:spcPts val="0"/>
         </a:spcAft>
       </a:defPPr>
-      <a:lvl1pPr lvl="0" marR="0" rtl="0" algn="l">
+      <a:lvl1pPr marR="0" lvl="0" algn="l" rtl="0">
         <a:lnSpc>
           <a:spcPct val="100000"/>
         </a:lnSpc>
@@ -6610,7 +6653,7 @@
           <a:srgbClr val="000000"/>
         </a:buClr>
         <a:buFont typeface="Arial"/>
-        <a:defRPr b="0" i="0" sz="1400" u="none" cap="none" strike="noStrike">
+        <a:defRPr sz="1400" b="0" i="0" u="none" strike="noStrike" cap="none">
           <a:solidFill>
             <a:srgbClr val="000000"/>
           </a:solidFill>
@@ -6620,7 +6663,7 @@
           <a:sym typeface="Arial"/>
         </a:defRPr>
       </a:lvl1pPr>
-      <a:lvl2pPr lvl="1" marR="0" rtl="0" algn="l">
+      <a:lvl2pPr marR="0" lvl="1" algn="l" rtl="0">
         <a:lnSpc>
           <a:spcPct val="100000"/>
         </a:lnSpc>
@@ -6634,7 +6677,7 @@
           <a:srgbClr val="000000"/>
         </a:buClr>
         <a:buFont typeface="Arial"/>
-        <a:defRPr b="0" i="0" sz="1400" u="none" cap="none" strike="noStrike">
+        <a:defRPr sz="1400" b="0" i="0" u="none" strike="noStrike" cap="none">
           <a:solidFill>
             <a:srgbClr val="000000"/>
           </a:solidFill>
@@ -6644,7 +6687,7 @@
           <a:sym typeface="Arial"/>
         </a:defRPr>
       </a:lvl2pPr>
-      <a:lvl3pPr lvl="2" marR="0" rtl="0" algn="l">
+      <a:lvl3pPr marR="0" lvl="2" algn="l" rtl="0">
         <a:lnSpc>
           <a:spcPct val="100000"/>
         </a:lnSpc>
@@ -6658,7 +6701,7 @@
           <a:srgbClr val="000000"/>
         </a:buClr>
         <a:buFont typeface="Arial"/>
-        <a:defRPr b="0" i="0" sz="1400" u="none" cap="none" strike="noStrike">
+        <a:defRPr sz="1400" b="0" i="0" u="none" strike="noStrike" cap="none">
           <a:solidFill>
             <a:srgbClr val="000000"/>
           </a:solidFill>
@@ -6668,7 +6711,7 @@
           <a:sym typeface="Arial"/>
         </a:defRPr>
       </a:lvl3pPr>
-      <a:lvl4pPr lvl="3" marR="0" rtl="0" algn="l">
+      <a:lvl4pPr marR="0" lvl="3" algn="l" rtl="0">
         <a:lnSpc>
           <a:spcPct val="100000"/>
         </a:lnSpc>
@@ -6682,7 +6725,7 @@
           <a:srgbClr val="000000"/>
         </a:buClr>
         <a:buFont typeface="Arial"/>
-        <a:defRPr b="0" i="0" sz="1400" u="none" cap="none" strike="noStrike">
+        <a:defRPr sz="1400" b="0" i="0" u="none" strike="noStrike" cap="none">
           <a:solidFill>
             <a:srgbClr val="000000"/>
           </a:solidFill>
@@ -6692,7 +6735,7 @@
           <a:sym typeface="Arial"/>
         </a:defRPr>
       </a:lvl4pPr>
-      <a:lvl5pPr lvl="4" marR="0" rtl="0" algn="l">
+      <a:lvl5pPr marR="0" lvl="4" algn="l" rtl="0">
         <a:lnSpc>
           <a:spcPct val="100000"/>
         </a:lnSpc>
@@ -6706,7 +6749,7 @@
           <a:srgbClr val="000000"/>
         </a:buClr>
         <a:buFont typeface="Arial"/>
-        <a:defRPr b="0" i="0" sz="1400" u="none" cap="none" strike="noStrike">
+        <a:defRPr sz="1400" b="0" i="0" u="none" strike="noStrike" cap="none">
           <a:solidFill>
             <a:srgbClr val="000000"/>
           </a:solidFill>
@@ -6716,7 +6759,7 @@
           <a:sym typeface="Arial"/>
         </a:defRPr>
       </a:lvl5pPr>
-      <a:lvl6pPr lvl="5" marR="0" rtl="0" algn="l">
+      <a:lvl6pPr marR="0" lvl="5" algn="l" rtl="0">
         <a:lnSpc>
           <a:spcPct val="100000"/>
         </a:lnSpc>
@@ -6730,7 +6773,7 @@
           <a:srgbClr val="000000"/>
         </a:buClr>
         <a:buFont typeface="Arial"/>
-        <a:defRPr b="0" i="0" sz="1400" u="none" cap="none" strike="noStrike">
+        <a:defRPr sz="1400" b="0" i="0" u="none" strike="noStrike" cap="none">
           <a:solidFill>
             <a:srgbClr val="000000"/>
           </a:solidFill>
@@ -6740,7 +6783,7 @@
           <a:sym typeface="Arial"/>
         </a:defRPr>
       </a:lvl6pPr>
-      <a:lvl7pPr lvl="6" marR="0" rtl="0" algn="l">
+      <a:lvl7pPr marR="0" lvl="6" algn="l" rtl="0">
         <a:lnSpc>
           <a:spcPct val="100000"/>
         </a:lnSpc>
@@ -6754,7 +6797,7 @@
           <a:srgbClr val="000000"/>
         </a:buClr>
         <a:buFont typeface="Arial"/>
-        <a:defRPr b="0" i="0" sz="1400" u="none" cap="none" strike="noStrike">
+        <a:defRPr sz="1400" b="0" i="0" u="none" strike="noStrike" cap="none">
           <a:solidFill>
             <a:srgbClr val="000000"/>
           </a:solidFill>
@@ -6764,7 +6807,7 @@
           <a:sym typeface="Arial"/>
         </a:defRPr>
       </a:lvl7pPr>
-      <a:lvl8pPr lvl="7" marR="0" rtl="0" algn="l">
+      <a:lvl8pPr marR="0" lvl="7" algn="l" rtl="0">
         <a:lnSpc>
           <a:spcPct val="100000"/>
         </a:lnSpc>
@@ -6778,7 +6821,7 @@
           <a:srgbClr val="000000"/>
         </a:buClr>
         <a:buFont typeface="Arial"/>
-        <a:defRPr b="0" i="0" sz="1400" u="none" cap="none" strike="noStrike">
+        <a:defRPr sz="1400" b="0" i="0" u="none" strike="noStrike" cap="none">
           <a:solidFill>
             <a:srgbClr val="000000"/>
           </a:solidFill>
@@ -6788,7 +6831,7 @@
           <a:sym typeface="Arial"/>
         </a:defRPr>
       </a:lvl8pPr>
-      <a:lvl9pPr lvl="8" marR="0" rtl="0" algn="l">
+      <a:lvl9pPr marR="0" lvl="8" algn="l" rtl="0">
         <a:lnSpc>
           <a:spcPct val="100000"/>
         </a:lnSpc>
@@ -6802,7 +6845,7 @@
           <a:srgbClr val="000000"/>
         </a:buClr>
         <a:buFont typeface="Arial"/>
-        <a:defRPr b="0" i="0" sz="1400" u="none" cap="none" strike="noStrike">
+        <a:defRPr sz="1400" b="0" i="0" u="none" strike="noStrike" cap="none">
           <a:solidFill>
             <a:srgbClr val="000000"/>
           </a:solidFill>
@@ -6818,11 +6861,11 @@
 </file>
 
 <file path=ppt/slides/slide1.xml><?xml version="1.0" encoding="utf-8"?>
-<p:sld xmlns:a="http://schemas.openxmlformats.org/drawingml/2006/main" xmlns:r="http://schemas.openxmlformats.org/officeDocument/2006/relationships" xmlns:mc="http://schemas.openxmlformats.org/markup-compatibility/2006" xmlns:mv="urn:schemas-microsoft-com:mac:vml" xmlns:p="http://schemas.openxmlformats.org/presentationml/2006/main" xmlns:c="http://schemas.openxmlformats.org/drawingml/2006/chart" xmlns:dgm="http://schemas.openxmlformats.org/drawingml/2006/diagram" xmlns:o="urn:schemas-microsoft-com:office:office" xmlns:v="urn:schemas-microsoft-com:vml" xmlns:pvml="urn:schemas-microsoft-com:office:powerpoint" xmlns:com="http://schemas.openxmlformats.org/drawingml/2006/compatibility" xmlns:p14="http://schemas.microsoft.com/office/powerpoint/2010/main" xmlns:p15="http://schemas.microsoft.com/office/powerpoint/2012/main">
+<p:sld xmlns:a="http://schemas.openxmlformats.org/drawingml/2006/main" xmlns:r="http://schemas.openxmlformats.org/officeDocument/2006/relationships" xmlns:p="http://schemas.openxmlformats.org/presentationml/2006/main">
   <p:cSld>
     <p:spTree>
       <p:nvGrpSpPr>
-        <p:cNvPr id="58" name="Shape 58"/>
+        <p:cNvPr id="1" name="Shape 58"/>
         <p:cNvGrpSpPr/>
         <p:nvPr/>
       </p:nvGrpSpPr>
@@ -6837,7 +6880,9 @@
       <p:sp>
         <p:nvSpPr>
           <p:cNvPr id="59" name="Google Shape;59;p13"/>
-          <p:cNvSpPr txBox="1"/>
+          <p:cNvSpPr txBox="1">
+            <a:spLocks noGrp="1"/>
+          </p:cNvSpPr>
           <p:nvPr>
             <p:ph type="ctrTitle"/>
           </p:nvPr>
@@ -6852,12 +6897,12 @@
           </a:prstGeom>
         </p:spPr>
         <p:txBody>
-          <a:bodyPr anchorCtr="0" anchor="b" bIns="91425" lIns="91425" spcFirstLastPara="1" rIns="91425" wrap="square" tIns="91425">
+          <a:bodyPr spcFirstLastPara="1" wrap="square" lIns="91425" tIns="91425" rIns="91425" bIns="91425" anchor="b" anchorCtr="0">
             <a:noAutofit/>
           </a:bodyPr>
           <a:lstStyle/>
           <a:p>
-            <a:pPr indent="0" lvl="0" marL="0" rtl="0" algn="l">
+            <a:pPr marL="0" lvl="0" indent="0" algn="l" rtl="0">
               <a:spcBef>
                 <a:spcPts val="0"/>
               </a:spcBef>
@@ -6877,9 +6922,11 @@
       <p:sp>
         <p:nvSpPr>
           <p:cNvPr id="60" name="Google Shape;60;p13"/>
-          <p:cNvSpPr txBox="1"/>
+          <p:cNvSpPr txBox="1">
+            <a:spLocks noGrp="1"/>
+          </p:cNvSpPr>
           <p:nvPr>
-            <p:ph idx="1" type="subTitle"/>
+            <p:ph type="subTitle" idx="1"/>
           </p:nvPr>
         </p:nvSpPr>
         <p:spPr>
@@ -6892,12 +6939,12 @@
           </a:prstGeom>
         </p:spPr>
         <p:txBody>
-          <a:bodyPr anchorCtr="0" anchor="t" bIns="91425" lIns="91425" spcFirstLastPara="1" rIns="91425" wrap="square" tIns="91425">
+          <a:bodyPr spcFirstLastPara="1" wrap="square" lIns="91425" tIns="91425" rIns="91425" bIns="91425" anchor="t" anchorCtr="0">
             <a:noAutofit/>
           </a:bodyPr>
           <a:lstStyle/>
           <a:p>
-            <a:pPr indent="0" lvl="0" marL="0" rtl="0" algn="l">
+            <a:pPr marL="0" lvl="0" indent="0" algn="l" rtl="0">
               <a:spcBef>
                 <a:spcPts val="0"/>
               </a:spcBef>
@@ -6923,11 +6970,11 @@
 </file>
 
 <file path=ppt/slides/slide2.xml><?xml version="1.0" encoding="utf-8"?>
-<p:sld xmlns:a="http://schemas.openxmlformats.org/drawingml/2006/main" xmlns:r="http://schemas.openxmlformats.org/officeDocument/2006/relationships" xmlns:mc="http://schemas.openxmlformats.org/markup-compatibility/2006" xmlns:mv="urn:schemas-microsoft-com:mac:vml" xmlns:p="http://schemas.openxmlformats.org/presentationml/2006/main" xmlns:c="http://schemas.openxmlformats.org/drawingml/2006/chart" xmlns:dgm="http://schemas.openxmlformats.org/drawingml/2006/diagram" xmlns:o="urn:schemas-microsoft-com:office:office" xmlns:v="urn:schemas-microsoft-com:vml" xmlns:pvml="urn:schemas-microsoft-com:office:powerpoint" xmlns:com="http://schemas.openxmlformats.org/drawingml/2006/compatibility" xmlns:p14="http://schemas.microsoft.com/office/powerpoint/2010/main" xmlns:p15="http://schemas.microsoft.com/office/powerpoint/2012/main">
+<p:sld xmlns:a="http://schemas.openxmlformats.org/drawingml/2006/main" xmlns:r="http://schemas.openxmlformats.org/officeDocument/2006/relationships" xmlns:p="http://schemas.openxmlformats.org/presentationml/2006/main">
   <p:cSld>
     <p:spTree>
       <p:nvGrpSpPr>
-        <p:cNvPr id="64" name="Shape 64"/>
+        <p:cNvPr id="1" name=""/>
         <p:cNvGrpSpPr/>
         <p:nvPr/>
       </p:nvGrpSpPr>
@@ -6941,85 +6988,125 @@
       </p:grpSpPr>
       <p:sp>
         <p:nvSpPr>
-          <p:cNvPr id="65" name="Google Shape;65;p14"/>
-          <p:cNvSpPr txBox="1"/>
+          <p:cNvPr id="2" name="Title 1">
+            <a:extLst>
+              <a:ext uri="{FF2B5EF4-FFF2-40B4-BE49-F238E27FC236}">
+                <a16:creationId xmlns:a16="http://schemas.microsoft.com/office/drawing/2014/main" id="{5A99F040-C06C-4FAC-AC6D-454218EDAB70}"/>
+              </a:ext>
+            </a:extLst>
+          </p:cNvPr>
+          <p:cNvSpPr>
+            <a:spLocks noGrp="1"/>
+          </p:cNvSpPr>
           <p:nvPr>
             <p:ph type="title"/>
           </p:nvPr>
         </p:nvSpPr>
-        <p:spPr>
-          <a:xfrm>
-            <a:off x="311700" y="445025"/>
-            <a:ext cx="8520600" cy="613200"/>
-          </a:xfrm>
-          <a:prstGeom prst="rect">
-            <a:avLst/>
-          </a:prstGeom>
-        </p:spPr>
+        <p:spPr/>
         <p:txBody>
-          <a:bodyPr anchorCtr="0" anchor="t" bIns="91425" lIns="91425" spcFirstLastPara="1" rIns="91425" wrap="square" tIns="91425">
-            <a:noAutofit/>
-          </a:bodyPr>
+          <a:bodyPr/>
           <a:lstStyle/>
           <a:p>
-            <a:pPr indent="0" lvl="0" marL="0" rtl="0" algn="l">
-              <a:spcBef>
-                <a:spcPts val="0"/>
-              </a:spcBef>
-              <a:spcAft>
-                <a:spcPts val="0"/>
-              </a:spcAft>
-              <a:buNone/>
-            </a:pPr>
             <a:r>
-              <a:rPr lang="en"/>
+              <a:rPr lang="en-US" dirty="0"/>
               <a:t>Project Overview</a:t>
             </a:r>
-            <a:endParaRPr/>
           </a:p>
         </p:txBody>
       </p:sp>
       <p:sp>
         <p:nvSpPr>
-          <p:cNvPr id="66" name="Google Shape;66;p14"/>
-          <p:cNvSpPr txBox="1"/>
+          <p:cNvPr id="3" name="Text Placeholder 2">
+            <a:extLst>
+              <a:ext uri="{FF2B5EF4-FFF2-40B4-BE49-F238E27FC236}">
+                <a16:creationId xmlns:a16="http://schemas.microsoft.com/office/drawing/2014/main" id="{CBA92560-2C74-451B-A515-0372C6C2ACEB}"/>
+              </a:ext>
+            </a:extLst>
+          </p:cNvPr>
+          <p:cNvSpPr>
+            <a:spLocks noGrp="1"/>
+          </p:cNvSpPr>
           <p:nvPr>
-            <p:ph idx="1" type="body"/>
+            <p:ph type="body" idx="1"/>
           </p:nvPr>
         </p:nvSpPr>
-        <p:spPr>
-          <a:xfrm>
-            <a:off x="311700" y="1171600"/>
-            <a:ext cx="8520600" cy="3397200"/>
-          </a:xfrm>
-          <a:prstGeom prst="rect">
-            <a:avLst/>
-          </a:prstGeom>
-        </p:spPr>
+        <p:spPr/>
         <p:txBody>
-          <a:bodyPr anchorCtr="0" anchor="t" bIns="91425" lIns="91425" spcFirstLastPara="1" rIns="91425" wrap="square" tIns="91425">
-            <a:noAutofit/>
-          </a:bodyPr>
+          <a:bodyPr/>
           <a:lstStyle/>
           <a:p>
-            <a:pPr indent="0" lvl="0" marL="0" rtl="0" algn="l">
-              <a:spcBef>
-                <a:spcPts val="0"/>
-              </a:spcBef>
-              <a:spcAft>
-                <a:spcPts val="1600"/>
-              </a:spcAft>
-              <a:buNone/>
-            </a:pPr>
             <a:r>
-              <a:rPr lang="en" sz="1400"/>
-              <a:t>The lending library project is an attempt to solve the following problem: There exists a program where University of Nebraska personnel loan out equipment to local K-12 schools. Currently this is an entirely manual process, requests are submitted via emailed and fulfilled manually by University of Nebraska personnel. Our goal is to create a web interface that will streamline request, processing, and user management.</a:t>
+              <a:rPr lang="en-US" dirty="0"/>
+              <a:t>The Lending Library lends out technology items to other institutions/teachers.</a:t>
             </a:r>
-            <a:endParaRPr sz="1400"/>
+          </a:p>
+          <a:p>
+            <a:r>
+              <a:rPr lang="en-US" dirty="0"/>
+              <a:t>This process has no automation.</a:t>
+            </a:r>
+          </a:p>
+          <a:p>
+            <a:r>
+              <a:rPr lang="en-US" dirty="0"/>
+              <a:t>Our goals are as follows:</a:t>
+            </a:r>
+            <a:br>
+              <a:rPr lang="en-US" dirty="0"/>
+            </a:br>
+            <a:r>
+              <a:rPr lang="en-US" dirty="0"/>
+              <a:t>- Automate the request process.</a:t>
+            </a:r>
+            <a:br>
+              <a:rPr lang="en-US" dirty="0"/>
+            </a:br>
+            <a:r>
+              <a:rPr lang="en-US" dirty="0"/>
+              <a:t>- Allow renters to see what products are currently available.</a:t>
+            </a:r>
+            <a:br>
+              <a:rPr lang="en-US" dirty="0"/>
+            </a:br>
+            <a:r>
+              <a:rPr lang="en-US" dirty="0"/>
+              <a:t>- Allow lenders to easily track inventory. </a:t>
+            </a:r>
+          </a:p>
+          <a:p>
+            <a:r>
+              <a:rPr lang="en-US" dirty="0"/>
+              <a:t>Stretch Goals:</a:t>
+            </a:r>
+            <a:br>
+              <a:rPr lang="en-US" dirty="0"/>
+            </a:br>
+            <a:r>
+              <a:rPr lang="en-US" dirty="0"/>
+              <a:t>- Allow a new user to register via the web app.</a:t>
+            </a:r>
+            <a:br>
+              <a:rPr lang="en-US" dirty="0"/>
+            </a:br>
+            <a:r>
+              <a:rPr lang="en-US" dirty="0"/>
+              <a:t>- Allow grouping of products into “modules” that can be placed into a renters “cart” with a single click.</a:t>
+            </a:r>
+          </a:p>
+          <a:p>
+            <a:endParaRPr lang="en-US" dirty="0"/>
+          </a:p>
+          <a:p>
+            <a:endParaRPr lang="en-US" dirty="0"/>
           </a:p>
         </p:txBody>
       </p:sp>
     </p:spTree>
+    <p:extLst>
+      <p:ext uri="{BB962C8B-B14F-4D97-AF65-F5344CB8AC3E}">
+        <p14:creationId xmlns:p14="http://schemas.microsoft.com/office/powerpoint/2010/main" val="3658575389"/>
+      </p:ext>
+    </p:extLst>
   </p:cSld>
   <p:clrMapOvr>
     <a:masterClrMapping/>
@@ -7028,11 +7115,11 @@
 </file>
 
 <file path=ppt/slides/slide3.xml><?xml version="1.0" encoding="utf-8"?>
-<p:sld xmlns:a="http://schemas.openxmlformats.org/drawingml/2006/main" xmlns:r="http://schemas.openxmlformats.org/officeDocument/2006/relationships" xmlns:mc="http://schemas.openxmlformats.org/markup-compatibility/2006" xmlns:mv="urn:schemas-microsoft-com:mac:vml" xmlns:p="http://schemas.openxmlformats.org/presentationml/2006/main" xmlns:c="http://schemas.openxmlformats.org/drawingml/2006/chart" xmlns:dgm="http://schemas.openxmlformats.org/drawingml/2006/diagram" xmlns:o="urn:schemas-microsoft-com:office:office" xmlns:v="urn:schemas-microsoft-com:vml" xmlns:pvml="urn:schemas-microsoft-com:office:powerpoint" xmlns:com="http://schemas.openxmlformats.org/drawingml/2006/compatibility" xmlns:p14="http://schemas.microsoft.com/office/powerpoint/2010/main" xmlns:p15="http://schemas.microsoft.com/office/powerpoint/2012/main">
+<p:sld xmlns:a="http://schemas.openxmlformats.org/drawingml/2006/main" xmlns:r="http://schemas.openxmlformats.org/officeDocument/2006/relationships" xmlns:p="http://schemas.openxmlformats.org/presentationml/2006/main">
   <p:cSld>
     <p:spTree>
       <p:nvGrpSpPr>
-        <p:cNvPr id="70" name="Shape 70"/>
+        <p:cNvPr id="1" name="Shape 70"/>
         <p:cNvGrpSpPr/>
         <p:nvPr/>
       </p:nvGrpSpPr>
@@ -7047,9 +7134,11 @@
       <p:sp>
         <p:nvSpPr>
           <p:cNvPr id="71" name="Google Shape;71;p15"/>
-          <p:cNvSpPr txBox="1"/>
+          <p:cNvSpPr txBox="1">
+            <a:spLocks noGrp="1"/>
+          </p:cNvSpPr>
           <p:nvPr>
-            <p:ph idx="1" type="body"/>
+            <p:ph type="body" idx="1"/>
           </p:nvPr>
         </p:nvSpPr>
         <p:spPr>
@@ -7062,12 +7151,12 @@
           </a:prstGeom>
         </p:spPr>
         <p:txBody>
-          <a:bodyPr anchorCtr="0" anchor="ctr" bIns="91425" lIns="91425" spcFirstLastPara="1" rIns="91425" wrap="square" tIns="91425">
+          <a:bodyPr spcFirstLastPara="1" wrap="square" lIns="91425" tIns="91425" rIns="91425" bIns="91425" anchor="ctr" anchorCtr="0">
             <a:noAutofit/>
           </a:bodyPr>
           <a:lstStyle/>
           <a:p>
-            <a:pPr indent="0" lvl="0" marL="0" rtl="0" algn="l">
+            <a:pPr marL="0" lvl="0" indent="0" algn="l" rtl="0">
               <a:spcBef>
                 <a:spcPts val="0"/>
               </a:spcBef>
@@ -7121,11 +7210,11 @@
 </file>
 
 <file path=ppt/slides/slide4.xml><?xml version="1.0" encoding="utf-8"?>
-<p:sld xmlns:a="http://schemas.openxmlformats.org/drawingml/2006/main" xmlns:r="http://schemas.openxmlformats.org/officeDocument/2006/relationships" xmlns:mc="http://schemas.openxmlformats.org/markup-compatibility/2006" xmlns:mv="urn:schemas-microsoft-com:mac:vml" xmlns:p="http://schemas.openxmlformats.org/presentationml/2006/main" xmlns:c="http://schemas.openxmlformats.org/drawingml/2006/chart" xmlns:dgm="http://schemas.openxmlformats.org/drawingml/2006/diagram" xmlns:o="urn:schemas-microsoft-com:office:office" xmlns:v="urn:schemas-microsoft-com:vml" xmlns:pvml="urn:schemas-microsoft-com:office:powerpoint" xmlns:com="http://schemas.openxmlformats.org/drawingml/2006/compatibility" xmlns:p14="http://schemas.microsoft.com/office/powerpoint/2010/main" xmlns:p15="http://schemas.microsoft.com/office/powerpoint/2012/main">
+<p:sld xmlns:a="http://schemas.openxmlformats.org/drawingml/2006/main" xmlns:r="http://schemas.openxmlformats.org/officeDocument/2006/relationships" xmlns:p="http://schemas.openxmlformats.org/presentationml/2006/main">
   <p:cSld>
     <p:spTree>
       <p:nvGrpSpPr>
-        <p:cNvPr id="76" name="Shape 76"/>
+        <p:cNvPr id="1" name="Shape 76"/>
         <p:cNvGrpSpPr/>
         <p:nvPr/>
       </p:nvGrpSpPr>
@@ -7140,7 +7229,9 @@
       <p:sp>
         <p:nvSpPr>
           <p:cNvPr id="77" name="Google Shape;77;p16"/>
-          <p:cNvSpPr txBox="1"/>
+          <p:cNvSpPr txBox="1">
+            <a:spLocks noGrp="1"/>
+          </p:cNvSpPr>
           <p:nvPr>
             <p:ph type="title"/>
           </p:nvPr>
@@ -7155,12 +7246,12 @@
           </a:prstGeom>
         </p:spPr>
         <p:txBody>
-          <a:bodyPr anchorCtr="0" anchor="t" bIns="91425" lIns="91425" spcFirstLastPara="1" rIns="91425" wrap="square" tIns="91425">
+          <a:bodyPr spcFirstLastPara="1" wrap="square" lIns="91425" tIns="91425" rIns="91425" bIns="91425" anchor="t" anchorCtr="0">
             <a:noAutofit/>
           </a:bodyPr>
           <a:lstStyle/>
           <a:p>
-            <a:pPr indent="0" lvl="0" marL="0" rtl="0" algn="l">
+            <a:pPr marL="0" lvl="0" indent="0" algn="l" rtl="0">
               <a:spcBef>
                 <a:spcPts val="0"/>
               </a:spcBef>
@@ -7180,9 +7271,11 @@
       <p:sp>
         <p:nvSpPr>
           <p:cNvPr id="78" name="Google Shape;78;p16"/>
-          <p:cNvSpPr txBox="1"/>
+          <p:cNvSpPr txBox="1">
+            <a:spLocks noGrp="1"/>
+          </p:cNvSpPr>
           <p:nvPr>
-            <p:ph idx="1" type="body"/>
+            <p:ph type="body" idx="1"/>
           </p:nvPr>
         </p:nvSpPr>
         <p:spPr>
@@ -7195,12 +7288,12 @@
           </a:prstGeom>
         </p:spPr>
         <p:txBody>
-          <a:bodyPr anchorCtr="0" anchor="t" bIns="91425" lIns="91425" spcFirstLastPara="1" rIns="91425" wrap="square" tIns="91425">
+          <a:bodyPr spcFirstLastPara="1" wrap="square" lIns="91425" tIns="91425" rIns="91425" bIns="91425" anchor="t" anchorCtr="0">
             <a:noAutofit/>
           </a:bodyPr>
           <a:lstStyle/>
           <a:p>
-            <a:pPr indent="0" lvl="0" marL="0" rtl="0" algn="l">
+            <a:pPr marL="0" lvl="0" indent="0" algn="l" rtl="0">
               <a:spcBef>
                 <a:spcPts val="0"/>
               </a:spcBef>
@@ -7229,7 +7322,7 @@
             </a:endParaRPr>
           </a:p>
           <a:p>
-            <a:pPr indent="0" lvl="0" marL="0" rtl="0" algn="l">
+            <a:pPr marL="0" lvl="0" indent="0" algn="l" rtl="0">
               <a:spcBef>
                 <a:spcPts val="1200"/>
               </a:spcBef>
@@ -7258,7 +7351,7 @@
             </a:endParaRPr>
           </a:p>
           <a:p>
-            <a:pPr indent="0" lvl="0" marL="0" rtl="0" algn="l">
+            <a:pPr marL="0" lvl="0" indent="0" algn="l" rtl="0">
               <a:spcBef>
                 <a:spcPts val="1200"/>
               </a:spcBef>
@@ -7287,7 +7380,7 @@
             </a:endParaRPr>
           </a:p>
           <a:p>
-            <a:pPr indent="0" lvl="0" marL="0" rtl="0" algn="l">
+            <a:pPr marL="0" lvl="0" indent="0" algn="l" rtl="0">
               <a:spcBef>
                 <a:spcPts val="1200"/>
               </a:spcBef>
@@ -7316,7 +7409,7 @@
             </a:endParaRPr>
           </a:p>
           <a:p>
-            <a:pPr indent="0" lvl="0" marL="0" rtl="0" algn="l">
+            <a:pPr marL="0" lvl="0" indent="0" algn="l" rtl="0">
               <a:spcBef>
                 <a:spcPts val="1200"/>
               </a:spcBef>
@@ -7345,7 +7438,7 @@
             </a:endParaRPr>
           </a:p>
           <a:p>
-            <a:pPr indent="0" lvl="0" marL="0" rtl="0" algn="l">
+            <a:pPr marL="0" lvl="0" indent="0" algn="l" rtl="0">
               <a:spcBef>
                 <a:spcPts val="1200"/>
               </a:spcBef>
@@ -7354,9 +7447,6 @@
               </a:spcAft>
               <a:buNone/>
             </a:pPr>
-            <a:r>
-              <a:t/>
-            </a:r>
             <a:endParaRPr/>
           </a:p>
         </p:txBody>
@@ -7370,11 +7460,11 @@
 </file>
 
 <file path=ppt/slides/slide5.xml><?xml version="1.0" encoding="utf-8"?>
-<p:sld xmlns:a="http://schemas.openxmlformats.org/drawingml/2006/main" xmlns:r="http://schemas.openxmlformats.org/officeDocument/2006/relationships" xmlns:mc="http://schemas.openxmlformats.org/markup-compatibility/2006" xmlns:mv="urn:schemas-microsoft-com:mac:vml" xmlns:p="http://schemas.openxmlformats.org/presentationml/2006/main" xmlns:c="http://schemas.openxmlformats.org/drawingml/2006/chart" xmlns:dgm="http://schemas.openxmlformats.org/drawingml/2006/diagram" xmlns:o="urn:schemas-microsoft-com:office:office" xmlns:v="urn:schemas-microsoft-com:vml" xmlns:pvml="urn:schemas-microsoft-com:office:powerpoint" xmlns:com="http://schemas.openxmlformats.org/drawingml/2006/compatibility" xmlns:p14="http://schemas.microsoft.com/office/powerpoint/2010/main" xmlns:p15="http://schemas.microsoft.com/office/powerpoint/2012/main">
+<p:sld xmlns:a="http://schemas.openxmlformats.org/drawingml/2006/main" xmlns:r="http://schemas.openxmlformats.org/officeDocument/2006/relationships" xmlns:p="http://schemas.openxmlformats.org/presentationml/2006/main">
   <p:cSld>
     <p:spTree>
       <p:nvGrpSpPr>
-        <p:cNvPr id="82" name="Shape 82"/>
+        <p:cNvPr id="1" name="Shape 82"/>
         <p:cNvGrpSpPr/>
         <p:nvPr/>
       </p:nvGrpSpPr>
@@ -7389,9 +7479,11 @@
       <p:sp>
         <p:nvSpPr>
           <p:cNvPr id="83" name="Google Shape;83;p17"/>
-          <p:cNvSpPr txBox="1"/>
+          <p:cNvSpPr txBox="1">
+            <a:spLocks noGrp="1"/>
+          </p:cNvSpPr>
           <p:nvPr>
-            <p:ph idx="1" type="body"/>
+            <p:ph type="body" idx="1"/>
           </p:nvPr>
         </p:nvSpPr>
         <p:spPr>
@@ -7404,12 +7496,12 @@
           </a:prstGeom>
         </p:spPr>
         <p:txBody>
-          <a:bodyPr anchorCtr="0" anchor="ctr" bIns="91425" lIns="91425" spcFirstLastPara="1" rIns="91425" wrap="square" tIns="91425">
+          <a:bodyPr spcFirstLastPara="1" wrap="square" lIns="91425" tIns="91425" rIns="91425" bIns="91425" anchor="ctr" anchorCtr="0">
             <a:noAutofit/>
           </a:bodyPr>
           <a:lstStyle/>
           <a:p>
-            <a:pPr indent="0" lvl="0" marL="0" rtl="0" algn="l">
+            <a:pPr marL="0" lvl="0" indent="0" algn="l" rtl="0">
               <a:spcBef>
                 <a:spcPts val="0"/>
               </a:spcBef>
@@ -7446,12 +7538,12 @@
           </a:ln>
         </p:spPr>
         <p:txBody>
-          <a:bodyPr anchorCtr="0" anchor="t" bIns="91425" lIns="91425" spcFirstLastPara="1" rIns="91425" wrap="square" tIns="91425">
+          <a:bodyPr spcFirstLastPara="1" wrap="square" lIns="91425" tIns="91425" rIns="91425" bIns="91425" anchor="t" anchorCtr="0">
             <a:noAutofit/>
           </a:bodyPr>
           <a:lstStyle/>
           <a:p>
-            <a:pPr indent="0" lvl="0" marL="0" rtl="0" algn="l">
+            <a:pPr marL="0" lvl="0" indent="0" algn="l" rtl="0">
               <a:spcBef>
                 <a:spcPts val="0"/>
               </a:spcBef>
@@ -7460,9 +7552,6 @@
               </a:spcAft>
               <a:buNone/>
             </a:pPr>
-            <a:r>
-              <a:t/>
-            </a:r>
             <a:endParaRPr>
               <a:latin typeface="Old Standard TT"/>
               <a:ea typeface="Old Standard TT"/>
@@ -7509,11 +7598,11 @@
 </file>
 
 <file path=ppt/slides/slide6.xml><?xml version="1.0" encoding="utf-8"?>
-<p:sld xmlns:a="http://schemas.openxmlformats.org/drawingml/2006/main" xmlns:r="http://schemas.openxmlformats.org/officeDocument/2006/relationships" xmlns:mc="http://schemas.openxmlformats.org/markup-compatibility/2006" xmlns:mv="urn:schemas-microsoft-com:mac:vml" xmlns:p="http://schemas.openxmlformats.org/presentationml/2006/main" xmlns:c="http://schemas.openxmlformats.org/drawingml/2006/chart" xmlns:dgm="http://schemas.openxmlformats.org/drawingml/2006/diagram" xmlns:o="urn:schemas-microsoft-com:office:office" xmlns:v="urn:schemas-microsoft-com:vml" xmlns:pvml="urn:schemas-microsoft-com:office:powerpoint" xmlns:com="http://schemas.openxmlformats.org/drawingml/2006/compatibility" xmlns:p14="http://schemas.microsoft.com/office/powerpoint/2010/main" xmlns:p15="http://schemas.microsoft.com/office/powerpoint/2012/main">
+<p:sld xmlns:a="http://schemas.openxmlformats.org/drawingml/2006/main" xmlns:r="http://schemas.openxmlformats.org/officeDocument/2006/relationships" xmlns:p="http://schemas.openxmlformats.org/presentationml/2006/main">
   <p:cSld>
     <p:spTree>
       <p:nvGrpSpPr>
-        <p:cNvPr id="89" name="Shape 89"/>
+        <p:cNvPr id="1" name="Shape 89"/>
         <p:cNvGrpSpPr/>
         <p:nvPr/>
       </p:nvGrpSpPr>
@@ -7528,9 +7617,11 @@
       <p:sp>
         <p:nvSpPr>
           <p:cNvPr id="90" name="Google Shape;90;p18"/>
-          <p:cNvSpPr txBox="1"/>
+          <p:cNvSpPr txBox="1">
+            <a:spLocks noGrp="1"/>
+          </p:cNvSpPr>
           <p:nvPr>
-            <p:ph idx="1" type="body"/>
+            <p:ph type="body" idx="1"/>
           </p:nvPr>
         </p:nvSpPr>
         <p:spPr>
@@ -7543,12 +7634,12 @@
           </a:prstGeom>
         </p:spPr>
         <p:txBody>
-          <a:bodyPr anchorCtr="0" anchor="ctr" bIns="91425" lIns="91425" spcFirstLastPara="1" rIns="91425" wrap="square" tIns="91425">
+          <a:bodyPr spcFirstLastPara="1" wrap="square" lIns="91425" tIns="91425" rIns="91425" bIns="91425" anchor="ctr" anchorCtr="0">
             <a:noAutofit/>
           </a:bodyPr>
           <a:lstStyle/>
           <a:p>
-            <a:pPr indent="0" lvl="0" marL="0" rtl="0" algn="l">
+            <a:pPr marL="0" lvl="0" indent="0" algn="l" rtl="0">
               <a:spcBef>
                 <a:spcPts val="0"/>
               </a:spcBef>
@@ -7585,12 +7676,12 @@
           </a:ln>
         </p:spPr>
         <p:txBody>
-          <a:bodyPr anchorCtr="0" anchor="t" bIns="91425" lIns="91425" spcFirstLastPara="1" rIns="91425" wrap="square" tIns="91425">
+          <a:bodyPr spcFirstLastPara="1" wrap="square" lIns="91425" tIns="91425" rIns="91425" bIns="91425" anchor="t" anchorCtr="0">
             <a:noAutofit/>
           </a:bodyPr>
           <a:lstStyle/>
           <a:p>
-            <a:pPr indent="0" lvl="0" marL="0" rtl="0" algn="l">
+            <a:pPr marL="0" lvl="0" indent="0" algn="l" rtl="0">
               <a:spcBef>
                 <a:spcPts val="0"/>
               </a:spcBef>
@@ -7599,9 +7690,6 @@
               </a:spcAft>
               <a:buNone/>
             </a:pPr>
-            <a:r>
-              <a:t/>
-            </a:r>
             <a:endParaRPr>
               <a:latin typeface="Old Standard TT"/>
               <a:ea typeface="Old Standard TT"/>
@@ -7629,19 +7717,35 @@
                 <a:tableStyleId>{9FA0B65B-F055-4F23-9966-29C546729B42}</a:tableStyleId>
               </a:tblPr>
               <a:tblGrid>
-                <a:gridCol w="1742200"/>
-                <a:gridCol w="1694425"/>
-                <a:gridCol w="1789950"/>
+                <a:gridCol w="1742200">
+                  <a:extLst>
+                    <a:ext uri="{9D8B030D-6E8A-4147-A177-3AD203B41FA5}">
+                      <a16:colId xmlns:a16="http://schemas.microsoft.com/office/drawing/2014/main" val="20000"/>
+                    </a:ext>
+                  </a:extLst>
+                </a:gridCol>
+                <a:gridCol w="1694425">
+                  <a:extLst>
+                    <a:ext uri="{9D8B030D-6E8A-4147-A177-3AD203B41FA5}">
+                      <a16:colId xmlns:a16="http://schemas.microsoft.com/office/drawing/2014/main" val="20001"/>
+                    </a:ext>
+                  </a:extLst>
+                </a:gridCol>
+                <a:gridCol w="1789950">
+                  <a:extLst>
+                    <a:ext uri="{9D8B030D-6E8A-4147-A177-3AD203B41FA5}">
+                      <a16:colId xmlns:a16="http://schemas.microsoft.com/office/drawing/2014/main" val="20002"/>
+                    </a:ext>
+                  </a:extLst>
+                </a:gridCol>
               </a:tblGrid>
               <a:tr h="416300">
                 <a:tc>
                   <a:txBody>
-                    <a:bodyPr>
-                      <a:noAutofit/>
-                    </a:bodyPr>
+                    <a:bodyPr/>
                     <a:lstStyle/>
                     <a:p>
-                      <a:pPr indent="0" lvl="0" marL="0" rtl="0" algn="ctr">
+                      <a:pPr marL="0" lvl="0" indent="0" algn="ctr" rtl="0">
                         <a:spcBef>
                           <a:spcPts val="0"/>
                         </a:spcBef>
@@ -7667,16 +7771,14 @@
                       </a:endParaRPr>
                     </a:p>
                   </a:txBody>
-                  <a:tcPr marT="91425" marB="91425" marR="91425" marL="91425"/>
+                  <a:tcPr marL="91425" marR="91425" marT="91425" marB="91425"/>
                 </a:tc>
                 <a:tc>
                   <a:txBody>
-                    <a:bodyPr>
-                      <a:noAutofit/>
-                    </a:bodyPr>
+                    <a:bodyPr/>
                     <a:lstStyle/>
                     <a:p>
-                      <a:pPr indent="0" lvl="0" marL="0" rtl="0" algn="ctr">
+                      <a:pPr marL="0" lvl="0" indent="0" algn="ctr" rtl="0">
                         <a:spcBef>
                           <a:spcPts val="0"/>
                         </a:spcBef>
@@ -7702,16 +7804,14 @@
                       </a:endParaRPr>
                     </a:p>
                   </a:txBody>
-                  <a:tcPr marT="91425" marB="91425" marR="91425" marL="91425"/>
+                  <a:tcPr marL="91425" marR="91425" marT="91425" marB="91425"/>
                 </a:tc>
                 <a:tc>
                   <a:txBody>
-                    <a:bodyPr>
-                      <a:noAutofit/>
-                    </a:bodyPr>
+                    <a:bodyPr/>
                     <a:lstStyle/>
                     <a:p>
-                      <a:pPr indent="0" lvl="0" marL="0" rtl="0" algn="ctr">
+                      <a:pPr marL="0" lvl="0" indent="0" algn="ctr" rtl="0">
                         <a:spcBef>
                           <a:spcPts val="0"/>
                         </a:spcBef>
@@ -7743,18 +7843,21 @@
                       </a:endParaRPr>
                     </a:p>
                   </a:txBody>
-                  <a:tcPr marT="91425" marB="91425" marR="91425" marL="91425"/>
+                  <a:tcPr marL="91425" marR="91425" marT="91425" marB="91425"/>
                 </a:tc>
+                <a:extLst>
+                  <a:ext uri="{0D108BD9-81ED-4DB2-BD59-A6C34878D82A}">
+                    <a16:rowId xmlns:a16="http://schemas.microsoft.com/office/drawing/2014/main" val="10000"/>
+                  </a:ext>
+                </a:extLst>
               </a:tr>
               <a:tr h="416300">
                 <a:tc>
                   <a:txBody>
-                    <a:bodyPr>
-                      <a:noAutofit/>
-                    </a:bodyPr>
+                    <a:bodyPr/>
                     <a:lstStyle/>
                     <a:p>
-                      <a:pPr indent="0" lvl="0" marL="0" rtl="0" algn="ctr">
+                      <a:pPr marL="0" lvl="0" indent="0" algn="ctr" rtl="0">
                         <a:spcBef>
                           <a:spcPts val="0"/>
                         </a:spcBef>
@@ -7780,16 +7883,14 @@
                       </a:endParaRPr>
                     </a:p>
                   </a:txBody>
-                  <a:tcPr marT="91425" marB="91425" marR="91425" marL="91425"/>
+                  <a:tcPr marL="91425" marR="91425" marT="91425" marB="91425"/>
                 </a:tc>
                 <a:tc>
                   <a:txBody>
-                    <a:bodyPr>
-                      <a:noAutofit/>
-                    </a:bodyPr>
+                    <a:bodyPr/>
                     <a:lstStyle/>
                     <a:p>
-                      <a:pPr indent="0" lvl="0" marL="0" rtl="0" algn="ctr">
+                      <a:pPr marL="0" lvl="0" indent="0" algn="ctr" rtl="0">
                         <a:spcBef>
                           <a:spcPts val="0"/>
                         </a:spcBef>
@@ -7815,16 +7916,14 @@
                       </a:endParaRPr>
                     </a:p>
                   </a:txBody>
-                  <a:tcPr marT="91425" marB="91425" marR="91425" marL="91425"/>
+                  <a:tcPr marL="91425" marR="91425" marT="91425" marB="91425"/>
                 </a:tc>
                 <a:tc>
                   <a:txBody>
-                    <a:bodyPr>
-                      <a:noAutofit/>
-                    </a:bodyPr>
+                    <a:bodyPr/>
                     <a:lstStyle/>
                     <a:p>
-                      <a:pPr indent="0" lvl="0" marL="0" rtl="0" algn="ctr">
+                      <a:pPr marL="0" lvl="0" indent="0" algn="ctr" rtl="0">
                         <a:spcBef>
                           <a:spcPts val="0"/>
                         </a:spcBef>
@@ -7850,18 +7949,21 @@
                       </a:endParaRPr>
                     </a:p>
                   </a:txBody>
-                  <a:tcPr marT="91425" marB="91425" marR="91425" marL="91425"/>
+                  <a:tcPr marL="91425" marR="91425" marT="91425" marB="91425"/>
                 </a:tc>
+                <a:extLst>
+                  <a:ext uri="{0D108BD9-81ED-4DB2-BD59-A6C34878D82A}">
+                    <a16:rowId xmlns:a16="http://schemas.microsoft.com/office/drawing/2014/main" val="10001"/>
+                  </a:ext>
+                </a:extLst>
               </a:tr>
               <a:tr h="638625">
                 <a:tc>
                   <a:txBody>
-                    <a:bodyPr>
-                      <a:noAutofit/>
-                    </a:bodyPr>
+                    <a:bodyPr/>
                     <a:lstStyle/>
                     <a:p>
-                      <a:pPr indent="0" lvl="0" marL="0" rtl="0" algn="ctr">
+                      <a:pPr marL="0" lvl="0" indent="0" algn="ctr" rtl="0">
                         <a:spcBef>
                           <a:spcPts val="0"/>
                         </a:spcBef>
@@ -7887,16 +7989,14 @@
                       </a:endParaRPr>
                     </a:p>
                   </a:txBody>
-                  <a:tcPr marT="91425" marB="91425" marR="91425" marL="91425"/>
+                  <a:tcPr marL="91425" marR="91425" marT="91425" marB="91425"/>
                 </a:tc>
                 <a:tc>
                   <a:txBody>
-                    <a:bodyPr>
-                      <a:noAutofit/>
-                    </a:bodyPr>
+                    <a:bodyPr/>
                     <a:lstStyle/>
                     <a:p>
-                      <a:pPr indent="0" lvl="0" marL="0" rtl="0" algn="ctr">
+                      <a:pPr marL="0" lvl="0" indent="0" algn="ctr" rtl="0">
                         <a:spcBef>
                           <a:spcPts val="0"/>
                         </a:spcBef>
@@ -7922,16 +8022,14 @@
                       </a:endParaRPr>
                     </a:p>
                   </a:txBody>
-                  <a:tcPr marT="91425" marB="91425" marR="91425" marL="91425"/>
+                  <a:tcPr marL="91425" marR="91425" marT="91425" marB="91425"/>
                 </a:tc>
                 <a:tc>
                   <a:txBody>
-                    <a:bodyPr>
-                      <a:noAutofit/>
-                    </a:bodyPr>
+                    <a:bodyPr/>
                     <a:lstStyle/>
                     <a:p>
-                      <a:pPr indent="0" lvl="0" marL="0" rtl="0" algn="ctr">
+                      <a:pPr marL="0" lvl="0" indent="0" algn="ctr" rtl="0">
                         <a:spcBef>
                           <a:spcPts val="0"/>
                         </a:spcBef>
@@ -7957,18 +8055,21 @@
                       </a:endParaRPr>
                     </a:p>
                   </a:txBody>
-                  <a:tcPr marT="91425" marB="91425" marR="91425" marL="91425"/>
+                  <a:tcPr marL="91425" marR="91425" marT="91425" marB="91425"/>
                 </a:tc>
+                <a:extLst>
+                  <a:ext uri="{0D108BD9-81ED-4DB2-BD59-A6C34878D82A}">
+                    <a16:rowId xmlns:a16="http://schemas.microsoft.com/office/drawing/2014/main" val="10002"/>
+                  </a:ext>
+                </a:extLst>
               </a:tr>
               <a:tr h="416300">
                 <a:tc>
                   <a:txBody>
-                    <a:bodyPr>
-                      <a:noAutofit/>
-                    </a:bodyPr>
+                    <a:bodyPr/>
                     <a:lstStyle/>
                     <a:p>
-                      <a:pPr indent="0" lvl="0" marL="0" rtl="0" algn="ctr">
+                      <a:pPr marL="0" lvl="0" indent="0" algn="ctr" rtl="0">
                         <a:spcBef>
                           <a:spcPts val="0"/>
                         </a:spcBef>
@@ -7994,16 +8095,14 @@
                       </a:endParaRPr>
                     </a:p>
                   </a:txBody>
-                  <a:tcPr marT="91425" marB="91425" marR="91425" marL="91425"/>
+                  <a:tcPr marL="91425" marR="91425" marT="91425" marB="91425"/>
                 </a:tc>
                 <a:tc>
                   <a:txBody>
-                    <a:bodyPr>
-                      <a:noAutofit/>
-                    </a:bodyPr>
+                    <a:bodyPr/>
                     <a:lstStyle/>
                     <a:p>
-                      <a:pPr indent="0" lvl="0" marL="0" rtl="0" algn="ctr">
+                      <a:pPr marL="0" lvl="0" indent="0" algn="ctr" rtl="0">
                         <a:spcBef>
                           <a:spcPts val="0"/>
                         </a:spcBef>
@@ -8029,16 +8128,14 @@
                       </a:endParaRPr>
                     </a:p>
                   </a:txBody>
-                  <a:tcPr marT="91425" marB="91425" marR="91425" marL="91425"/>
+                  <a:tcPr marL="91425" marR="91425" marT="91425" marB="91425"/>
                 </a:tc>
                 <a:tc>
                   <a:txBody>
-                    <a:bodyPr>
-                      <a:noAutofit/>
-                    </a:bodyPr>
+                    <a:bodyPr/>
                     <a:lstStyle/>
                     <a:p>
-                      <a:pPr indent="0" lvl="0" marL="0" rtl="0" algn="ctr">
+                      <a:pPr marL="0" lvl="0" indent="0" algn="ctr" rtl="0">
                         <a:spcBef>
                           <a:spcPts val="0"/>
                         </a:spcBef>
@@ -8064,18 +8161,21 @@
                       </a:endParaRPr>
                     </a:p>
                   </a:txBody>
-                  <a:tcPr marT="91425" marB="91425" marR="91425" marL="91425"/>
+                  <a:tcPr marL="91425" marR="91425" marT="91425" marB="91425"/>
                 </a:tc>
+                <a:extLst>
+                  <a:ext uri="{0D108BD9-81ED-4DB2-BD59-A6C34878D82A}">
+                    <a16:rowId xmlns:a16="http://schemas.microsoft.com/office/drawing/2014/main" val="10003"/>
+                  </a:ext>
+                </a:extLst>
               </a:tr>
               <a:tr h="416300">
                 <a:tc>
                   <a:txBody>
-                    <a:bodyPr>
-                      <a:noAutofit/>
-                    </a:bodyPr>
+                    <a:bodyPr/>
                     <a:lstStyle/>
                     <a:p>
-                      <a:pPr indent="0" lvl="0" marL="0" rtl="0" algn="ctr">
+                      <a:pPr marL="0" lvl="0" indent="0" algn="ctr" rtl="0">
                         <a:spcBef>
                           <a:spcPts val="0"/>
                         </a:spcBef>
@@ -8101,16 +8201,14 @@
                       </a:endParaRPr>
                     </a:p>
                   </a:txBody>
-                  <a:tcPr marT="91425" marB="91425" marR="91425" marL="91425"/>
+                  <a:tcPr marL="91425" marR="91425" marT="91425" marB="91425"/>
                 </a:tc>
                 <a:tc>
                   <a:txBody>
-                    <a:bodyPr>
-                      <a:noAutofit/>
-                    </a:bodyPr>
+                    <a:bodyPr/>
                     <a:lstStyle/>
                     <a:p>
-                      <a:pPr indent="0" lvl="0" marL="0" rtl="0" algn="ctr">
+                      <a:pPr marL="0" lvl="0" indent="0" algn="ctr" rtl="0">
                         <a:spcBef>
                           <a:spcPts val="0"/>
                         </a:spcBef>
@@ -8136,16 +8234,14 @@
                       </a:endParaRPr>
                     </a:p>
                   </a:txBody>
-                  <a:tcPr marT="91425" marB="91425" marR="91425" marL="91425"/>
+                  <a:tcPr marL="91425" marR="91425" marT="91425" marB="91425"/>
                 </a:tc>
                 <a:tc>
                   <a:txBody>
-                    <a:bodyPr>
-                      <a:noAutofit/>
-                    </a:bodyPr>
+                    <a:bodyPr/>
                     <a:lstStyle/>
                     <a:p>
-                      <a:pPr indent="0" lvl="0" marL="0" rtl="0" algn="ctr">
+                      <a:pPr marL="0" lvl="0" indent="0" algn="ctr" rtl="0">
                         <a:spcBef>
                           <a:spcPts val="0"/>
                         </a:spcBef>
@@ -8171,18 +8267,21 @@
                       </a:endParaRPr>
                     </a:p>
                   </a:txBody>
-                  <a:tcPr marT="91425" marB="91425" marR="91425" marL="91425"/>
+                  <a:tcPr marL="91425" marR="91425" marT="91425" marB="91425"/>
                 </a:tc>
+                <a:extLst>
+                  <a:ext uri="{0D108BD9-81ED-4DB2-BD59-A6C34878D82A}">
+                    <a16:rowId xmlns:a16="http://schemas.microsoft.com/office/drawing/2014/main" val="10004"/>
+                  </a:ext>
+                </a:extLst>
               </a:tr>
               <a:tr h="416300">
                 <a:tc>
                   <a:txBody>
-                    <a:bodyPr>
-                      <a:noAutofit/>
-                    </a:bodyPr>
+                    <a:bodyPr/>
                     <a:lstStyle/>
                     <a:p>
-                      <a:pPr indent="0" lvl="0" marL="0" rtl="0" algn="ctr">
+                      <a:pPr marL="0" lvl="0" indent="0" algn="ctr" rtl="0">
                         <a:spcBef>
                           <a:spcPts val="0"/>
                         </a:spcBef>
@@ -8208,16 +8307,14 @@
                       </a:endParaRPr>
                     </a:p>
                   </a:txBody>
-                  <a:tcPr marT="91425" marB="91425" marR="91425" marL="91425"/>
+                  <a:tcPr marL="91425" marR="91425" marT="91425" marB="91425"/>
                 </a:tc>
                 <a:tc>
                   <a:txBody>
-                    <a:bodyPr>
-                      <a:noAutofit/>
-                    </a:bodyPr>
+                    <a:bodyPr/>
                     <a:lstStyle/>
                     <a:p>
-                      <a:pPr indent="0" lvl="0" marL="0" rtl="0" algn="ctr">
+                      <a:pPr marL="0" lvl="0" indent="0" algn="ctr" rtl="0">
                         <a:spcBef>
                           <a:spcPts val="0"/>
                         </a:spcBef>
@@ -8243,16 +8340,14 @@
                       </a:endParaRPr>
                     </a:p>
                   </a:txBody>
-                  <a:tcPr marT="91425" marB="91425" marR="91425" marL="91425"/>
+                  <a:tcPr marL="91425" marR="91425" marT="91425" marB="91425"/>
                 </a:tc>
                 <a:tc>
                   <a:txBody>
-                    <a:bodyPr>
-                      <a:noAutofit/>
-                    </a:bodyPr>
+                    <a:bodyPr/>
                     <a:lstStyle/>
                     <a:p>
-                      <a:pPr indent="0" lvl="0" marL="0" rtl="0" algn="ctr">
+                      <a:pPr marL="0" lvl="0" indent="0" algn="ctr" rtl="0">
                         <a:spcBef>
                           <a:spcPts val="0"/>
                         </a:spcBef>
@@ -8278,8 +8373,13 @@
                       </a:endParaRPr>
                     </a:p>
                   </a:txBody>
-                  <a:tcPr marT="91425" marB="91425" marR="91425" marL="91425"/>
+                  <a:tcPr marL="91425" marR="91425" marT="91425" marB="91425"/>
                 </a:tc>
+                <a:extLst>
+                  <a:ext uri="{0D108BD9-81ED-4DB2-BD59-A6C34878D82A}">
+                    <a16:rowId xmlns:a16="http://schemas.microsoft.com/office/drawing/2014/main" val="10005"/>
+                  </a:ext>
+                </a:extLst>
               </a:tr>
             </a:tbl>
           </a:graphicData>
@@ -8294,11 +8394,11 @@
 </file>
 
 <file path=ppt/slides/slide7.xml><?xml version="1.0" encoding="utf-8"?>
-<p:sld xmlns:a="http://schemas.openxmlformats.org/drawingml/2006/main" xmlns:r="http://schemas.openxmlformats.org/officeDocument/2006/relationships" xmlns:mc="http://schemas.openxmlformats.org/markup-compatibility/2006" xmlns:mv="urn:schemas-microsoft-com:mac:vml" xmlns:p="http://schemas.openxmlformats.org/presentationml/2006/main" xmlns:c="http://schemas.openxmlformats.org/drawingml/2006/chart" xmlns:dgm="http://schemas.openxmlformats.org/drawingml/2006/diagram" xmlns:o="urn:schemas-microsoft-com:office:office" xmlns:v="urn:schemas-microsoft-com:vml" xmlns:pvml="urn:schemas-microsoft-com:office:powerpoint" xmlns:com="http://schemas.openxmlformats.org/drawingml/2006/compatibility" xmlns:p14="http://schemas.microsoft.com/office/powerpoint/2010/main" xmlns:p15="http://schemas.microsoft.com/office/powerpoint/2012/main">
+<p:sld xmlns:a="http://schemas.openxmlformats.org/drawingml/2006/main" xmlns:r="http://schemas.openxmlformats.org/officeDocument/2006/relationships" xmlns:p="http://schemas.openxmlformats.org/presentationml/2006/main">
   <p:cSld>
     <p:spTree>
       <p:nvGrpSpPr>
-        <p:cNvPr id="96" name="Shape 96"/>
+        <p:cNvPr id="1" name="Shape 96"/>
         <p:cNvGrpSpPr/>
         <p:nvPr/>
       </p:nvGrpSpPr>
@@ -8313,7 +8413,9 @@
       <p:sp>
         <p:nvSpPr>
           <p:cNvPr id="97" name="Google Shape;97;p19"/>
-          <p:cNvSpPr txBox="1"/>
+          <p:cNvSpPr txBox="1">
+            <a:spLocks noGrp="1"/>
+          </p:cNvSpPr>
           <p:nvPr>
             <p:ph type="title"/>
           </p:nvPr>
@@ -8328,12 +8430,12 @@
           </a:prstGeom>
         </p:spPr>
         <p:txBody>
-          <a:bodyPr anchorCtr="0" anchor="t" bIns="91425" lIns="91425" spcFirstLastPara="1" rIns="91425" wrap="square" tIns="91425">
+          <a:bodyPr spcFirstLastPara="1" wrap="square" lIns="91425" tIns="91425" rIns="91425" bIns="91425" anchor="t" anchorCtr="0">
             <a:noAutofit/>
           </a:bodyPr>
           <a:lstStyle/>
           <a:p>
-            <a:pPr indent="0" lvl="0" marL="0" rtl="0" algn="l">
+            <a:pPr marL="0" lvl="0" indent="0" algn="l" rtl="0">
               <a:spcBef>
                 <a:spcPts val="0"/>
               </a:spcBef>
@@ -8353,9 +8455,11 @@
       <p:sp>
         <p:nvSpPr>
           <p:cNvPr id="98" name="Google Shape;98;p19"/>
-          <p:cNvSpPr txBox="1"/>
+          <p:cNvSpPr txBox="1">
+            <a:spLocks noGrp="1"/>
+          </p:cNvSpPr>
           <p:nvPr>
-            <p:ph idx="1" type="body"/>
+            <p:ph type="body" idx="1"/>
           </p:nvPr>
         </p:nvSpPr>
         <p:spPr>
@@ -8368,12 +8472,12 @@
           </a:prstGeom>
         </p:spPr>
         <p:txBody>
-          <a:bodyPr anchorCtr="0" anchor="t" bIns="91425" lIns="91425" spcFirstLastPara="1" rIns="91425" wrap="square" tIns="91425">
+          <a:bodyPr spcFirstLastPara="1" wrap="square" lIns="91425" tIns="91425" rIns="91425" bIns="91425" anchor="t" anchorCtr="0">
             <a:noAutofit/>
           </a:bodyPr>
           <a:lstStyle/>
           <a:p>
-            <a:pPr indent="0" lvl="0" marL="0" rtl="0" algn="l">
+            <a:pPr marL="0" lvl="0" indent="0" algn="l" rtl="0">
               <a:spcBef>
                 <a:spcPts val="0"/>
               </a:spcBef>
@@ -8402,7 +8506,7 @@
             </a:endParaRPr>
           </a:p>
           <a:p>
-            <a:pPr indent="0" lvl="0" marL="0" rtl="0" algn="l">
+            <a:pPr marL="0" lvl="0" indent="0" algn="l" rtl="0">
               <a:spcBef>
                 <a:spcPts val="1200"/>
               </a:spcBef>
@@ -8431,7 +8535,7 @@
             </a:endParaRPr>
           </a:p>
           <a:p>
-            <a:pPr indent="-317500" lvl="0" marL="457200" rtl="0" algn="l">
+            <a:pPr marL="457200" lvl="0" indent="-317500" algn="l" rtl="0">
               <a:spcBef>
                 <a:spcPts val="1200"/>
               </a:spcBef>
@@ -8450,15 +8554,7 @@
                   <a:srgbClr val="24292E"/>
                 </a:solidFill>
               </a:rPr>
-              <a:t>C</a:t>
-            </a:r>
-            <a:r>
-              <a:rPr lang="en" sz="1400">
-                <a:solidFill>
-                  <a:srgbClr val="24292E"/>
-                </a:solidFill>
-              </a:rPr>
-              <a:t>SRF tokens on all forms </a:t>
+              <a:t>CSRF tokens on all forms </a:t>
             </a:r>
             <a:endParaRPr sz="1400">
               <a:solidFill>
@@ -8467,7 +8563,7 @@
             </a:endParaRPr>
           </a:p>
           <a:p>
-            <a:pPr indent="-317500" lvl="0" marL="457200" rtl="0" algn="l">
+            <a:pPr marL="457200" lvl="0" indent="-317500" algn="l" rtl="0">
               <a:spcBef>
                 <a:spcPts val="0"/>
               </a:spcBef>
@@ -8495,7 +8591,7 @@
             </a:endParaRPr>
           </a:p>
           <a:p>
-            <a:pPr indent="-317500" lvl="0" marL="457200" rtl="0" algn="l">
+            <a:pPr marL="457200" lvl="0" indent="-317500" algn="l" rtl="0">
               <a:spcBef>
                 <a:spcPts val="0"/>
               </a:spcBef>
@@ -8523,7 +8619,7 @@
             </a:endParaRPr>
           </a:p>
           <a:p>
-            <a:pPr indent="-317500" lvl="0" marL="457200" rtl="0" algn="l">
+            <a:pPr marL="457200" lvl="0" indent="-317500" algn="l" rtl="0">
               <a:spcBef>
                 <a:spcPts val="0"/>
               </a:spcBef>
@@ -8551,7 +8647,7 @@
             </a:endParaRPr>
           </a:p>
           <a:p>
-            <a:pPr indent="-317500" lvl="0" marL="457200" rtl="0" algn="l">
+            <a:pPr marL="457200" lvl="0" indent="-317500" algn="l" rtl="0">
               <a:spcBef>
                 <a:spcPts val="0"/>
               </a:spcBef>
@@ -8579,7 +8675,7 @@
             </a:endParaRPr>
           </a:p>
           <a:p>
-            <a:pPr indent="-317500" lvl="0" marL="457200" rtl="0" algn="l">
+            <a:pPr marL="457200" lvl="0" indent="-317500" algn="l" rtl="0">
               <a:spcBef>
                 <a:spcPts val="0"/>
               </a:spcBef>
@@ -8607,7 +8703,7 @@
             </a:endParaRPr>
           </a:p>
           <a:p>
-            <a:pPr indent="0" lvl="0" marL="0" rtl="0" algn="l">
+            <a:pPr marL="0" lvl="0" indent="0" algn="l" rtl="0">
               <a:spcBef>
                 <a:spcPts val="0"/>
               </a:spcBef>
@@ -8616,9 +8712,6 @@
               </a:spcAft>
               <a:buNone/>
             </a:pPr>
-            <a:r>
-              <a:t/>
-            </a:r>
             <a:endParaRPr sz="1400"/>
           </a:p>
         </p:txBody>
@@ -8632,7 +8725,7 @@
 </file>
 
 <file path=ppt/theme/theme1.xml><?xml version="1.0" encoding="utf-8"?>
-<a:theme xmlns:a="http://schemas.openxmlformats.org/drawingml/2006/main" xmlns:r="http://schemas.openxmlformats.org/officeDocument/2006/relationships" name="Paperback">
+<a:theme xmlns:a="http://schemas.openxmlformats.org/drawingml/2006/main" name="Paperback">
   <a:themeElements>
     <a:clrScheme name="Paperback">
       <a:dk1>
@@ -8907,11 +9000,13 @@
       </a:bgFillStyleLst>
     </a:fmtScheme>
   </a:themeElements>
+  <a:objectDefaults/>
+  <a:extraClrSchemeLst/>
 </a:theme>
 </file>
 
 <file path=ppt/theme/theme2.xml><?xml version="1.0" encoding="utf-8"?>
-<a:theme xmlns:a="http://schemas.openxmlformats.org/drawingml/2006/main" xmlns:r="http://schemas.openxmlformats.org/officeDocument/2006/relationships">
+<a:theme xmlns:a="http://schemas.openxmlformats.org/drawingml/2006/main">
   <a:themeElements>
     <a:clrScheme name="Default">
       <a:dk1>
@@ -9186,5 +9281,7 @@
       </a:bgFillStyleLst>
     </a:fmtScheme>
   </a:themeElements>
+  <a:objectDefaults/>
+  <a:extraClrSchemeLst/>
 </a:theme>
 </file>
</xml_diff>

<commit_message>
corrected a font size issue, added questions slide
</commit_message>
<xml_diff>
--- a/Proposal Stuff/Milestone 1 Presentation (2).pptx
+++ b/Proposal Stuff/Milestone 1 Presentation (2).pptx
@@ -5,7 +5,7 @@
     <p:sldMasterId id="2147483659" r:id="rId1"/>
   </p:sldMasterIdLst>
   <p:notesMasterIdLst>
-    <p:notesMasterId r:id="rId9"/>
+    <p:notesMasterId r:id="rId10"/>
   </p:notesMasterIdLst>
   <p:sldIdLst>
     <p:sldId id="256" r:id="rId2"/>
@@ -15,15 +15,16 @@
     <p:sldId id="260" r:id="rId6"/>
     <p:sldId id="261" r:id="rId7"/>
     <p:sldId id="262" r:id="rId8"/>
+    <p:sldId id="264" r:id="rId9"/>
   </p:sldIdLst>
   <p:sldSz cx="9144000" cy="5143500" type="screen16x9"/>
   <p:notesSz cx="6858000" cy="9144000"/>
   <p:embeddedFontLst>
     <p:embeddedFont>
       <p:font typeface="Old Standard TT" panose="020B0604020202020204" charset="0"/>
-      <p:regular r:id="rId10"/>
-      <p:bold r:id="rId11"/>
-      <p:italic r:id="rId12"/>
+      <p:regular r:id="rId11"/>
+      <p:bold r:id="rId12"/>
+      <p:italic r:id="rId13"/>
     </p:embeddedFont>
   </p:embeddedFontLst>
   <p:defaultTextStyle>
@@ -255,6 +256,11 @@
       </a:defRPr>
     </a:lvl9pPr>
   </p:defaultTextStyle>
+  <p:extLst>
+    <p:ext uri="{EFAFB233-063F-42B5-8137-9DF3F51BA10A}">
+      <p15:sldGuideLst xmlns:p15="http://schemas.microsoft.com/office/powerpoint/2012/main"/>
+    </p:ext>
+  </p:extLst>
 </p:presentation>
 </file>
 
@@ -7036,60 +7042,60 @@
           <a:lstStyle/>
           <a:p>
             <a:r>
-              <a:rPr lang="en-US" dirty="0"/>
+              <a:rPr lang="en-US" sz="1400" dirty="0"/>
               <a:t>The Lending Library lends out technology items to other institutions/teachers.</a:t>
             </a:r>
           </a:p>
           <a:p>
             <a:r>
-              <a:rPr lang="en-US" dirty="0"/>
+              <a:rPr lang="en-US" sz="1400" dirty="0"/>
               <a:t>This process has no automation.</a:t>
             </a:r>
           </a:p>
           <a:p>
             <a:r>
-              <a:rPr lang="en-US" dirty="0"/>
+              <a:rPr lang="en-US" sz="1400" dirty="0"/>
               <a:t>Our goals are as follows:</a:t>
             </a:r>
             <a:br>
-              <a:rPr lang="en-US" dirty="0"/>
+              <a:rPr lang="en-US" sz="1400" dirty="0"/>
             </a:br>
             <a:r>
-              <a:rPr lang="en-US" dirty="0"/>
+              <a:rPr lang="en-US" sz="1400" dirty="0"/>
               <a:t>- Automate the request process.</a:t>
             </a:r>
             <a:br>
-              <a:rPr lang="en-US" dirty="0"/>
+              <a:rPr lang="en-US" sz="1400" dirty="0"/>
             </a:br>
             <a:r>
-              <a:rPr lang="en-US" dirty="0"/>
+              <a:rPr lang="en-US" sz="1400" dirty="0"/>
               <a:t>- Allow renters to see what products are currently available.</a:t>
             </a:r>
             <a:br>
-              <a:rPr lang="en-US" dirty="0"/>
+              <a:rPr lang="en-US" sz="1400" dirty="0"/>
             </a:br>
             <a:r>
-              <a:rPr lang="en-US" dirty="0"/>
+              <a:rPr lang="en-US" sz="1400" dirty="0"/>
               <a:t>- Allow lenders to easily track inventory. </a:t>
             </a:r>
           </a:p>
           <a:p>
             <a:r>
-              <a:rPr lang="en-US" dirty="0"/>
+              <a:rPr lang="en-US" sz="1400" dirty="0"/>
               <a:t>Stretch Goals:</a:t>
             </a:r>
             <a:br>
-              <a:rPr lang="en-US" dirty="0"/>
+              <a:rPr lang="en-US" sz="1400" dirty="0"/>
             </a:br>
             <a:r>
-              <a:rPr lang="en-US" dirty="0"/>
+              <a:rPr lang="en-US" sz="1400" dirty="0"/>
               <a:t>- Allow a new user to register via the web app.</a:t>
             </a:r>
             <a:br>
-              <a:rPr lang="en-US" dirty="0"/>
+              <a:rPr lang="en-US" sz="1400" dirty="0"/>
             </a:br>
             <a:r>
-              <a:rPr lang="en-US" dirty="0"/>
+              <a:rPr lang="en-US" sz="1400" dirty="0"/>
               <a:t>- Allow grouping of products into “modules” that can be placed into a renters “cart” with a single click.</a:t>
             </a:r>
           </a:p>
@@ -7308,14 +7314,14 @@
               <a:buNone/>
             </a:pPr>
             <a:r>
-              <a:rPr lang="en" sz="1400">
+              <a:rPr lang="en" sz="1400" dirty="0">
                 <a:solidFill>
                   <a:srgbClr val="24292E"/>
                 </a:solidFill>
               </a:rPr>
               <a:t>Our solution will be built in a Django-Ember environment built on top of Docker with a PostgreSQL backend.</a:t>
             </a:r>
-            <a:endParaRPr sz="1400">
+            <a:endParaRPr sz="1400" dirty="0">
               <a:solidFill>
                 <a:srgbClr val="24292E"/>
               </a:solidFill>
@@ -7337,14 +7343,14 @@
               <a:buNone/>
             </a:pPr>
             <a:r>
-              <a:rPr lang="en" sz="1400">
+              <a:rPr lang="en" sz="1400" dirty="0">
                 <a:solidFill>
                   <a:srgbClr val="24292E"/>
                 </a:solidFill>
               </a:rPr>
               <a:t>Docker is a platform for operating system level virtualization</a:t>
             </a:r>
-            <a:endParaRPr sz="1400">
+            <a:endParaRPr sz="1400" dirty="0">
               <a:solidFill>
                 <a:srgbClr val="24292E"/>
               </a:solidFill>
@@ -7366,14 +7372,14 @@
               <a:buNone/>
             </a:pPr>
             <a:r>
-              <a:rPr lang="en" sz="1400">
+              <a:rPr lang="en" sz="1400" dirty="0">
                 <a:solidFill>
                   <a:srgbClr val="24292E"/>
                 </a:solidFill>
               </a:rPr>
               <a:t>Django is an open-source python based framework for rapid web development</a:t>
             </a:r>
-            <a:endParaRPr sz="1400">
+            <a:endParaRPr sz="1400" dirty="0">
               <a:solidFill>
                 <a:srgbClr val="24292E"/>
               </a:solidFill>
@@ -7395,14 +7401,14 @@
               <a:buNone/>
             </a:pPr>
             <a:r>
-              <a:rPr lang="en" sz="1400">
+              <a:rPr lang="en" sz="1400" dirty="0">
                 <a:solidFill>
                   <a:srgbClr val="24292E"/>
                 </a:solidFill>
               </a:rPr>
               <a:t>Ember is an open-source javascript framework</a:t>
             </a:r>
-            <a:endParaRPr sz="1400">
+            <a:endParaRPr sz="1400" dirty="0">
               <a:solidFill>
                 <a:srgbClr val="24292E"/>
               </a:solidFill>
@@ -7424,14 +7430,14 @@
               <a:buNone/>
             </a:pPr>
             <a:r>
-              <a:rPr lang="en" sz="1400">
+              <a:rPr lang="en" sz="1400" dirty="0">
                 <a:solidFill>
                   <a:srgbClr val="24292E"/>
                 </a:solidFill>
               </a:rPr>
               <a:t>PostgreSQL is an open-source Relational Database system</a:t>
             </a:r>
-            <a:endParaRPr sz="1400">
+            <a:endParaRPr sz="1400" dirty="0">
               <a:solidFill>
                 <a:srgbClr val="24292E"/>
               </a:solidFill>
@@ -7447,7 +7453,7 @@
               </a:spcAft>
               <a:buNone/>
             </a:pPr>
-            <a:endParaRPr/>
+            <a:endParaRPr dirty="0"/>
           </a:p>
         </p:txBody>
       </p:sp>
@@ -7707,7 +7713,7 @@
         </p:nvGraphicFramePr>
         <p:xfrm>
           <a:off x="1958713" y="813375"/>
-          <a:ext cx="3000000" cy="3000000"/>
+          <a:ext cx="5226575" cy="3106665"/>
         </p:xfrm>
         <a:graphic>
           <a:graphicData uri="http://schemas.openxmlformats.org/drawingml/2006/table">
@@ -8724,6 +8730,70 @@
 </p:sld>
 </file>
 
+<file path=ppt/slides/slide8.xml><?xml version="1.0" encoding="utf-8"?>
+<p:sld xmlns:a="http://schemas.openxmlformats.org/drawingml/2006/main" xmlns:r="http://schemas.openxmlformats.org/officeDocument/2006/relationships" xmlns:p="http://schemas.openxmlformats.org/presentationml/2006/main">
+  <p:cSld>
+    <p:spTree>
+      <p:nvGrpSpPr>
+        <p:cNvPr id="1" name=""/>
+        <p:cNvGrpSpPr/>
+        <p:nvPr/>
+      </p:nvGrpSpPr>
+      <p:grpSpPr>
+        <a:xfrm>
+          <a:off x="0" y="0"/>
+          <a:ext cx="0" cy="0"/>
+          <a:chOff x="0" y="0"/>
+          <a:chExt cx="0" cy="0"/>
+        </a:xfrm>
+      </p:grpSpPr>
+      <p:sp>
+        <p:nvSpPr>
+          <p:cNvPr id="2" name="Title 1">
+            <a:extLst>
+              <a:ext uri="{FF2B5EF4-FFF2-40B4-BE49-F238E27FC236}">
+                <a16:creationId xmlns:a16="http://schemas.microsoft.com/office/drawing/2014/main" id="{BA0A5ED7-0ABC-43AE-8B27-D8F685BFD161}"/>
+              </a:ext>
+            </a:extLst>
+          </p:cNvPr>
+          <p:cNvSpPr>
+            <a:spLocks noGrp="1"/>
+          </p:cNvSpPr>
+          <p:nvPr>
+            <p:ph type="title"/>
+          </p:nvPr>
+        </p:nvSpPr>
+        <p:spPr>
+          <a:xfrm>
+            <a:off x="311700" y="2265150"/>
+            <a:ext cx="8520600" cy="613200"/>
+          </a:xfrm>
+        </p:spPr>
+        <p:txBody>
+          <a:bodyPr/>
+          <a:lstStyle/>
+          <a:p>
+            <a:pPr algn="ctr"/>
+            <a:r>
+              <a:rPr lang="en-US" dirty="0"/>
+              <a:t>Questions?</a:t>
+            </a:r>
+          </a:p>
+        </p:txBody>
+      </p:sp>
+    </p:spTree>
+    <p:extLst>
+      <p:ext uri="{BB962C8B-B14F-4D97-AF65-F5344CB8AC3E}">
+        <p14:creationId xmlns:p14="http://schemas.microsoft.com/office/powerpoint/2010/main" val="2480711452"/>
+      </p:ext>
+    </p:extLst>
+  </p:cSld>
+  <p:clrMapOvr>
+    <a:masterClrMapping/>
+  </p:clrMapOvr>
+</p:sld>
+</file>
+
 <file path=ppt/theme/theme1.xml><?xml version="1.0" encoding="utf-8"?>
 <a:theme xmlns:a="http://schemas.openxmlformats.org/drawingml/2006/main" name="Paperback">
   <a:themeElements>

</xml_diff>